<commit_message>
New items bonus & malus
</commit_message>
<xml_diff>
--- a/Sprite/assets.pptx
+++ b/Sprite/assets.pptx
@@ -24,6 +24,7 @@
     <p:sldId id="268" r:id="rId18"/>
     <p:sldId id="269" r:id="rId19"/>
     <p:sldId id="270" r:id="rId20"/>
+    <p:sldId id="275" r:id="rId21"/>
   </p:sldIdLst>
   <p:sldSz cx="12192000" cy="6858000"/>
   <p:notesSz cx="6858000" cy="9144000"/>
@@ -144,7 +145,7 @@
 <file path=ppt/revisionInfo.xml><?xml version="1.0" encoding="utf-8"?>
 <p1510:revInfo xmlns:a="http://schemas.openxmlformats.org/drawingml/2006/main" xmlns:r="http://schemas.openxmlformats.org/officeDocument/2006/relationships" xmlns:p1510="http://schemas.microsoft.com/office/powerpoint/2015/10/main">
   <p1510:revLst>
-    <p1510:client id="{4ADF25BD-3409-486F-9EA1-5117B4103F87}" v="500" dt="2023-01-11T16:15:27.498"/>
+    <p1510:client id="{0399D419-9F62-4D32-B4D6-785E03637ADB}" v="96" dt="2023-01-14T14:52:29.768"/>
   </p1510:revLst>
 </p1510:revInfo>
 </file>
@@ -2717,6 +2718,748 @@
             <pc:docMk/>
             <pc:sldMk cId="1789976791" sldId="274"/>
             <ac:picMk id="12" creationId="{5A0C48E1-5D73-F3D7-0FB4-D749D6806669}"/>
+          </ac:picMkLst>
+        </pc:picChg>
+      </pc:sldChg>
+    </pc:docChg>
+  </pc:docChgLst>
+  <pc:docChgLst>
+    <pc:chgData name="Marine BAYET" userId="d4b4ad781415c63a" providerId="LiveId" clId="{0399D419-9F62-4D32-B4D6-785E03637ADB}"/>
+    <pc:docChg chg="undo custSel addSld delSld modSld">
+      <pc:chgData name="Marine BAYET" userId="d4b4ad781415c63a" providerId="LiveId" clId="{0399D419-9F62-4D32-B4D6-785E03637ADB}" dt="2023-01-14T14:52:39.744" v="288" actId="196"/>
+      <pc:docMkLst>
+        <pc:docMk/>
+      </pc:docMkLst>
+      <pc:sldChg chg="addSp delSp modSp mod">
+        <pc:chgData name="Marine BAYET" userId="d4b4ad781415c63a" providerId="LiveId" clId="{0399D419-9F62-4D32-B4D6-785E03637ADB}" dt="2023-01-14T14:25:00.945" v="166" actId="164"/>
+        <pc:sldMkLst>
+          <pc:docMk/>
+          <pc:sldMk cId="4180376292" sldId="270"/>
+        </pc:sldMkLst>
+        <pc:spChg chg="add mod">
+          <ac:chgData name="Marine BAYET" userId="d4b4ad781415c63a" providerId="LiveId" clId="{0399D419-9F62-4D32-B4D6-785E03637ADB}" dt="2023-01-14T14:22:31.927" v="153" actId="164"/>
+          <ac:spMkLst>
+            <pc:docMk/>
+            <pc:sldMk cId="4180376292" sldId="270"/>
+            <ac:spMk id="2" creationId="{B701401A-39E0-AA96-C055-6A55DCDA14A4}"/>
+          </ac:spMkLst>
+        </pc:spChg>
+        <pc:spChg chg="add mod ord">
+          <ac:chgData name="Marine BAYET" userId="d4b4ad781415c63a" providerId="LiveId" clId="{0399D419-9F62-4D32-B4D6-785E03637ADB}" dt="2023-01-14T14:22:55.177" v="155" actId="164"/>
+          <ac:spMkLst>
+            <pc:docMk/>
+            <pc:sldMk cId="4180376292" sldId="270"/>
+            <ac:spMk id="38" creationId="{6F927A24-A113-E9B7-59EA-682CCDC1A3CD}"/>
+          </ac:spMkLst>
+        </pc:spChg>
+        <pc:spChg chg="add mod ord">
+          <ac:chgData name="Marine BAYET" userId="d4b4ad781415c63a" providerId="LiveId" clId="{0399D419-9F62-4D32-B4D6-785E03637ADB}" dt="2023-01-14T14:23:53.371" v="158" actId="164"/>
+          <ac:spMkLst>
+            <pc:docMk/>
+            <pc:sldMk cId="4180376292" sldId="270"/>
+            <ac:spMk id="41" creationId="{FFE4059A-4686-5960-F913-0C0C36B0CF59}"/>
+          </ac:spMkLst>
+        </pc:spChg>
+        <pc:spChg chg="add mod ord">
+          <ac:chgData name="Marine BAYET" userId="d4b4ad781415c63a" providerId="LiveId" clId="{0399D419-9F62-4D32-B4D6-785E03637ADB}" dt="2023-01-14T14:24:15.516" v="160" actId="164"/>
+          <ac:spMkLst>
+            <pc:docMk/>
+            <pc:sldMk cId="4180376292" sldId="270"/>
+            <ac:spMk id="43" creationId="{B7567EE3-B6D0-075B-36EC-C9640B2362AD}"/>
+          </ac:spMkLst>
+        </pc:spChg>
+        <pc:spChg chg="add mod ord">
+          <ac:chgData name="Marine BAYET" userId="d4b4ad781415c63a" providerId="LiveId" clId="{0399D419-9F62-4D32-B4D6-785E03637ADB}" dt="2023-01-14T14:24:24.933" v="162" actId="164"/>
+          <ac:spMkLst>
+            <pc:docMk/>
+            <pc:sldMk cId="4180376292" sldId="270"/>
+            <ac:spMk id="45" creationId="{71A878E6-3488-8B75-0D0A-7071691997EB}"/>
+          </ac:spMkLst>
+        </pc:spChg>
+        <pc:spChg chg="add mod ord">
+          <ac:chgData name="Marine BAYET" userId="d4b4ad781415c63a" providerId="LiveId" clId="{0399D419-9F62-4D32-B4D6-785E03637ADB}" dt="2023-01-14T14:24:40.581" v="164" actId="164"/>
+          <ac:spMkLst>
+            <pc:docMk/>
+            <pc:sldMk cId="4180376292" sldId="270"/>
+            <ac:spMk id="47" creationId="{D70A2D3C-5BCB-3F4B-30D5-338701A70232}"/>
+          </ac:spMkLst>
+        </pc:spChg>
+        <pc:spChg chg="add mod">
+          <ac:chgData name="Marine BAYET" userId="d4b4ad781415c63a" providerId="LiveId" clId="{0399D419-9F62-4D32-B4D6-785E03637ADB}" dt="2023-01-14T14:24:49.850" v="165" actId="164"/>
+          <ac:spMkLst>
+            <pc:docMk/>
+            <pc:sldMk cId="4180376292" sldId="270"/>
+            <ac:spMk id="49" creationId="{321CE86D-E1B9-2C93-BC4B-EE3667654F29}"/>
+          </ac:spMkLst>
+        </pc:spChg>
+        <pc:spChg chg="add mod">
+          <ac:chgData name="Marine BAYET" userId="d4b4ad781415c63a" providerId="LiveId" clId="{0399D419-9F62-4D32-B4D6-785E03637ADB}" dt="2023-01-14T14:25:00.945" v="166" actId="164"/>
+          <ac:spMkLst>
+            <pc:docMk/>
+            <pc:sldMk cId="4180376292" sldId="270"/>
+            <ac:spMk id="51" creationId="{C428E198-C6CF-16C7-DBEC-B9C8AB17BA8E}"/>
+          </ac:spMkLst>
+        </pc:spChg>
+        <pc:grpChg chg="add del mod">
+          <ac:chgData name="Marine BAYET" userId="d4b4ad781415c63a" providerId="LiveId" clId="{0399D419-9F62-4D32-B4D6-785E03637ADB}" dt="2023-01-14T14:16:00.577" v="30" actId="165"/>
+          <ac:grpSpMkLst>
+            <pc:docMk/>
+            <pc:sldMk cId="4180376292" sldId="270"/>
+            <ac:grpSpMk id="29" creationId="{581020EF-BBA6-BD97-10D2-D533AC7A610F}"/>
+          </ac:grpSpMkLst>
+        </pc:grpChg>
+        <pc:grpChg chg="del">
+          <ac:chgData name="Marine BAYET" userId="d4b4ad781415c63a" providerId="LiveId" clId="{0399D419-9F62-4D32-B4D6-785E03637ADB}" dt="2023-01-14T14:16:07.447" v="31" actId="165"/>
+          <ac:grpSpMkLst>
+            <pc:docMk/>
+            <pc:sldMk cId="4180376292" sldId="270"/>
+            <ac:grpSpMk id="30" creationId="{8BBE405A-A6C9-563D-2CAD-A393342BAC32}"/>
+          </ac:grpSpMkLst>
+        </pc:grpChg>
+        <pc:grpChg chg="del">
+          <ac:chgData name="Marine BAYET" userId="d4b4ad781415c63a" providerId="LiveId" clId="{0399D419-9F62-4D32-B4D6-785E03637ADB}" dt="2023-01-14T14:16:07.447" v="31" actId="165"/>
+          <ac:grpSpMkLst>
+            <pc:docMk/>
+            <pc:sldMk cId="4180376292" sldId="270"/>
+            <ac:grpSpMk id="31" creationId="{4E5A7E7E-0215-E478-0D96-8DF34C3FA399}"/>
+          </ac:grpSpMkLst>
+        </pc:grpChg>
+        <pc:grpChg chg="del">
+          <ac:chgData name="Marine BAYET" userId="d4b4ad781415c63a" providerId="LiveId" clId="{0399D419-9F62-4D32-B4D6-785E03637ADB}" dt="2023-01-14T14:16:07.447" v="31" actId="165"/>
+          <ac:grpSpMkLst>
+            <pc:docMk/>
+            <pc:sldMk cId="4180376292" sldId="270"/>
+            <ac:grpSpMk id="33" creationId="{694CD2DD-6FC1-368D-9584-ACF81D6959E6}"/>
+          </ac:grpSpMkLst>
+        </pc:grpChg>
+        <pc:grpChg chg="del">
+          <ac:chgData name="Marine BAYET" userId="d4b4ad781415c63a" providerId="LiveId" clId="{0399D419-9F62-4D32-B4D6-785E03637ADB}" dt="2023-01-14T14:16:07.447" v="31" actId="165"/>
+          <ac:grpSpMkLst>
+            <pc:docMk/>
+            <pc:sldMk cId="4180376292" sldId="270"/>
+            <ac:grpSpMk id="34" creationId="{84C3A43D-2C06-EF1D-C6B9-F068D39B4091}"/>
+          </ac:grpSpMkLst>
+        </pc:grpChg>
+        <pc:grpChg chg="del">
+          <ac:chgData name="Marine BAYET" userId="d4b4ad781415c63a" providerId="LiveId" clId="{0399D419-9F62-4D32-B4D6-785E03637ADB}" dt="2023-01-14T14:16:07.447" v="31" actId="165"/>
+          <ac:grpSpMkLst>
+            <pc:docMk/>
+            <pc:sldMk cId="4180376292" sldId="270"/>
+            <ac:grpSpMk id="35" creationId="{ADD7F4EA-3DEA-4BE0-B113-ED678E62DFB6}"/>
+          </ac:grpSpMkLst>
+        </pc:grpChg>
+        <pc:grpChg chg="add mod">
+          <ac:chgData name="Marine BAYET" userId="d4b4ad781415c63a" providerId="LiveId" clId="{0399D419-9F62-4D32-B4D6-785E03637ADB}" dt="2023-01-14T14:22:31.927" v="153" actId="164"/>
+          <ac:grpSpMkLst>
+            <pc:docMk/>
+            <pc:sldMk cId="4180376292" sldId="270"/>
+            <ac:grpSpMk id="53" creationId="{102ABEE5-4B0B-EB4C-4EEA-C5BC629CC960}"/>
+          </ac:grpSpMkLst>
+        </pc:grpChg>
+        <pc:grpChg chg="add mod">
+          <ac:chgData name="Marine BAYET" userId="d4b4ad781415c63a" providerId="LiveId" clId="{0399D419-9F62-4D32-B4D6-785E03637ADB}" dt="2023-01-14T14:22:55.177" v="155" actId="164"/>
+          <ac:grpSpMkLst>
+            <pc:docMk/>
+            <pc:sldMk cId="4180376292" sldId="270"/>
+            <ac:grpSpMk id="54" creationId="{8FFAB02E-D7B9-0AAE-C418-1EC7D91614A7}"/>
+          </ac:grpSpMkLst>
+        </pc:grpChg>
+        <pc:grpChg chg="add mod">
+          <ac:chgData name="Marine BAYET" userId="d4b4ad781415c63a" providerId="LiveId" clId="{0399D419-9F62-4D32-B4D6-785E03637ADB}" dt="2023-01-14T14:23:53.371" v="158" actId="164"/>
+          <ac:grpSpMkLst>
+            <pc:docMk/>
+            <pc:sldMk cId="4180376292" sldId="270"/>
+            <ac:grpSpMk id="55" creationId="{15B3F44C-87E0-BD02-83A1-179BC92C2D06}"/>
+          </ac:grpSpMkLst>
+        </pc:grpChg>
+        <pc:grpChg chg="add mod">
+          <ac:chgData name="Marine BAYET" userId="d4b4ad781415c63a" providerId="LiveId" clId="{0399D419-9F62-4D32-B4D6-785E03637ADB}" dt="2023-01-14T14:24:15.516" v="160" actId="164"/>
+          <ac:grpSpMkLst>
+            <pc:docMk/>
+            <pc:sldMk cId="4180376292" sldId="270"/>
+            <ac:grpSpMk id="56" creationId="{093D39C7-48B8-7A2D-AC22-BB73AC0B21F5}"/>
+          </ac:grpSpMkLst>
+        </pc:grpChg>
+        <pc:grpChg chg="add mod">
+          <ac:chgData name="Marine BAYET" userId="d4b4ad781415c63a" providerId="LiveId" clId="{0399D419-9F62-4D32-B4D6-785E03637ADB}" dt="2023-01-14T14:24:24.933" v="162" actId="164"/>
+          <ac:grpSpMkLst>
+            <pc:docMk/>
+            <pc:sldMk cId="4180376292" sldId="270"/>
+            <ac:grpSpMk id="57" creationId="{E6C3B5CB-5202-5326-52E0-3ACCD151D713}"/>
+          </ac:grpSpMkLst>
+        </pc:grpChg>
+        <pc:grpChg chg="add mod">
+          <ac:chgData name="Marine BAYET" userId="d4b4ad781415c63a" providerId="LiveId" clId="{0399D419-9F62-4D32-B4D6-785E03637ADB}" dt="2023-01-14T14:24:40.581" v="164" actId="164"/>
+          <ac:grpSpMkLst>
+            <pc:docMk/>
+            <pc:sldMk cId="4180376292" sldId="270"/>
+            <ac:grpSpMk id="58" creationId="{511DC13A-D86D-C3A5-3EBE-3571AF2BC9CB}"/>
+          </ac:grpSpMkLst>
+        </pc:grpChg>
+        <pc:grpChg chg="add mod">
+          <ac:chgData name="Marine BAYET" userId="d4b4ad781415c63a" providerId="LiveId" clId="{0399D419-9F62-4D32-B4D6-785E03637ADB}" dt="2023-01-14T14:24:49.850" v="165" actId="164"/>
+          <ac:grpSpMkLst>
+            <pc:docMk/>
+            <pc:sldMk cId="4180376292" sldId="270"/>
+            <ac:grpSpMk id="59" creationId="{38F2E2EB-A669-4782-B05C-337A968D6A33}"/>
+          </ac:grpSpMkLst>
+        </pc:grpChg>
+        <pc:grpChg chg="add mod">
+          <ac:chgData name="Marine BAYET" userId="d4b4ad781415c63a" providerId="LiveId" clId="{0399D419-9F62-4D32-B4D6-785E03637ADB}" dt="2023-01-14T14:25:00.945" v="166" actId="164"/>
+          <ac:grpSpMkLst>
+            <pc:docMk/>
+            <pc:sldMk cId="4180376292" sldId="270"/>
+            <ac:grpSpMk id="60" creationId="{A8F4ABCE-0B69-5976-6F1A-EE189AD9E69F}"/>
+          </ac:grpSpMkLst>
+        </pc:grpChg>
+        <pc:picChg chg="add del mod topLvl">
+          <ac:chgData name="Marine BAYET" userId="d4b4ad781415c63a" providerId="LiveId" clId="{0399D419-9F62-4D32-B4D6-785E03637ADB}" dt="2023-01-14T14:22:31.927" v="153" actId="164"/>
+          <ac:picMkLst>
+            <pc:docMk/>
+            <pc:sldMk cId="4180376292" sldId="270"/>
+            <ac:picMk id="14" creationId="{B21D91EA-9601-5593-3EA1-1DD4863970C5}"/>
+          </ac:picMkLst>
+        </pc:picChg>
+        <pc:picChg chg="add del mod topLvl">
+          <ac:chgData name="Marine BAYET" userId="d4b4ad781415c63a" providerId="LiveId" clId="{0399D419-9F62-4D32-B4D6-785E03637ADB}" dt="2023-01-14T14:22:55.177" v="155" actId="164"/>
+          <ac:picMkLst>
+            <pc:docMk/>
+            <pc:sldMk cId="4180376292" sldId="270"/>
+            <ac:picMk id="15" creationId="{31F6879F-4A00-0082-32E2-25453464D6A6}"/>
+          </ac:picMkLst>
+        </pc:picChg>
+        <pc:picChg chg="mod topLvl">
+          <ac:chgData name="Marine BAYET" userId="d4b4ad781415c63a" providerId="LiveId" clId="{0399D419-9F62-4D32-B4D6-785E03637ADB}" dt="2023-01-14T14:23:53.371" v="158" actId="164"/>
+          <ac:picMkLst>
+            <pc:docMk/>
+            <pc:sldMk cId="4180376292" sldId="270"/>
+            <ac:picMk id="16" creationId="{AA509538-315A-F877-A4C0-B85B878D61E3}"/>
+          </ac:picMkLst>
+        </pc:picChg>
+        <pc:picChg chg="mod">
+          <ac:chgData name="Marine BAYET" userId="d4b4ad781415c63a" providerId="LiveId" clId="{0399D419-9F62-4D32-B4D6-785E03637ADB}" dt="2023-01-14T14:24:15.516" v="160" actId="164"/>
+          <ac:picMkLst>
+            <pc:docMk/>
+            <pc:sldMk cId="4180376292" sldId="270"/>
+            <ac:picMk id="17" creationId="{DC648DDC-A70F-FF61-2A6E-2745C7CC9C0D}"/>
+          </ac:picMkLst>
+        </pc:picChg>
+        <pc:picChg chg="mod topLvl">
+          <ac:chgData name="Marine BAYET" userId="d4b4ad781415c63a" providerId="LiveId" clId="{0399D419-9F62-4D32-B4D6-785E03637ADB}" dt="2023-01-14T14:24:24.933" v="162" actId="164"/>
+          <ac:picMkLst>
+            <pc:docMk/>
+            <pc:sldMk cId="4180376292" sldId="270"/>
+            <ac:picMk id="18" creationId="{FFD0E026-2C63-A2C7-D5CD-A0EF7F3897CD}"/>
+          </ac:picMkLst>
+        </pc:picChg>
+        <pc:picChg chg="mod topLvl">
+          <ac:chgData name="Marine BAYET" userId="d4b4ad781415c63a" providerId="LiveId" clId="{0399D419-9F62-4D32-B4D6-785E03637ADB}" dt="2023-01-14T14:24:40.581" v="164" actId="164"/>
+          <ac:picMkLst>
+            <pc:docMk/>
+            <pc:sldMk cId="4180376292" sldId="270"/>
+            <ac:picMk id="19" creationId="{58CC56AD-B1C6-532B-59E3-7CF84A3991A1}"/>
+          </ac:picMkLst>
+        </pc:picChg>
+        <pc:picChg chg="mod topLvl">
+          <ac:chgData name="Marine BAYET" userId="d4b4ad781415c63a" providerId="LiveId" clId="{0399D419-9F62-4D32-B4D6-785E03637ADB}" dt="2023-01-14T14:24:49.850" v="165" actId="164"/>
+          <ac:picMkLst>
+            <pc:docMk/>
+            <pc:sldMk cId="4180376292" sldId="270"/>
+            <ac:picMk id="20" creationId="{1E273A9D-0234-FC59-0635-3CB19CF4DB4D}"/>
+          </ac:picMkLst>
+        </pc:picChg>
+        <pc:picChg chg="mod">
+          <ac:chgData name="Marine BAYET" userId="d4b4ad781415c63a" providerId="LiveId" clId="{0399D419-9F62-4D32-B4D6-785E03637ADB}" dt="2023-01-14T14:25:00.945" v="166" actId="164"/>
+          <ac:picMkLst>
+            <pc:docMk/>
+            <pc:sldMk cId="4180376292" sldId="270"/>
+            <ac:picMk id="21" creationId="{5DA0DC77-42E9-AB31-77B0-F66DA56A154A}"/>
+          </ac:picMkLst>
+        </pc:picChg>
+        <pc:picChg chg="del mod topLvl">
+          <ac:chgData name="Marine BAYET" userId="d4b4ad781415c63a" providerId="LiveId" clId="{0399D419-9F62-4D32-B4D6-785E03637ADB}" dt="2023-01-14T14:17:53.950" v="67" actId="478"/>
+          <ac:picMkLst>
+            <pc:docMk/>
+            <pc:sldMk cId="4180376292" sldId="270"/>
+            <ac:picMk id="22" creationId="{86CC6CDA-F2A7-4852-C0B5-EB36F308F677}"/>
+          </ac:picMkLst>
+        </pc:picChg>
+        <pc:picChg chg="del mod topLvl">
+          <ac:chgData name="Marine BAYET" userId="d4b4ad781415c63a" providerId="LiveId" clId="{0399D419-9F62-4D32-B4D6-785E03637ADB}" dt="2023-01-14T14:17:53.950" v="67" actId="478"/>
+          <ac:picMkLst>
+            <pc:docMk/>
+            <pc:sldMk cId="4180376292" sldId="270"/>
+            <ac:picMk id="23" creationId="{05DD5754-396A-8C07-B8E6-F334394062A4}"/>
+          </ac:picMkLst>
+        </pc:picChg>
+        <pc:picChg chg="del mod topLvl">
+          <ac:chgData name="Marine BAYET" userId="d4b4ad781415c63a" providerId="LiveId" clId="{0399D419-9F62-4D32-B4D6-785E03637ADB}" dt="2023-01-14T14:17:53.950" v="67" actId="478"/>
+          <ac:picMkLst>
+            <pc:docMk/>
+            <pc:sldMk cId="4180376292" sldId="270"/>
+            <ac:picMk id="24" creationId="{88C47114-175F-8371-BC6A-808824F2EB50}"/>
+          </ac:picMkLst>
+        </pc:picChg>
+        <pc:picChg chg="del">
+          <ac:chgData name="Marine BAYET" userId="d4b4ad781415c63a" providerId="LiveId" clId="{0399D419-9F62-4D32-B4D6-785E03637ADB}" dt="2023-01-14T14:17:53.950" v="67" actId="478"/>
+          <ac:picMkLst>
+            <pc:docMk/>
+            <pc:sldMk cId="4180376292" sldId="270"/>
+            <ac:picMk id="25" creationId="{0A5AAF80-5363-89B2-DB17-00C879E1B781}"/>
+          </ac:picMkLst>
+        </pc:picChg>
+        <pc:picChg chg="del mod topLvl">
+          <ac:chgData name="Marine BAYET" userId="d4b4ad781415c63a" providerId="LiveId" clId="{0399D419-9F62-4D32-B4D6-785E03637ADB}" dt="2023-01-14T14:17:53.950" v="67" actId="478"/>
+          <ac:picMkLst>
+            <pc:docMk/>
+            <pc:sldMk cId="4180376292" sldId="270"/>
+            <ac:picMk id="26" creationId="{63C64A6F-59A2-6065-8344-96A270261A5B}"/>
+          </ac:picMkLst>
+        </pc:picChg>
+        <pc:picChg chg="del mod topLvl">
+          <ac:chgData name="Marine BAYET" userId="d4b4ad781415c63a" providerId="LiveId" clId="{0399D419-9F62-4D32-B4D6-785E03637ADB}" dt="2023-01-14T14:17:53.950" v="67" actId="478"/>
+          <ac:picMkLst>
+            <pc:docMk/>
+            <pc:sldMk cId="4180376292" sldId="270"/>
+            <ac:picMk id="27" creationId="{A63CB1C6-786F-4158-F729-C36822E0CAAF}"/>
+          </ac:picMkLst>
+        </pc:picChg>
+        <pc:picChg chg="del">
+          <ac:chgData name="Marine BAYET" userId="d4b4ad781415c63a" providerId="LiveId" clId="{0399D419-9F62-4D32-B4D6-785E03637ADB}" dt="2023-01-14T14:17:53.950" v="67" actId="478"/>
+          <ac:picMkLst>
+            <pc:docMk/>
+            <pc:sldMk cId="4180376292" sldId="270"/>
+            <ac:picMk id="28" creationId="{44667EE0-2F3A-7B5B-36B4-97FB1BE3FEF6}"/>
+          </ac:picMkLst>
+        </pc:picChg>
+        <pc:picChg chg="add del mod">
+          <ac:chgData name="Marine BAYET" userId="d4b4ad781415c63a" providerId="LiveId" clId="{0399D419-9F62-4D32-B4D6-785E03637ADB}" dt="2023-01-14T14:15:45.331" v="22" actId="478"/>
+          <ac:picMkLst>
+            <pc:docMk/>
+            <pc:sldMk cId="4180376292" sldId="270"/>
+            <ac:picMk id="32" creationId="{8A25FDF6-FF1E-FC2D-A5D6-F18D188064C6}"/>
+          </ac:picMkLst>
+        </pc:picChg>
+        <pc:picChg chg="add mod">
+          <ac:chgData name="Marine BAYET" userId="d4b4ad781415c63a" providerId="LiveId" clId="{0399D419-9F62-4D32-B4D6-785E03637ADB}" dt="2023-01-14T14:22:31.927" v="153" actId="164"/>
+          <ac:picMkLst>
+            <pc:docMk/>
+            <pc:sldMk cId="4180376292" sldId="270"/>
+            <ac:picMk id="37" creationId="{47FC092F-11A0-7363-2D3C-90BD87FD2723}"/>
+          </ac:picMkLst>
+        </pc:picChg>
+        <pc:picChg chg="add mod ord">
+          <ac:chgData name="Marine BAYET" userId="d4b4ad781415c63a" providerId="LiveId" clId="{0399D419-9F62-4D32-B4D6-785E03637ADB}" dt="2023-01-14T14:22:55.177" v="155" actId="164"/>
+          <ac:picMkLst>
+            <pc:docMk/>
+            <pc:sldMk cId="4180376292" sldId="270"/>
+            <ac:picMk id="39" creationId="{B0B88CDA-BBEE-B69E-856B-1D13FAD442D9}"/>
+          </ac:picMkLst>
+        </pc:picChg>
+        <pc:picChg chg="add del mod">
+          <ac:chgData name="Marine BAYET" userId="d4b4ad781415c63a" providerId="LiveId" clId="{0399D419-9F62-4D32-B4D6-785E03637ADB}" dt="2023-01-14T14:19:11.543" v="119" actId="478"/>
+          <ac:picMkLst>
+            <pc:docMk/>
+            <pc:sldMk cId="4180376292" sldId="270"/>
+            <ac:picMk id="40" creationId="{902E256E-BD12-718C-E023-034B20C061CF}"/>
+          </ac:picMkLst>
+        </pc:picChg>
+        <pc:picChg chg="add mod ord">
+          <ac:chgData name="Marine BAYET" userId="d4b4ad781415c63a" providerId="LiveId" clId="{0399D419-9F62-4D32-B4D6-785E03637ADB}" dt="2023-01-14T14:23:53.371" v="158" actId="164"/>
+          <ac:picMkLst>
+            <pc:docMk/>
+            <pc:sldMk cId="4180376292" sldId="270"/>
+            <ac:picMk id="42" creationId="{03220851-5E93-3004-0F9C-56F157B48F6D}"/>
+          </ac:picMkLst>
+        </pc:picChg>
+        <pc:picChg chg="add mod ord">
+          <ac:chgData name="Marine BAYET" userId="d4b4ad781415c63a" providerId="LiveId" clId="{0399D419-9F62-4D32-B4D6-785E03637ADB}" dt="2023-01-14T14:24:15.516" v="160" actId="164"/>
+          <ac:picMkLst>
+            <pc:docMk/>
+            <pc:sldMk cId="4180376292" sldId="270"/>
+            <ac:picMk id="44" creationId="{AFCBC6F6-32A8-AD2B-ECC9-EF1CB437F98D}"/>
+          </ac:picMkLst>
+        </pc:picChg>
+        <pc:picChg chg="add mod ord">
+          <ac:chgData name="Marine BAYET" userId="d4b4ad781415c63a" providerId="LiveId" clId="{0399D419-9F62-4D32-B4D6-785E03637ADB}" dt="2023-01-14T14:24:24.933" v="162" actId="164"/>
+          <ac:picMkLst>
+            <pc:docMk/>
+            <pc:sldMk cId="4180376292" sldId="270"/>
+            <ac:picMk id="46" creationId="{7B3EB970-3C96-6870-3746-B4616937B5B7}"/>
+          </ac:picMkLst>
+        </pc:picChg>
+        <pc:picChg chg="add mod ord">
+          <ac:chgData name="Marine BAYET" userId="d4b4ad781415c63a" providerId="LiveId" clId="{0399D419-9F62-4D32-B4D6-785E03637ADB}" dt="2023-01-14T14:24:40.581" v="164" actId="164"/>
+          <ac:picMkLst>
+            <pc:docMk/>
+            <pc:sldMk cId="4180376292" sldId="270"/>
+            <ac:picMk id="48" creationId="{393E7098-8726-5251-07F9-B6107B94E583}"/>
+          </ac:picMkLst>
+        </pc:picChg>
+        <pc:picChg chg="add mod">
+          <ac:chgData name="Marine BAYET" userId="d4b4ad781415c63a" providerId="LiveId" clId="{0399D419-9F62-4D32-B4D6-785E03637ADB}" dt="2023-01-14T14:24:49.850" v="165" actId="164"/>
+          <ac:picMkLst>
+            <pc:docMk/>
+            <pc:sldMk cId="4180376292" sldId="270"/>
+            <ac:picMk id="50" creationId="{0D583D31-6180-C0F6-21AE-C14E483D015B}"/>
+          </ac:picMkLst>
+        </pc:picChg>
+        <pc:picChg chg="add mod">
+          <ac:chgData name="Marine BAYET" userId="d4b4ad781415c63a" providerId="LiveId" clId="{0399D419-9F62-4D32-B4D6-785E03637ADB}" dt="2023-01-14T14:25:00.945" v="166" actId="164"/>
+          <ac:picMkLst>
+            <pc:docMk/>
+            <pc:sldMk cId="4180376292" sldId="270"/>
+            <ac:picMk id="52" creationId="{343021D2-4B1F-AEA8-D61C-91FCA6C2C53A}"/>
+          </ac:picMkLst>
+        </pc:picChg>
+        <pc:picChg chg="del mod topLvl">
+          <ac:chgData name="Marine BAYET" userId="d4b4ad781415c63a" providerId="LiveId" clId="{0399D419-9F62-4D32-B4D6-785E03637ADB}" dt="2023-01-14T14:16:23.692" v="35" actId="478"/>
+          <ac:picMkLst>
+            <pc:docMk/>
+            <pc:sldMk cId="4180376292" sldId="270"/>
+            <ac:picMk id="12292" creationId="{123F15A6-7574-AD77-415F-810AC8EA75F1}"/>
+          </ac:picMkLst>
+        </pc:picChg>
+      </pc:sldChg>
+      <pc:sldChg chg="addSp delSp modSp new mod">
+        <pc:chgData name="Marine BAYET" userId="d4b4ad781415c63a" providerId="LiveId" clId="{0399D419-9F62-4D32-B4D6-785E03637ADB}" dt="2023-01-14T14:52:39.744" v="288" actId="196"/>
+        <pc:sldMkLst>
+          <pc:docMk/>
+          <pc:sldMk cId="1733317260" sldId="275"/>
+        </pc:sldMkLst>
+        <pc:spChg chg="del">
+          <ac:chgData name="Marine BAYET" userId="d4b4ad781415c63a" providerId="LiveId" clId="{0399D419-9F62-4D32-B4D6-785E03637ADB}" dt="2023-01-14T14:38:42.144" v="253" actId="478"/>
+          <ac:spMkLst>
+            <pc:docMk/>
+            <pc:sldMk cId="1733317260" sldId="275"/>
+            <ac:spMk id="2" creationId="{5025CF76-B94A-7BD5-1910-CCC8D17A6B2B}"/>
+          </ac:spMkLst>
+        </pc:spChg>
+        <pc:spChg chg="del">
+          <ac:chgData name="Marine BAYET" userId="d4b4ad781415c63a" providerId="LiveId" clId="{0399D419-9F62-4D32-B4D6-785E03637ADB}" dt="2023-01-14T14:38:49.785" v="254"/>
+          <ac:spMkLst>
+            <pc:docMk/>
+            <pc:sldMk cId="1733317260" sldId="275"/>
+            <ac:spMk id="3" creationId="{9B29F9BE-A58B-9EE8-4F63-D23B42F61BB5}"/>
+          </ac:spMkLst>
+        </pc:spChg>
+        <pc:picChg chg="add mod">
+          <ac:chgData name="Marine BAYET" userId="d4b4ad781415c63a" providerId="LiveId" clId="{0399D419-9F62-4D32-B4D6-785E03637ADB}" dt="2023-01-14T14:40:04.981" v="279" actId="1076"/>
+          <ac:picMkLst>
+            <pc:docMk/>
+            <pc:sldMk cId="1733317260" sldId="275"/>
+            <ac:picMk id="5" creationId="{342513D9-4975-935D-2ED2-273C6DE15B89}"/>
+          </ac:picMkLst>
+        </pc:picChg>
+        <pc:picChg chg="add mod">
+          <ac:chgData name="Marine BAYET" userId="d4b4ad781415c63a" providerId="LiveId" clId="{0399D419-9F62-4D32-B4D6-785E03637ADB}" dt="2023-01-14T14:40:08.562" v="282" actId="1076"/>
+          <ac:picMkLst>
+            <pc:docMk/>
+            <pc:sldMk cId="1733317260" sldId="275"/>
+            <ac:picMk id="7" creationId="{5BDD7DE8-2CD1-4ABD-5055-2D7E197022E4}"/>
+          </ac:picMkLst>
+        </pc:picChg>
+        <pc:picChg chg="add mod">
+          <ac:chgData name="Marine BAYET" userId="d4b4ad781415c63a" providerId="LiveId" clId="{0399D419-9F62-4D32-B4D6-785E03637ADB}" dt="2023-01-14T14:40:07.493" v="281" actId="1076"/>
+          <ac:picMkLst>
+            <pc:docMk/>
+            <pc:sldMk cId="1733317260" sldId="275"/>
+            <ac:picMk id="9" creationId="{39CE6F83-89CE-A72B-2D7B-89DED82D2EAD}"/>
+          </ac:picMkLst>
+        </pc:picChg>
+        <pc:picChg chg="add mod">
+          <ac:chgData name="Marine BAYET" userId="d4b4ad781415c63a" providerId="LiveId" clId="{0399D419-9F62-4D32-B4D6-785E03637ADB}" dt="2023-01-14T14:40:09.475" v="283" actId="1076"/>
+          <ac:picMkLst>
+            <pc:docMk/>
+            <pc:sldMk cId="1733317260" sldId="275"/>
+            <ac:picMk id="11" creationId="{D561E9DD-8FE7-7457-5C32-0B7FBBE47918}"/>
+          </ac:picMkLst>
+        </pc:picChg>
+        <pc:picChg chg="add mod">
+          <ac:chgData name="Marine BAYET" userId="d4b4ad781415c63a" providerId="LiveId" clId="{0399D419-9F62-4D32-B4D6-785E03637ADB}" dt="2023-01-14T14:40:10.219" v="284" actId="1076"/>
+          <ac:picMkLst>
+            <pc:docMk/>
+            <pc:sldMk cId="1733317260" sldId="275"/>
+            <ac:picMk id="13" creationId="{A39654FE-1713-0BDE-2461-2EF098AA9B41}"/>
+          </ac:picMkLst>
+        </pc:picChg>
+        <pc:picChg chg="add mod">
+          <ac:chgData name="Marine BAYET" userId="d4b4ad781415c63a" providerId="LiveId" clId="{0399D419-9F62-4D32-B4D6-785E03637ADB}" dt="2023-01-14T14:40:11.227" v="285" actId="1076"/>
+          <ac:picMkLst>
+            <pc:docMk/>
+            <pc:sldMk cId="1733317260" sldId="275"/>
+            <ac:picMk id="15" creationId="{32626B01-253A-3A1A-79B8-D98B9868A1C1}"/>
+          </ac:picMkLst>
+        </pc:picChg>
+        <pc:picChg chg="add mod">
+          <ac:chgData name="Marine BAYET" userId="d4b4ad781415c63a" providerId="LiveId" clId="{0399D419-9F62-4D32-B4D6-785E03637ADB}" dt="2023-01-14T14:52:39.744" v="288" actId="196"/>
+          <ac:picMkLst>
+            <pc:docMk/>
+            <pc:sldMk cId="1733317260" sldId="275"/>
+            <ac:picMk id="16" creationId="{DF362733-E550-7F92-7808-8070F1126A14}"/>
+          </ac:picMkLst>
+        </pc:picChg>
+        <pc:picChg chg="add mod">
+          <ac:chgData name="Marine BAYET" userId="d4b4ad781415c63a" providerId="LiveId" clId="{0399D419-9F62-4D32-B4D6-785E03637ADB}" dt="2023-01-14T14:52:39.744" v="288" actId="196"/>
+          <ac:picMkLst>
+            <pc:docMk/>
+            <pc:sldMk cId="1733317260" sldId="275"/>
+            <ac:picMk id="17" creationId="{63ABC971-849D-E80F-D5E9-4C7F973A9C50}"/>
+          </ac:picMkLst>
+        </pc:picChg>
+        <pc:picChg chg="add mod">
+          <ac:chgData name="Marine BAYET" userId="d4b4ad781415c63a" providerId="LiveId" clId="{0399D419-9F62-4D32-B4D6-785E03637ADB}" dt="2023-01-14T14:52:39.744" v="288" actId="196"/>
+          <ac:picMkLst>
+            <pc:docMk/>
+            <pc:sldMk cId="1733317260" sldId="275"/>
+            <ac:picMk id="18" creationId="{7F73CE16-A912-188A-6033-F0A913757854}"/>
+          </ac:picMkLst>
+        </pc:picChg>
+        <pc:picChg chg="add mod">
+          <ac:chgData name="Marine BAYET" userId="d4b4ad781415c63a" providerId="LiveId" clId="{0399D419-9F62-4D32-B4D6-785E03637ADB}" dt="2023-01-14T14:52:39.744" v="288" actId="196"/>
+          <ac:picMkLst>
+            <pc:docMk/>
+            <pc:sldMk cId="1733317260" sldId="275"/>
+            <ac:picMk id="19" creationId="{55CF8F9D-69CB-BD7E-C8FA-4C7721A22883}"/>
+          </ac:picMkLst>
+        </pc:picChg>
+        <pc:picChg chg="add mod">
+          <ac:chgData name="Marine BAYET" userId="d4b4ad781415c63a" providerId="LiveId" clId="{0399D419-9F62-4D32-B4D6-785E03637ADB}" dt="2023-01-14T14:52:39.744" v="288" actId="196"/>
+          <ac:picMkLst>
+            <pc:docMk/>
+            <pc:sldMk cId="1733317260" sldId="275"/>
+            <ac:picMk id="20" creationId="{09DF1921-BF8B-EEEC-8899-4D07A45C3504}"/>
+          </ac:picMkLst>
+        </pc:picChg>
+        <pc:picChg chg="add mod">
+          <ac:chgData name="Marine BAYET" userId="d4b4ad781415c63a" providerId="LiveId" clId="{0399D419-9F62-4D32-B4D6-785E03637ADB}" dt="2023-01-14T14:52:39.744" v="288" actId="196"/>
+          <ac:picMkLst>
+            <pc:docMk/>
+            <pc:sldMk cId="1733317260" sldId="275"/>
+            <ac:picMk id="21" creationId="{588C1A51-9F8A-0BE0-1736-8E77C8B12984}"/>
+          </ac:picMkLst>
+        </pc:picChg>
+      </pc:sldChg>
+      <pc:sldChg chg="addSp delSp modSp new del mod">
+        <pc:chgData name="Marine BAYET" userId="d4b4ad781415c63a" providerId="LiveId" clId="{0399D419-9F62-4D32-B4D6-785E03637ADB}" dt="2023-01-14T14:38:37.723" v="251" actId="680"/>
+        <pc:sldMkLst>
+          <pc:docMk/>
+          <pc:sldMk cId="3838309396" sldId="275"/>
+        </pc:sldMkLst>
+        <pc:spChg chg="add del">
+          <ac:chgData name="Marine BAYET" userId="d4b4ad781415c63a" providerId="LiveId" clId="{0399D419-9F62-4D32-B4D6-785E03637ADB}" dt="2023-01-14T14:38:37.212" v="250" actId="478"/>
+          <ac:spMkLst>
+            <pc:docMk/>
+            <pc:sldMk cId="3838309396" sldId="275"/>
+            <ac:spMk id="2" creationId="{A3F93C0F-0FE0-5972-DF4D-2CC3D0E12BD0}"/>
+          </ac:spMkLst>
+        </pc:spChg>
+        <pc:spChg chg="add del">
+          <ac:chgData name="Marine BAYET" userId="d4b4ad781415c63a" providerId="LiveId" clId="{0399D419-9F62-4D32-B4D6-785E03637ADB}" dt="2023-01-14T14:38:37.185" v="249" actId="478"/>
+          <ac:spMkLst>
+            <pc:docMk/>
+            <pc:sldMk cId="3838309396" sldId="275"/>
+            <ac:spMk id="3" creationId="{29BC49E9-6859-FE61-5D1B-C07D1C3CEE18}"/>
+          </ac:spMkLst>
+        </pc:spChg>
+        <pc:picChg chg="add del mod">
+          <ac:chgData name="Marine BAYET" userId="d4b4ad781415c63a" providerId="LiveId" clId="{0399D419-9F62-4D32-B4D6-785E03637ADB}" dt="2023-01-14T14:38:37.052" v="246"/>
+          <ac:picMkLst>
+            <pc:docMk/>
+            <pc:sldMk cId="3838309396" sldId="275"/>
+            <ac:picMk id="5" creationId="{F326D89B-62E8-FF36-DDFA-D91CD1E30A31}"/>
+          </ac:picMkLst>
+        </pc:picChg>
+        <pc:picChg chg="add del mod">
+          <ac:chgData name="Marine BAYET" userId="d4b4ad781415c63a" providerId="LiveId" clId="{0399D419-9F62-4D32-B4D6-785E03637ADB}" dt="2023-01-14T14:38:37.052" v="246"/>
+          <ac:picMkLst>
+            <pc:docMk/>
+            <pc:sldMk cId="3838309396" sldId="275"/>
+            <ac:picMk id="7" creationId="{2203CCE4-9E36-2093-3443-91A30DB8F31D}"/>
+          </ac:picMkLst>
+        </pc:picChg>
+        <pc:picChg chg="add del mod">
+          <ac:chgData name="Marine BAYET" userId="d4b4ad781415c63a" providerId="LiveId" clId="{0399D419-9F62-4D32-B4D6-785E03637ADB}" dt="2023-01-14T14:38:37.052" v="246"/>
+          <ac:picMkLst>
+            <pc:docMk/>
+            <pc:sldMk cId="3838309396" sldId="275"/>
+            <ac:picMk id="9" creationId="{EA1E988D-1B6D-4B1D-43A4-78689819E7D3}"/>
+          </ac:picMkLst>
+        </pc:picChg>
+        <pc:picChg chg="add del mod">
+          <ac:chgData name="Marine BAYET" userId="d4b4ad781415c63a" providerId="LiveId" clId="{0399D419-9F62-4D32-B4D6-785E03637ADB}" dt="2023-01-14T14:38:37.052" v="246"/>
+          <ac:picMkLst>
+            <pc:docMk/>
+            <pc:sldMk cId="3838309396" sldId="275"/>
+            <ac:picMk id="11" creationId="{08DD9ADB-847E-80D5-8E1A-FDEAE321CDAE}"/>
+          </ac:picMkLst>
+        </pc:picChg>
+        <pc:picChg chg="add del mod">
+          <ac:chgData name="Marine BAYET" userId="d4b4ad781415c63a" providerId="LiveId" clId="{0399D419-9F62-4D32-B4D6-785E03637ADB}" dt="2023-01-14T14:38:37.052" v="246"/>
+          <ac:picMkLst>
+            <pc:docMk/>
+            <pc:sldMk cId="3838309396" sldId="275"/>
+            <ac:picMk id="13" creationId="{B4F72142-2EBB-1275-32B0-9B65EFE9A357}"/>
+          </ac:picMkLst>
+        </pc:picChg>
+        <pc:picChg chg="add del mod">
+          <ac:chgData name="Marine BAYET" userId="d4b4ad781415c63a" providerId="LiveId" clId="{0399D419-9F62-4D32-B4D6-785E03637ADB}" dt="2023-01-14T14:38:37.052" v="246"/>
+          <ac:picMkLst>
+            <pc:docMk/>
+            <pc:sldMk cId="3838309396" sldId="275"/>
+            <ac:picMk id="15" creationId="{D492044D-84BD-CF32-7BBA-18B3ECA4857B}"/>
+          </ac:picMkLst>
+        </pc:picChg>
+        <pc:picChg chg="add del mod">
+          <ac:chgData name="Marine BAYET" userId="d4b4ad781415c63a" providerId="LiveId" clId="{0399D419-9F62-4D32-B4D6-785E03637ADB}" dt="2023-01-14T14:38:37.052" v="246"/>
+          <ac:picMkLst>
+            <pc:docMk/>
+            <pc:sldMk cId="3838309396" sldId="275"/>
+            <ac:picMk id="17" creationId="{ACDA176F-F07A-1860-3FAC-B0DC6A612F5C}"/>
+          </ac:picMkLst>
+        </pc:picChg>
+        <pc:picChg chg="add del mod">
+          <ac:chgData name="Marine BAYET" userId="d4b4ad781415c63a" providerId="LiveId" clId="{0399D419-9F62-4D32-B4D6-785E03637ADB}" dt="2023-01-14T14:38:37.052" v="246"/>
+          <ac:picMkLst>
+            <pc:docMk/>
+            <pc:sldMk cId="3838309396" sldId="275"/>
+            <ac:picMk id="19" creationId="{C3EAA96C-2771-F5AE-6F7B-19766A8054CB}"/>
+          </ac:picMkLst>
+        </pc:picChg>
+        <pc:picChg chg="add del mod">
+          <ac:chgData name="Marine BAYET" userId="d4b4ad781415c63a" providerId="LiveId" clId="{0399D419-9F62-4D32-B4D6-785E03637ADB}" dt="2023-01-14T14:38:37.052" v="246"/>
+          <ac:picMkLst>
+            <pc:docMk/>
+            <pc:sldMk cId="3838309396" sldId="275"/>
+            <ac:picMk id="21" creationId="{86693AD4-C2AB-BA82-5474-C3AC40020AC0}"/>
+          </ac:picMkLst>
+        </pc:picChg>
+        <pc:picChg chg="add del mod">
+          <ac:chgData name="Marine BAYET" userId="d4b4ad781415c63a" providerId="LiveId" clId="{0399D419-9F62-4D32-B4D6-785E03637ADB}" dt="2023-01-14T14:38:37.052" v="246"/>
+          <ac:picMkLst>
+            <pc:docMk/>
+            <pc:sldMk cId="3838309396" sldId="275"/>
+            <ac:picMk id="23" creationId="{F53D7D95-72DB-0A97-D0D6-048DCFE1BB69}"/>
+          </ac:picMkLst>
+        </pc:picChg>
+        <pc:picChg chg="add del mod">
+          <ac:chgData name="Marine BAYET" userId="d4b4ad781415c63a" providerId="LiveId" clId="{0399D419-9F62-4D32-B4D6-785E03637ADB}" dt="2023-01-14T14:38:37.052" v="246"/>
+          <ac:picMkLst>
+            <pc:docMk/>
+            <pc:sldMk cId="3838309396" sldId="275"/>
+            <ac:picMk id="25" creationId="{81D9614E-BE8F-5060-28F4-1E728864BA62}"/>
+          </ac:picMkLst>
+        </pc:picChg>
+        <pc:picChg chg="add del mod">
+          <ac:chgData name="Marine BAYET" userId="d4b4ad781415c63a" providerId="LiveId" clId="{0399D419-9F62-4D32-B4D6-785E03637ADB}" dt="2023-01-14T14:38:37.052" v="246"/>
+          <ac:picMkLst>
+            <pc:docMk/>
+            <pc:sldMk cId="3838309396" sldId="275"/>
+            <ac:picMk id="27" creationId="{836639E9-58FF-C2F6-D050-04F8D881430D}"/>
+          </ac:picMkLst>
+        </pc:picChg>
+        <pc:picChg chg="add del mod">
+          <ac:chgData name="Marine BAYET" userId="d4b4ad781415c63a" providerId="LiveId" clId="{0399D419-9F62-4D32-B4D6-785E03637ADB}" dt="2023-01-14T14:38:37.052" v="246"/>
+          <ac:picMkLst>
+            <pc:docMk/>
+            <pc:sldMk cId="3838309396" sldId="275"/>
+            <ac:picMk id="29" creationId="{C71BD8CF-AA53-7E3C-836D-11707200CCE3}"/>
+          </ac:picMkLst>
+        </pc:picChg>
+        <pc:picChg chg="add del mod">
+          <ac:chgData name="Marine BAYET" userId="d4b4ad781415c63a" providerId="LiveId" clId="{0399D419-9F62-4D32-B4D6-785E03637ADB}" dt="2023-01-14T14:38:37.052" v="246"/>
+          <ac:picMkLst>
+            <pc:docMk/>
+            <pc:sldMk cId="3838309396" sldId="275"/>
+            <ac:picMk id="31" creationId="{5A1E496C-66C1-C7C3-6A86-722CB112984C}"/>
+          </ac:picMkLst>
+        </pc:picChg>
+        <pc:picChg chg="add del mod">
+          <ac:chgData name="Marine BAYET" userId="d4b4ad781415c63a" providerId="LiveId" clId="{0399D419-9F62-4D32-B4D6-785E03637ADB}" dt="2023-01-14T14:38:37.052" v="246"/>
+          <ac:picMkLst>
+            <pc:docMk/>
+            <pc:sldMk cId="3838309396" sldId="275"/>
+            <ac:picMk id="33" creationId="{D4B364D2-F2D5-2AFB-B091-D780E9DC04A8}"/>
+          </ac:picMkLst>
+        </pc:picChg>
+        <pc:picChg chg="add del mod">
+          <ac:chgData name="Marine BAYET" userId="d4b4ad781415c63a" providerId="LiveId" clId="{0399D419-9F62-4D32-B4D6-785E03637ADB}" dt="2023-01-14T14:38:37.052" v="246"/>
+          <ac:picMkLst>
+            <pc:docMk/>
+            <pc:sldMk cId="3838309396" sldId="275"/>
+            <ac:picMk id="35" creationId="{4300AE50-87C7-F2B5-8BEF-2FC986230396}"/>
+          </ac:picMkLst>
+        </pc:picChg>
+        <pc:picChg chg="add del mod">
+          <ac:chgData name="Marine BAYET" userId="d4b4ad781415c63a" providerId="LiveId" clId="{0399D419-9F62-4D32-B4D6-785E03637ADB}" dt="2023-01-14T14:38:37.052" v="246"/>
+          <ac:picMkLst>
+            <pc:docMk/>
+            <pc:sldMk cId="3838309396" sldId="275"/>
+            <ac:picMk id="37" creationId="{66AFC5E2-069F-9264-4C02-8BCE0BA62553}"/>
+          </ac:picMkLst>
+        </pc:picChg>
+        <pc:picChg chg="add del mod">
+          <ac:chgData name="Marine BAYET" userId="d4b4ad781415c63a" providerId="LiveId" clId="{0399D419-9F62-4D32-B4D6-785E03637ADB}" dt="2023-01-14T14:38:37.052" v="246"/>
+          <ac:picMkLst>
+            <pc:docMk/>
+            <pc:sldMk cId="3838309396" sldId="275"/>
+            <ac:picMk id="39" creationId="{DCF86548-EF7C-49B7-FC21-302041C03837}"/>
+          </ac:picMkLst>
+        </pc:picChg>
+        <pc:picChg chg="add del mod">
+          <ac:chgData name="Marine BAYET" userId="d4b4ad781415c63a" providerId="LiveId" clId="{0399D419-9F62-4D32-B4D6-785E03637ADB}" dt="2023-01-14T14:38:37.052" v="246"/>
+          <ac:picMkLst>
+            <pc:docMk/>
+            <pc:sldMk cId="3838309396" sldId="275"/>
+            <ac:picMk id="41" creationId="{58E5103A-A31C-873E-CB71-0C1BF42042D6}"/>
+          </ac:picMkLst>
+        </pc:picChg>
+        <pc:picChg chg="add del mod">
+          <ac:chgData name="Marine BAYET" userId="d4b4ad781415c63a" providerId="LiveId" clId="{0399D419-9F62-4D32-B4D6-785E03637ADB}" dt="2023-01-14T14:38:37.052" v="246"/>
+          <ac:picMkLst>
+            <pc:docMk/>
+            <pc:sldMk cId="3838309396" sldId="275"/>
+            <ac:picMk id="43" creationId="{4562C30E-D4DB-192E-16D8-082CBE7009C6}"/>
+          </ac:picMkLst>
+        </pc:picChg>
+        <pc:picChg chg="add del mod">
+          <ac:chgData name="Marine BAYET" userId="d4b4ad781415c63a" providerId="LiveId" clId="{0399D419-9F62-4D32-B4D6-785E03637ADB}" dt="2023-01-14T14:38:37.052" v="246"/>
+          <ac:picMkLst>
+            <pc:docMk/>
+            <pc:sldMk cId="3838309396" sldId="275"/>
+            <ac:picMk id="45" creationId="{73C4D20D-135B-E807-4338-A72E14899EE4}"/>
+          </ac:picMkLst>
+        </pc:picChg>
+        <pc:picChg chg="add del mod">
+          <ac:chgData name="Marine BAYET" userId="d4b4ad781415c63a" providerId="LiveId" clId="{0399D419-9F62-4D32-B4D6-785E03637ADB}" dt="2023-01-14T14:38:37.052" v="246"/>
+          <ac:picMkLst>
+            <pc:docMk/>
+            <pc:sldMk cId="3838309396" sldId="275"/>
+            <ac:picMk id="47" creationId="{F1E870AE-61FD-0169-6CC4-8AE57CD8DBB3}"/>
+          </ac:picMkLst>
+        </pc:picChg>
+        <pc:picChg chg="add del mod">
+          <ac:chgData name="Marine BAYET" userId="d4b4ad781415c63a" providerId="LiveId" clId="{0399D419-9F62-4D32-B4D6-785E03637ADB}" dt="2023-01-14T14:38:37.052" v="246"/>
+          <ac:picMkLst>
+            <pc:docMk/>
+            <pc:sldMk cId="3838309396" sldId="275"/>
+            <ac:picMk id="49" creationId="{AFEE7951-21EE-FC45-7BCC-DDC160AD9404}"/>
+          </ac:picMkLst>
+        </pc:picChg>
+        <pc:picChg chg="add del mod">
+          <ac:chgData name="Marine BAYET" userId="d4b4ad781415c63a" providerId="LiveId" clId="{0399D419-9F62-4D32-B4D6-785E03637ADB}" dt="2023-01-14T14:38:37.052" v="246"/>
+          <ac:picMkLst>
+            <pc:docMk/>
+            <pc:sldMk cId="3838309396" sldId="275"/>
+            <ac:picMk id="51" creationId="{5495318C-43A2-559F-DB4B-73D6EE0A1936}"/>
+          </ac:picMkLst>
+        </pc:picChg>
+        <pc:picChg chg="add del">
+          <ac:chgData name="Marine BAYET" userId="d4b4ad781415c63a" providerId="LiveId" clId="{0399D419-9F62-4D32-B4D6-785E03637ADB}" dt="2023-01-14T14:38:37.175" v="248"/>
+          <ac:picMkLst>
+            <pc:docMk/>
+            <pc:sldMk cId="3838309396" sldId="275"/>
+            <ac:picMk id="1026" creationId="{82DC0152-4C0A-9D75-2914-26949C3AFEA8}"/>
           </ac:picMkLst>
         </pc:picChg>
       </pc:sldChg>
@@ -2872,7 +3615,7 @@
           <a:p>
             <a:fld id="{B4E773C2-758D-45C6-BB5A-93E8C8649442}" type="datetimeFigureOut">
               <a:rPr lang="fr-FR" smtClean="0"/>
-              <a:t>11/01/2023</a:t>
+              <a:t>14/01/2023</a:t>
             </a:fld>
             <a:endParaRPr lang="fr-FR"/>
           </a:p>
@@ -3070,7 +3813,7 @@
           <a:p>
             <a:fld id="{B4E773C2-758D-45C6-BB5A-93E8C8649442}" type="datetimeFigureOut">
               <a:rPr lang="fr-FR" smtClean="0"/>
-              <a:t>11/01/2023</a:t>
+              <a:t>14/01/2023</a:t>
             </a:fld>
             <a:endParaRPr lang="fr-FR"/>
           </a:p>
@@ -3278,7 +4021,7 @@
           <a:p>
             <a:fld id="{B4E773C2-758D-45C6-BB5A-93E8C8649442}" type="datetimeFigureOut">
               <a:rPr lang="fr-FR" smtClean="0"/>
-              <a:t>11/01/2023</a:t>
+              <a:t>14/01/2023</a:t>
             </a:fld>
             <a:endParaRPr lang="fr-FR"/>
           </a:p>
@@ -3476,7 +4219,7 @@
           <a:p>
             <a:fld id="{B4E773C2-758D-45C6-BB5A-93E8C8649442}" type="datetimeFigureOut">
               <a:rPr lang="fr-FR" smtClean="0"/>
-              <a:t>11/01/2023</a:t>
+              <a:t>14/01/2023</a:t>
             </a:fld>
             <a:endParaRPr lang="fr-FR"/>
           </a:p>
@@ -3751,7 +4494,7 @@
           <a:p>
             <a:fld id="{B4E773C2-758D-45C6-BB5A-93E8C8649442}" type="datetimeFigureOut">
               <a:rPr lang="fr-FR" smtClean="0"/>
-              <a:t>11/01/2023</a:t>
+              <a:t>14/01/2023</a:t>
             </a:fld>
             <a:endParaRPr lang="fr-FR"/>
           </a:p>
@@ -4016,7 +4759,7 @@
           <a:p>
             <a:fld id="{B4E773C2-758D-45C6-BB5A-93E8C8649442}" type="datetimeFigureOut">
               <a:rPr lang="fr-FR" smtClean="0"/>
-              <a:t>11/01/2023</a:t>
+              <a:t>14/01/2023</a:t>
             </a:fld>
             <a:endParaRPr lang="fr-FR"/>
           </a:p>
@@ -4428,7 +5171,7 @@
           <a:p>
             <a:fld id="{B4E773C2-758D-45C6-BB5A-93E8C8649442}" type="datetimeFigureOut">
               <a:rPr lang="fr-FR" smtClean="0"/>
-              <a:t>11/01/2023</a:t>
+              <a:t>14/01/2023</a:t>
             </a:fld>
             <a:endParaRPr lang="fr-FR"/>
           </a:p>
@@ -4569,7 +5312,7 @@
           <a:p>
             <a:fld id="{B4E773C2-758D-45C6-BB5A-93E8C8649442}" type="datetimeFigureOut">
               <a:rPr lang="fr-FR" smtClean="0"/>
-              <a:t>11/01/2023</a:t>
+              <a:t>14/01/2023</a:t>
             </a:fld>
             <a:endParaRPr lang="fr-FR"/>
           </a:p>
@@ -4682,7 +5425,7 @@
           <a:p>
             <a:fld id="{B4E773C2-758D-45C6-BB5A-93E8C8649442}" type="datetimeFigureOut">
               <a:rPr lang="fr-FR" smtClean="0"/>
-              <a:t>11/01/2023</a:t>
+              <a:t>14/01/2023</a:t>
             </a:fld>
             <a:endParaRPr lang="fr-FR"/>
           </a:p>
@@ -4993,7 +5736,7 @@
           <a:p>
             <a:fld id="{B4E773C2-758D-45C6-BB5A-93E8C8649442}" type="datetimeFigureOut">
               <a:rPr lang="fr-FR" smtClean="0"/>
-              <a:t>11/01/2023</a:t>
+              <a:t>14/01/2023</a:t>
             </a:fld>
             <a:endParaRPr lang="fr-FR"/>
           </a:p>
@@ -5281,7 +6024,7 @@
           <a:p>
             <a:fld id="{B4E773C2-758D-45C6-BB5A-93E8C8649442}" type="datetimeFigureOut">
               <a:rPr lang="fr-FR" smtClean="0"/>
-              <a:t>11/01/2023</a:t>
+              <a:t>14/01/2023</a:t>
             </a:fld>
             <a:endParaRPr lang="fr-FR"/>
           </a:p>
@@ -5522,7 +6265,7 @@
           <a:p>
             <a:fld id="{B4E773C2-758D-45C6-BB5A-93E8C8649442}" type="datetimeFigureOut">
               <a:rPr lang="fr-FR" smtClean="0"/>
-              <a:t>11/01/2023</a:t>
+              <a:t>14/01/2023</a:t>
             </a:fld>
             <a:endParaRPr lang="fr-FR"/>
           </a:p>
@@ -10421,611 +11164,12 @@
           <a:chExt cx="0" cy="0"/>
         </a:xfrm>
       </p:grpSpPr>
-      <p:pic>
-        <p:nvPicPr>
-          <p:cNvPr id="25" name="Picture 4">
-            <a:extLst>
-              <a:ext uri="{FF2B5EF4-FFF2-40B4-BE49-F238E27FC236}">
-                <a16:creationId xmlns:a16="http://schemas.microsoft.com/office/drawing/2014/main" id="{0A5AAF80-5363-89B2-DB17-00C879E1B781}"/>
-              </a:ext>
-            </a:extLst>
-          </p:cNvPr>
-          <p:cNvPicPr>
-            <a:picLocks noChangeAspect="1" noChangeArrowheads="1"/>
-          </p:cNvPicPr>
-          <p:nvPr/>
-        </p:nvPicPr>
-        <p:blipFill rotWithShape="1">
-          <a:blip r:embed="rId2">
-            <a:duotone>
-              <a:schemeClr val="accent4">
-                <a:shade val="45000"/>
-                <a:satMod val="135000"/>
-              </a:schemeClr>
-              <a:prstClr val="white"/>
-            </a:duotone>
-            <a:extLst>
-              <a:ext uri="{28A0092B-C50C-407E-A947-70E740481C1C}">
-                <a14:useLocalDpi xmlns:a14="http://schemas.microsoft.com/office/drawing/2010/main" val="0"/>
-              </a:ext>
-            </a:extLst>
-          </a:blip>
-          <a:srcRect l="37802" b="67548"/>
-          <a:stretch/>
-        </p:blipFill>
-        <p:spPr bwMode="auto">
-          <a:xfrm>
-            <a:off x="4096100" y="4941168"/>
-            <a:ext cx="690054" cy="360040"/>
-          </a:xfrm>
-          <a:prstGeom prst="rect">
-            <a:avLst/>
-          </a:prstGeom>
-          <a:noFill/>
-          <a:extLst>
-            <a:ext uri="{909E8E84-426E-40DD-AFC4-6F175D3DCCD1}">
-              <a14:hiddenFill xmlns:a14="http://schemas.microsoft.com/office/drawing/2010/main">
-                <a:solidFill>
-                  <a:srgbClr val="FFFFFF"/>
-                </a:solidFill>
-              </a14:hiddenFill>
-            </a:ext>
-          </a:extLst>
-        </p:spPr>
-      </p:pic>
-      <p:pic>
-        <p:nvPicPr>
-          <p:cNvPr id="28" name="Picture 4">
-            <a:extLst>
-              <a:ext uri="{FF2B5EF4-FFF2-40B4-BE49-F238E27FC236}">
-                <a16:creationId xmlns:a16="http://schemas.microsoft.com/office/drawing/2014/main" id="{44667EE0-2F3A-7B5B-36B4-97FB1BE3FEF6}"/>
-              </a:ext>
-            </a:extLst>
-          </p:cNvPr>
-          <p:cNvPicPr>
-            <a:picLocks noChangeAspect="1" noChangeArrowheads="1"/>
-          </p:cNvPicPr>
-          <p:nvPr/>
-        </p:nvPicPr>
-        <p:blipFill rotWithShape="1">
-          <a:blip r:embed="rId2">
-            <a:duotone>
-              <a:schemeClr val="accent4">
-                <a:shade val="45000"/>
-                <a:satMod val="135000"/>
-              </a:schemeClr>
-              <a:prstClr val="white"/>
-            </a:duotone>
-            <a:extLst>
-              <a:ext uri="{28A0092B-C50C-407E-A947-70E740481C1C}">
-                <a14:useLocalDpi xmlns:a14="http://schemas.microsoft.com/office/drawing/2010/main" val="0"/>
-              </a:ext>
-            </a:extLst>
-          </a:blip>
-          <a:srcRect l="37802" b="67548"/>
-          <a:stretch/>
-        </p:blipFill>
-        <p:spPr bwMode="auto">
-          <a:xfrm>
-            <a:off x="8646306" y="4941168"/>
-            <a:ext cx="690054" cy="360040"/>
-          </a:xfrm>
-          <a:prstGeom prst="rect">
-            <a:avLst/>
-          </a:prstGeom>
-          <a:noFill/>
-          <a:extLst>
-            <a:ext uri="{909E8E84-426E-40DD-AFC4-6F175D3DCCD1}">
-              <a14:hiddenFill xmlns:a14="http://schemas.microsoft.com/office/drawing/2010/main">
-                <a:solidFill>
-                  <a:srgbClr val="FFFFFF"/>
-                </a:solidFill>
-              </a14:hiddenFill>
-            </a:ext>
-          </a:extLst>
-        </p:spPr>
-      </p:pic>
-      <p:pic>
-        <p:nvPicPr>
-          <p:cNvPr id="4" name="Picture 6">
-            <a:extLst>
-              <a:ext uri="{FF2B5EF4-FFF2-40B4-BE49-F238E27FC236}">
-                <a16:creationId xmlns:a16="http://schemas.microsoft.com/office/drawing/2014/main" id="{C2097443-816B-7C92-55B0-CE964304BA29}"/>
-              </a:ext>
-            </a:extLst>
-          </p:cNvPr>
-          <p:cNvPicPr>
-            <a:picLocks noChangeAspect="1" noChangeArrowheads="1"/>
-          </p:cNvPicPr>
-          <p:nvPr/>
-        </p:nvPicPr>
-        <p:blipFill rotWithShape="1">
-          <a:blip r:embed="rId3">
-            <a:extLst>
-              <a:ext uri="{28A0092B-C50C-407E-A947-70E740481C1C}">
-                <a14:useLocalDpi xmlns:a14="http://schemas.microsoft.com/office/drawing/2010/main" val="0"/>
-              </a:ext>
-            </a:extLst>
-          </a:blip>
-          <a:srcRect l="3125" t="37500" r="94792" b="34375"/>
-          <a:stretch/>
-        </p:blipFill>
-        <p:spPr bwMode="auto">
-          <a:xfrm>
-            <a:off x="839416" y="1340768"/>
-            <a:ext cx="576064" cy="648072"/>
-          </a:xfrm>
-          <a:prstGeom prst="rect">
-            <a:avLst/>
-          </a:prstGeom>
-          <a:noFill/>
-          <a:extLst>
-            <a:ext uri="{909E8E84-426E-40DD-AFC4-6F175D3DCCD1}">
-              <a14:hiddenFill xmlns:a14="http://schemas.microsoft.com/office/drawing/2010/main">
-                <a:solidFill>
-                  <a:srgbClr val="FFFFFF"/>
-                </a:solidFill>
-              </a14:hiddenFill>
-            </a:ext>
-          </a:extLst>
-        </p:spPr>
-      </p:pic>
-      <p:pic>
-        <p:nvPicPr>
-          <p:cNvPr id="5" name="Picture 6">
-            <a:extLst>
-              <a:ext uri="{FF2B5EF4-FFF2-40B4-BE49-F238E27FC236}">
-                <a16:creationId xmlns:a16="http://schemas.microsoft.com/office/drawing/2014/main" id="{B8D9B769-5DA0-44CB-04DB-CD63A1F48F3D}"/>
-              </a:ext>
-            </a:extLst>
-          </p:cNvPr>
-          <p:cNvPicPr>
-            <a:picLocks noChangeAspect="1" noChangeArrowheads="1"/>
-          </p:cNvPicPr>
-          <p:nvPr/>
-        </p:nvPicPr>
-        <p:blipFill rotWithShape="1">
-          <a:blip r:embed="rId3">
-            <a:extLst>
-              <a:ext uri="{28A0092B-C50C-407E-A947-70E740481C1C}">
-                <a14:useLocalDpi xmlns:a14="http://schemas.microsoft.com/office/drawing/2010/main" val="0"/>
-              </a:ext>
-            </a:extLst>
-          </a:blip>
-          <a:srcRect l="11459" t="37500" r="86198" b="28125"/>
-          <a:stretch/>
-        </p:blipFill>
-        <p:spPr bwMode="auto">
-          <a:xfrm>
-            <a:off x="1559496" y="1340768"/>
-            <a:ext cx="648072" cy="792088"/>
-          </a:xfrm>
-          <a:prstGeom prst="rect">
-            <a:avLst/>
-          </a:prstGeom>
-          <a:noFill/>
-          <a:extLst>
-            <a:ext uri="{909E8E84-426E-40DD-AFC4-6F175D3DCCD1}">
-              <a14:hiddenFill xmlns:a14="http://schemas.microsoft.com/office/drawing/2010/main">
-                <a:solidFill>
-                  <a:srgbClr val="FFFFFF"/>
-                </a:solidFill>
-              </a14:hiddenFill>
-            </a:ext>
-          </a:extLst>
-        </p:spPr>
-      </p:pic>
-      <p:pic>
-        <p:nvPicPr>
-          <p:cNvPr id="6" name="Picture 6">
-            <a:extLst>
-              <a:ext uri="{FF2B5EF4-FFF2-40B4-BE49-F238E27FC236}">
-                <a16:creationId xmlns:a16="http://schemas.microsoft.com/office/drawing/2014/main" id="{0B94B4F8-50AD-5072-09A5-8AF0289F0F89}"/>
-              </a:ext>
-            </a:extLst>
-          </p:cNvPr>
-          <p:cNvPicPr>
-            <a:picLocks noChangeAspect="1" noChangeArrowheads="1"/>
-          </p:cNvPicPr>
-          <p:nvPr/>
-        </p:nvPicPr>
-        <p:blipFill rotWithShape="1">
-          <a:blip r:embed="rId3">
-            <a:extLst>
-              <a:ext uri="{28A0092B-C50C-407E-A947-70E740481C1C}">
-                <a14:useLocalDpi xmlns:a14="http://schemas.microsoft.com/office/drawing/2010/main" val="0"/>
-              </a:ext>
-            </a:extLst>
-          </a:blip>
-          <a:srcRect l="19788" t="37500" r="77348" b="28125"/>
-          <a:stretch/>
-        </p:blipFill>
-        <p:spPr bwMode="auto">
-          <a:xfrm>
-            <a:off x="2351584" y="1340768"/>
-            <a:ext cx="792088" cy="792088"/>
-          </a:xfrm>
-          <a:prstGeom prst="rect">
-            <a:avLst/>
-          </a:prstGeom>
-          <a:noFill/>
-          <a:extLst>
-            <a:ext uri="{909E8E84-426E-40DD-AFC4-6F175D3DCCD1}">
-              <a14:hiddenFill xmlns:a14="http://schemas.microsoft.com/office/drawing/2010/main">
-                <a:solidFill>
-                  <a:srgbClr val="FFFFFF"/>
-                </a:solidFill>
-              </a14:hiddenFill>
-            </a:ext>
-          </a:extLst>
-        </p:spPr>
-      </p:pic>
-      <p:pic>
-        <p:nvPicPr>
-          <p:cNvPr id="7" name="Picture 6">
-            <a:extLst>
-              <a:ext uri="{FF2B5EF4-FFF2-40B4-BE49-F238E27FC236}">
-                <a16:creationId xmlns:a16="http://schemas.microsoft.com/office/drawing/2014/main" id="{A3C025DE-F07D-9F8F-55E2-EA9C8F2FA583}"/>
-              </a:ext>
-            </a:extLst>
-          </p:cNvPr>
-          <p:cNvPicPr>
-            <a:picLocks noChangeAspect="1" noChangeArrowheads="1"/>
-          </p:cNvPicPr>
-          <p:nvPr/>
-        </p:nvPicPr>
-        <p:blipFill rotWithShape="1">
-          <a:blip r:embed="rId3">
-            <a:extLst>
-              <a:ext uri="{28A0092B-C50C-407E-A947-70E740481C1C}">
-                <a14:useLocalDpi xmlns:a14="http://schemas.microsoft.com/office/drawing/2010/main" val="0"/>
-              </a:ext>
-            </a:extLst>
-          </a:blip>
-          <a:srcRect l="28379" t="37500" r="69018" b="28125"/>
-          <a:stretch/>
-        </p:blipFill>
-        <p:spPr bwMode="auto">
-          <a:xfrm>
-            <a:off x="3215680" y="1340768"/>
-            <a:ext cx="720080" cy="792088"/>
-          </a:xfrm>
-          <a:prstGeom prst="rect">
-            <a:avLst/>
-          </a:prstGeom>
-          <a:noFill/>
-          <a:extLst>
-            <a:ext uri="{909E8E84-426E-40DD-AFC4-6F175D3DCCD1}">
-              <a14:hiddenFill xmlns:a14="http://schemas.microsoft.com/office/drawing/2010/main">
-                <a:solidFill>
-                  <a:srgbClr val="FFFFFF"/>
-                </a:solidFill>
-              </a14:hiddenFill>
-            </a:ext>
-          </a:extLst>
-        </p:spPr>
-      </p:pic>
-      <p:pic>
-        <p:nvPicPr>
-          <p:cNvPr id="8" name="Picture 7">
-            <a:extLst>
-              <a:ext uri="{FF2B5EF4-FFF2-40B4-BE49-F238E27FC236}">
-                <a16:creationId xmlns:a16="http://schemas.microsoft.com/office/drawing/2014/main" id="{2270F174-3743-7438-F238-78E85A130752}"/>
-              </a:ext>
-            </a:extLst>
-          </p:cNvPr>
-          <p:cNvPicPr>
-            <a:picLocks noChangeAspect="1" noChangeArrowheads="1"/>
-          </p:cNvPicPr>
-          <p:nvPr/>
-        </p:nvPicPr>
-        <p:blipFill rotWithShape="1">
-          <a:blip r:embed="rId3">
-            <a:extLst>
-              <a:ext uri="{28A0092B-C50C-407E-A947-70E740481C1C}">
-                <a14:useLocalDpi xmlns:a14="http://schemas.microsoft.com/office/drawing/2010/main" val="0"/>
-              </a:ext>
-            </a:extLst>
-          </a:blip>
-          <a:srcRect l="36971" t="37500" r="60947" b="28125"/>
-          <a:stretch/>
-        </p:blipFill>
-        <p:spPr bwMode="auto">
-          <a:xfrm>
-            <a:off x="4079776" y="1346508"/>
-            <a:ext cx="576064" cy="792088"/>
-          </a:xfrm>
-          <a:prstGeom prst="rect">
-            <a:avLst/>
-          </a:prstGeom>
-          <a:noFill/>
-          <a:extLst>
-            <a:ext uri="{909E8E84-426E-40DD-AFC4-6F175D3DCCD1}">
-              <a14:hiddenFill xmlns:a14="http://schemas.microsoft.com/office/drawing/2010/main">
-                <a:solidFill>
-                  <a:srgbClr val="FFFFFF"/>
-                </a:solidFill>
-              </a14:hiddenFill>
-            </a:ext>
-          </a:extLst>
-        </p:spPr>
-      </p:pic>
-      <p:pic>
-        <p:nvPicPr>
-          <p:cNvPr id="9" name="Picture 8">
-            <a:extLst>
-              <a:ext uri="{FF2B5EF4-FFF2-40B4-BE49-F238E27FC236}">
-                <a16:creationId xmlns:a16="http://schemas.microsoft.com/office/drawing/2014/main" id="{2B4BA0C4-11A5-86D9-5EDD-E4489B5C8391}"/>
-              </a:ext>
-            </a:extLst>
-          </p:cNvPr>
-          <p:cNvPicPr>
-            <a:picLocks noChangeAspect="1" noChangeArrowheads="1"/>
-          </p:cNvPicPr>
-          <p:nvPr/>
-        </p:nvPicPr>
-        <p:blipFill rotWithShape="1">
-          <a:blip r:embed="rId3">
-            <a:extLst>
-              <a:ext uri="{28A0092B-C50C-407E-A947-70E740481C1C}">
-                <a14:useLocalDpi xmlns:a14="http://schemas.microsoft.com/office/drawing/2010/main" val="0"/>
-              </a:ext>
-            </a:extLst>
-          </a:blip>
-          <a:srcRect l="44777" t="37500" r="52881" b="28125"/>
-          <a:stretch/>
-        </p:blipFill>
-        <p:spPr bwMode="auto">
-          <a:xfrm>
-            <a:off x="4691843" y="1349936"/>
-            <a:ext cx="648074" cy="792088"/>
-          </a:xfrm>
-          <a:prstGeom prst="rect">
-            <a:avLst/>
-          </a:prstGeom>
-          <a:noFill/>
-          <a:extLst>
-            <a:ext uri="{909E8E84-426E-40DD-AFC4-6F175D3DCCD1}">
-              <a14:hiddenFill xmlns:a14="http://schemas.microsoft.com/office/drawing/2010/main">
-                <a:solidFill>
-                  <a:srgbClr val="FFFFFF"/>
-                </a:solidFill>
-              </a14:hiddenFill>
-            </a:ext>
-          </a:extLst>
-        </p:spPr>
-      </p:pic>
-      <p:pic>
-        <p:nvPicPr>
-          <p:cNvPr id="10" name="Picture 9">
-            <a:extLst>
-              <a:ext uri="{FF2B5EF4-FFF2-40B4-BE49-F238E27FC236}">
-                <a16:creationId xmlns:a16="http://schemas.microsoft.com/office/drawing/2014/main" id="{27D390F9-0F7F-46CC-DFC7-56FBD67A30F8}"/>
-              </a:ext>
-            </a:extLst>
-          </p:cNvPr>
-          <p:cNvPicPr>
-            <a:picLocks noChangeAspect="1" noChangeArrowheads="1"/>
-          </p:cNvPicPr>
-          <p:nvPr/>
-        </p:nvPicPr>
-        <p:blipFill rotWithShape="1">
-          <a:blip r:embed="rId3">
-            <a:extLst>
-              <a:ext uri="{28A0092B-C50C-407E-A947-70E740481C1C}">
-                <a14:useLocalDpi xmlns:a14="http://schemas.microsoft.com/office/drawing/2010/main" val="0"/>
-              </a:ext>
-            </a:extLst>
-          </a:blip>
-          <a:srcRect l="53313" t="37500" r="44605" b="28125"/>
-          <a:stretch/>
-        </p:blipFill>
-        <p:spPr bwMode="auto">
-          <a:xfrm>
-            <a:off x="5586204" y="1362532"/>
-            <a:ext cx="576063" cy="792088"/>
-          </a:xfrm>
-          <a:prstGeom prst="rect">
-            <a:avLst/>
-          </a:prstGeom>
-          <a:noFill/>
-          <a:extLst>
-            <a:ext uri="{909E8E84-426E-40DD-AFC4-6F175D3DCCD1}">
-              <a14:hiddenFill xmlns:a14="http://schemas.microsoft.com/office/drawing/2010/main">
-                <a:solidFill>
-                  <a:srgbClr val="FFFFFF"/>
-                </a:solidFill>
-              </a14:hiddenFill>
-            </a:ext>
-          </a:extLst>
-        </p:spPr>
-      </p:pic>
-      <p:pic>
-        <p:nvPicPr>
-          <p:cNvPr id="11" name="Picture 10">
-            <a:extLst>
-              <a:ext uri="{FF2B5EF4-FFF2-40B4-BE49-F238E27FC236}">
-                <a16:creationId xmlns:a16="http://schemas.microsoft.com/office/drawing/2014/main" id="{C118F22A-ED92-4EDA-DF7B-170171129238}"/>
-              </a:ext>
-            </a:extLst>
-          </p:cNvPr>
-          <p:cNvPicPr>
-            <a:picLocks noChangeAspect="1" noChangeArrowheads="1"/>
-          </p:cNvPicPr>
-          <p:nvPr/>
-        </p:nvPicPr>
-        <p:blipFill rotWithShape="1">
-          <a:blip r:embed="rId3">
-            <a:extLst>
-              <a:ext uri="{28A0092B-C50C-407E-A947-70E740481C1C}">
-                <a14:useLocalDpi xmlns:a14="http://schemas.microsoft.com/office/drawing/2010/main" val="0"/>
-              </a:ext>
-            </a:extLst>
-          </a:blip>
-          <a:srcRect l="61771" t="33978" r="36407" b="28125"/>
-          <a:stretch/>
-        </p:blipFill>
-        <p:spPr bwMode="auto">
-          <a:xfrm>
-            <a:off x="6306284" y="1268760"/>
-            <a:ext cx="504056" cy="873264"/>
-          </a:xfrm>
-          <a:prstGeom prst="rect">
-            <a:avLst/>
-          </a:prstGeom>
-          <a:noFill/>
-          <a:extLst>
-            <a:ext uri="{909E8E84-426E-40DD-AFC4-6F175D3DCCD1}">
-              <a14:hiddenFill xmlns:a14="http://schemas.microsoft.com/office/drawing/2010/main">
-                <a:solidFill>
-                  <a:srgbClr val="FFFFFF"/>
-                </a:solidFill>
-              </a14:hiddenFill>
-            </a:ext>
-          </a:extLst>
-        </p:spPr>
-      </p:pic>
-      <p:pic>
-        <p:nvPicPr>
-          <p:cNvPr id="12" name="Picture 11">
-            <a:extLst>
-              <a:ext uri="{FF2B5EF4-FFF2-40B4-BE49-F238E27FC236}">
-                <a16:creationId xmlns:a16="http://schemas.microsoft.com/office/drawing/2014/main" id="{564A51F9-E8A0-EC20-CBBA-DA37B1CDD7EE}"/>
-              </a:ext>
-            </a:extLst>
-          </p:cNvPr>
-          <p:cNvPicPr>
-            <a:picLocks noChangeAspect="1" noChangeArrowheads="1"/>
-          </p:cNvPicPr>
-          <p:nvPr/>
-        </p:nvPicPr>
-        <p:blipFill rotWithShape="1">
-          <a:blip r:embed="rId3">
-            <a:extLst>
-              <a:ext uri="{28A0092B-C50C-407E-A947-70E740481C1C}">
-                <a14:useLocalDpi xmlns:a14="http://schemas.microsoft.com/office/drawing/2010/main" val="0"/>
-              </a:ext>
-            </a:extLst>
-          </a:blip>
-          <a:srcRect l="70178" t="33978" r="27740" b="28125"/>
-          <a:stretch/>
-        </p:blipFill>
-        <p:spPr bwMode="auto">
-          <a:xfrm>
-            <a:off x="6907852" y="1228172"/>
-            <a:ext cx="576063" cy="873264"/>
-          </a:xfrm>
-          <a:prstGeom prst="rect">
-            <a:avLst/>
-          </a:prstGeom>
-          <a:noFill/>
-          <a:extLst>
-            <a:ext uri="{909E8E84-426E-40DD-AFC4-6F175D3DCCD1}">
-              <a14:hiddenFill xmlns:a14="http://schemas.microsoft.com/office/drawing/2010/main">
-                <a:solidFill>
-                  <a:srgbClr val="FFFFFF"/>
-                </a:solidFill>
-              </a14:hiddenFill>
-            </a:ext>
-          </a:extLst>
-        </p:spPr>
-      </p:pic>
-      <p:pic>
-        <p:nvPicPr>
-          <p:cNvPr id="13" name="Picture 12">
-            <a:extLst>
-              <a:ext uri="{FF2B5EF4-FFF2-40B4-BE49-F238E27FC236}">
-                <a16:creationId xmlns:a16="http://schemas.microsoft.com/office/drawing/2014/main" id="{FC1AFA8F-1AA2-C5E8-30DF-8AB4334C20AF}"/>
-              </a:ext>
-            </a:extLst>
-          </p:cNvPr>
-          <p:cNvPicPr>
-            <a:picLocks noChangeAspect="1" noChangeArrowheads="1"/>
-          </p:cNvPicPr>
-          <p:nvPr/>
-        </p:nvPicPr>
-        <p:blipFill rotWithShape="1">
-          <a:blip r:embed="rId3">
-            <a:extLst>
-              <a:ext uri="{28A0092B-C50C-407E-A947-70E740481C1C}">
-                <a14:useLocalDpi xmlns:a14="http://schemas.microsoft.com/office/drawing/2010/main" val="0"/>
-              </a:ext>
-            </a:extLst>
-          </a:blip>
-          <a:srcRect l="78466" t="33978" r="19452" b="28125"/>
-          <a:stretch/>
-        </p:blipFill>
-        <p:spPr bwMode="auto">
-          <a:xfrm>
-            <a:off x="7581427" y="1228172"/>
-            <a:ext cx="576064" cy="873264"/>
-          </a:xfrm>
-          <a:prstGeom prst="rect">
-            <a:avLst/>
-          </a:prstGeom>
-          <a:noFill/>
-          <a:extLst>
-            <a:ext uri="{909E8E84-426E-40DD-AFC4-6F175D3DCCD1}">
-              <a14:hiddenFill xmlns:a14="http://schemas.microsoft.com/office/drawing/2010/main">
-                <a:solidFill>
-                  <a:srgbClr val="FFFFFF"/>
-                </a:solidFill>
-              </a14:hiddenFill>
-            </a:ext>
-          </a:extLst>
-        </p:spPr>
-      </p:pic>
-      <p:pic>
-        <p:nvPicPr>
-          <p:cNvPr id="12290" name="Picture 2">
-            <a:extLst>
-              <a:ext uri="{FF2B5EF4-FFF2-40B4-BE49-F238E27FC236}">
-                <a16:creationId xmlns:a16="http://schemas.microsoft.com/office/drawing/2014/main" id="{0D30B644-9B91-0BCF-BCBC-A533CC4CA62F}"/>
-              </a:ext>
-            </a:extLst>
-          </p:cNvPr>
-          <p:cNvPicPr>
-            <a:picLocks noChangeAspect="1" noChangeArrowheads="1"/>
-          </p:cNvPicPr>
-          <p:nvPr/>
-        </p:nvPicPr>
-        <p:blipFill rotWithShape="1">
-          <a:blip r:embed="rId4">
-            <a:extLst>
-              <a:ext uri="{28A0092B-C50C-407E-A947-70E740481C1C}">
-                <a14:useLocalDpi xmlns:a14="http://schemas.microsoft.com/office/drawing/2010/main" val="0"/>
-              </a:ext>
-            </a:extLst>
-          </a:blip>
-          <a:srcRect l="37400" b="66668"/>
-          <a:stretch/>
-        </p:blipFill>
-        <p:spPr bwMode="auto">
-          <a:xfrm>
-            <a:off x="3071664" y="2636912"/>
-            <a:ext cx="2146548" cy="1142960"/>
-          </a:xfrm>
-          <a:prstGeom prst="rect">
-            <a:avLst/>
-          </a:prstGeom>
-          <a:noFill/>
-          <a:extLst>
-            <a:ext uri="{909E8E84-426E-40DD-AFC4-6F175D3DCCD1}">
-              <a14:hiddenFill xmlns:a14="http://schemas.microsoft.com/office/drawing/2010/main">
-                <a:solidFill>
-                  <a:srgbClr val="FFFFFF"/>
-                </a:solidFill>
-              </a14:hiddenFill>
-            </a:ext>
-          </a:extLst>
-        </p:spPr>
-      </p:pic>
       <p:grpSp>
         <p:nvGrpSpPr>
-          <p:cNvPr id="29" name="Group 28">
-            <a:extLst>
-              <a:ext uri="{FF2B5EF4-FFF2-40B4-BE49-F238E27FC236}">
-                <a16:creationId xmlns:a16="http://schemas.microsoft.com/office/drawing/2014/main" id="{581020EF-BBA6-BD97-10D2-D533AC7A610F}"/>
+          <p:cNvPr id="55" name="Group 54">
+            <a:extLst>
+              <a:ext uri="{FF2B5EF4-FFF2-40B4-BE49-F238E27FC236}">
+                <a16:creationId xmlns:a16="http://schemas.microsoft.com/office/drawing/2014/main" id="{15B3F44C-87E0-BD02-83A1-179BC92C2D06}"/>
               </a:ext>
             </a:extLst>
           </p:cNvPr>
@@ -11034,18 +11178,95 @@
         </p:nvGrpSpPr>
         <p:grpSpPr>
           <a:xfrm>
-            <a:off x="551384" y="4365104"/>
-            <a:ext cx="864096" cy="1524000"/>
-            <a:chOff x="551384" y="4365104"/>
-            <a:chExt cx="864096" cy="1524000"/>
+            <a:off x="2855740" y="4353272"/>
+            <a:ext cx="901799" cy="1524000"/>
+            <a:chOff x="2855740" y="4353272"/>
+            <a:chExt cx="901799" cy="1524000"/>
           </a:xfrm>
         </p:grpSpPr>
+        <p:sp>
+          <p:nvSpPr>
+            <p:cNvPr id="41" name="ZoneTexte 3">
+              <a:extLst>
+                <a:ext uri="{FF2B5EF4-FFF2-40B4-BE49-F238E27FC236}">
+                  <a16:creationId xmlns:a16="http://schemas.microsoft.com/office/drawing/2014/main" id="{FFE4059A-4686-5960-F913-0C0C36B0CF59}"/>
+                </a:ext>
+              </a:extLst>
+            </p:cNvPr>
+            <p:cNvSpPr txBox="1"/>
+            <p:nvPr/>
+          </p:nvSpPr>
+          <p:spPr>
+            <a:xfrm>
+              <a:off x="2927648" y="4797152"/>
+              <a:ext cx="720080" cy="384721"/>
+            </a:xfrm>
+            <a:prstGeom prst="rect">
+              <a:avLst/>
+            </a:prstGeom>
+            <a:noFill/>
+          </p:spPr>
+          <p:txBody>
+            <a:bodyPr wrap="square" rtlCol="0">
+              <a:spAutoFit/>
+            </a:bodyPr>
+            <a:lstStyle/>
+            <a:p>
+              <a:r>
+                <a:rPr lang="fr-FR" sz="1900" dirty="0">
+                  <a:solidFill>
+                    <a:srgbClr val="DEAD36"/>
+                  </a:solidFill>
+                  <a:latin typeface="RetroBoundmini" panose="02000603000000000000" pitchFamily="2" charset="0"/>
+                  <a:ea typeface="RetroBoundmini" panose="02000603000000000000" pitchFamily="2" charset="0"/>
+                </a:rPr>
+                <a:t>+200</a:t>
+              </a:r>
+            </a:p>
+          </p:txBody>
+        </p:sp>
         <p:pic>
           <p:nvPicPr>
-            <p:cNvPr id="12292" name="Picture 4">
+            <p:cNvPr id="42" name="Picture 41" descr="Icon&#10;&#10;Description automatically generated with low confidence">
               <a:extLst>
                 <a:ext uri="{FF2B5EF4-FFF2-40B4-BE49-F238E27FC236}">
-                  <a16:creationId xmlns:a16="http://schemas.microsoft.com/office/drawing/2014/main" id="{123F15A6-7574-AD77-415F-810AC8EA75F1}"/>
+                  <a16:creationId xmlns:a16="http://schemas.microsoft.com/office/drawing/2014/main" id="{03220851-5E93-3004-0F9C-56F157B48F6D}"/>
+                </a:ext>
+              </a:extLst>
+            </p:cNvPr>
+            <p:cNvPicPr>
+              <a:picLocks noChangeAspect="1"/>
+            </p:cNvPicPr>
+            <p:nvPr/>
+          </p:nvPicPr>
+          <p:blipFill>
+            <a:blip r:embed="rId2">
+              <a:extLst>
+                <a:ext uri="{28A0092B-C50C-407E-A947-70E740481C1C}">
+                  <a14:useLocalDpi xmlns:a14="http://schemas.microsoft.com/office/drawing/2010/main" val="0"/>
+                </a:ext>
+              </a:extLst>
+            </a:blip>
+            <a:stretch>
+              <a:fillRect/>
+            </a:stretch>
+          </p:blipFill>
+          <p:spPr>
+            <a:xfrm>
+              <a:off x="3107668" y="5085184"/>
+              <a:ext cx="360040" cy="360040"/>
+            </a:xfrm>
+            <a:prstGeom prst="rect">
+              <a:avLst/>
+            </a:prstGeom>
+          </p:spPr>
+        </p:pic>
+        <p:pic>
+          <p:nvPicPr>
+            <p:cNvPr id="16" name="Picture 4">
+              <a:extLst>
+                <a:ext uri="{FF2B5EF4-FFF2-40B4-BE49-F238E27FC236}">
+                  <a16:creationId xmlns:a16="http://schemas.microsoft.com/office/drawing/2014/main" id="{AA509538-315A-F877-A4C0-B85B878D61E3}"/>
                 </a:ext>
               </a:extLst>
             </p:cNvPr>
@@ -11055,7 +11276,7 @@
             <p:nvPr/>
           </p:nvPicPr>
           <p:blipFill rotWithShape="1">
-            <a:blip r:embed="rId2">
+            <a:blip r:embed="rId3">
               <a:duotone>
                 <a:schemeClr val="accent4">
                   <a:shade val="45000"/>
@@ -11069,13 +11290,13 @@
                 </a:ext>
               </a:extLst>
             </a:blip>
-            <a:srcRect l="37802" b="67548"/>
+            <a:srcRect l="27756" r="64847"/>
             <a:stretch/>
           </p:blipFill>
           <p:spPr bwMode="auto">
             <a:xfrm>
-              <a:off x="683444" y="4941168"/>
-              <a:ext cx="690054" cy="360040"/>
+              <a:off x="2855740" y="4353272"/>
+              <a:ext cx="901799" cy="1524000"/>
             </a:xfrm>
             <a:prstGeom prst="rect">
               <a:avLst/>
@@ -11092,6 +11313,1122 @@
             </a:extLst>
           </p:spPr>
         </p:pic>
+      </p:grpSp>
+      <p:grpSp>
+        <p:nvGrpSpPr>
+          <p:cNvPr id="56" name="Group 55">
+            <a:extLst>
+              <a:ext uri="{FF2B5EF4-FFF2-40B4-BE49-F238E27FC236}">
+                <a16:creationId xmlns:a16="http://schemas.microsoft.com/office/drawing/2014/main" id="{093D39C7-48B8-7A2D-AC22-BB73AC0B21F5}"/>
+              </a:ext>
+            </a:extLst>
+          </p:cNvPr>
+          <p:cNvGrpSpPr/>
+          <p:nvPr/>
+        </p:nvGrpSpPr>
+        <p:grpSpPr>
+          <a:xfrm>
+            <a:off x="4079776" y="4353272"/>
+            <a:ext cx="864096" cy="1524000"/>
+            <a:chOff x="4079776" y="4353272"/>
+            <a:chExt cx="864096" cy="1524000"/>
+          </a:xfrm>
+        </p:grpSpPr>
+        <p:sp>
+          <p:nvSpPr>
+            <p:cNvPr id="43" name="ZoneTexte 3">
+              <a:extLst>
+                <a:ext uri="{FF2B5EF4-FFF2-40B4-BE49-F238E27FC236}">
+                  <a16:creationId xmlns:a16="http://schemas.microsoft.com/office/drawing/2014/main" id="{B7567EE3-B6D0-075B-36EC-C9640B2362AD}"/>
+                </a:ext>
+              </a:extLst>
+            </p:cNvPr>
+            <p:cNvSpPr txBox="1"/>
+            <p:nvPr/>
+          </p:nvSpPr>
+          <p:spPr>
+            <a:xfrm>
+              <a:off x="4151784" y="4797152"/>
+              <a:ext cx="720080" cy="384721"/>
+            </a:xfrm>
+            <a:prstGeom prst="rect">
+              <a:avLst/>
+            </a:prstGeom>
+            <a:noFill/>
+          </p:spPr>
+          <p:txBody>
+            <a:bodyPr wrap="square" rtlCol="0">
+              <a:spAutoFit/>
+            </a:bodyPr>
+            <a:lstStyle/>
+            <a:p>
+              <a:r>
+                <a:rPr lang="fr-FR" sz="1900" dirty="0">
+                  <a:solidFill>
+                    <a:srgbClr val="DEAD36"/>
+                  </a:solidFill>
+                  <a:latin typeface="RetroBoundmini" panose="02000603000000000000" pitchFamily="2" charset="0"/>
+                  <a:ea typeface="RetroBoundmini" panose="02000603000000000000" pitchFamily="2" charset="0"/>
+                </a:rPr>
+                <a:t>+200</a:t>
+              </a:r>
+            </a:p>
+          </p:txBody>
+        </p:sp>
+        <p:pic>
+          <p:nvPicPr>
+            <p:cNvPr id="44" name="Picture 43" descr="Icon&#10;&#10;Description automatically generated with low confidence">
+              <a:extLst>
+                <a:ext uri="{FF2B5EF4-FFF2-40B4-BE49-F238E27FC236}">
+                  <a16:creationId xmlns:a16="http://schemas.microsoft.com/office/drawing/2014/main" id="{AFCBC6F6-32A8-AD2B-ECC9-EF1CB437F98D}"/>
+                </a:ext>
+              </a:extLst>
+            </p:cNvPr>
+            <p:cNvPicPr>
+              <a:picLocks noChangeAspect="1"/>
+            </p:cNvPicPr>
+            <p:nvPr/>
+          </p:nvPicPr>
+          <p:blipFill>
+            <a:blip r:embed="rId2">
+              <a:extLst>
+                <a:ext uri="{28A0092B-C50C-407E-A947-70E740481C1C}">
+                  <a14:useLocalDpi xmlns:a14="http://schemas.microsoft.com/office/drawing/2010/main" val="0"/>
+                </a:ext>
+              </a:extLst>
+            </a:blip>
+            <a:stretch>
+              <a:fillRect/>
+            </a:stretch>
+          </p:blipFill>
+          <p:spPr>
+            <a:xfrm>
+              <a:off x="4331804" y="5085184"/>
+              <a:ext cx="360040" cy="360040"/>
+            </a:xfrm>
+            <a:prstGeom prst="rect">
+              <a:avLst/>
+            </a:prstGeom>
+          </p:spPr>
+        </p:pic>
+        <p:pic>
+          <p:nvPicPr>
+            <p:cNvPr id="17" name="Picture 4">
+              <a:extLst>
+                <a:ext uri="{FF2B5EF4-FFF2-40B4-BE49-F238E27FC236}">
+                  <a16:creationId xmlns:a16="http://schemas.microsoft.com/office/drawing/2014/main" id="{DC648DDC-A70F-FF61-2A6E-2745C7CC9C0D}"/>
+                </a:ext>
+              </a:extLst>
+            </p:cNvPr>
+            <p:cNvPicPr>
+              <a:picLocks noChangeAspect="1" noChangeArrowheads="1"/>
+            </p:cNvPicPr>
+            <p:nvPr/>
+          </p:nvPicPr>
+          <p:blipFill rotWithShape="1">
+            <a:blip r:embed="rId3">
+              <a:duotone>
+                <a:schemeClr val="accent4">
+                  <a:shade val="45000"/>
+                  <a:satMod val="135000"/>
+                </a:schemeClr>
+                <a:prstClr val="white"/>
+              </a:duotone>
+              <a:extLst>
+                <a:ext uri="{28A0092B-C50C-407E-A947-70E740481C1C}">
+                  <a14:useLocalDpi xmlns:a14="http://schemas.microsoft.com/office/drawing/2010/main" val="0"/>
+                </a:ext>
+              </a:extLst>
+            </a:blip>
+            <a:srcRect l="40005" r="52907"/>
+            <a:stretch/>
+          </p:blipFill>
+          <p:spPr bwMode="auto">
+            <a:xfrm>
+              <a:off x="4079776" y="4353272"/>
+              <a:ext cx="864096" cy="1524000"/>
+            </a:xfrm>
+            <a:prstGeom prst="rect">
+              <a:avLst/>
+            </a:prstGeom>
+            <a:noFill/>
+            <a:extLst>
+              <a:ext uri="{909E8E84-426E-40DD-AFC4-6F175D3DCCD1}">
+                <a14:hiddenFill xmlns:a14="http://schemas.microsoft.com/office/drawing/2010/main">
+                  <a:solidFill>
+                    <a:srgbClr val="FFFFFF"/>
+                  </a:solidFill>
+                </a14:hiddenFill>
+              </a:ext>
+            </a:extLst>
+          </p:spPr>
+        </p:pic>
+      </p:grpSp>
+      <p:grpSp>
+        <p:nvGrpSpPr>
+          <p:cNvPr id="54" name="Group 53">
+            <a:extLst>
+              <a:ext uri="{FF2B5EF4-FFF2-40B4-BE49-F238E27FC236}">
+                <a16:creationId xmlns:a16="http://schemas.microsoft.com/office/drawing/2014/main" id="{8FFAB02E-D7B9-0AAE-C418-1EC7D91614A7}"/>
+              </a:ext>
+            </a:extLst>
+          </p:cNvPr>
+          <p:cNvGrpSpPr/>
+          <p:nvPr/>
+        </p:nvGrpSpPr>
+        <p:grpSpPr>
+          <a:xfrm>
+            <a:off x="1703562" y="4353272"/>
+            <a:ext cx="864096" cy="1524000"/>
+            <a:chOff x="1703562" y="4353272"/>
+            <a:chExt cx="864096" cy="1524000"/>
+          </a:xfrm>
+        </p:grpSpPr>
+        <p:pic>
+          <p:nvPicPr>
+            <p:cNvPr id="39" name="Picture 38" descr="Icon&#10;&#10;Description automatically generated with low confidence">
+              <a:extLst>
+                <a:ext uri="{FF2B5EF4-FFF2-40B4-BE49-F238E27FC236}">
+                  <a16:creationId xmlns:a16="http://schemas.microsoft.com/office/drawing/2014/main" id="{B0B88CDA-BBEE-B69E-856B-1D13FAD442D9}"/>
+                </a:ext>
+              </a:extLst>
+            </p:cNvPr>
+            <p:cNvPicPr>
+              <a:picLocks noChangeAspect="1"/>
+            </p:cNvPicPr>
+            <p:nvPr/>
+          </p:nvPicPr>
+          <p:blipFill>
+            <a:blip r:embed="rId2">
+              <a:extLst>
+                <a:ext uri="{28A0092B-C50C-407E-A947-70E740481C1C}">
+                  <a14:useLocalDpi xmlns:a14="http://schemas.microsoft.com/office/drawing/2010/main" val="0"/>
+                </a:ext>
+              </a:extLst>
+            </a:blip>
+            <a:stretch>
+              <a:fillRect/>
+            </a:stretch>
+          </p:blipFill>
+          <p:spPr>
+            <a:xfrm>
+              <a:off x="1955540" y="5085184"/>
+              <a:ext cx="360040" cy="360040"/>
+            </a:xfrm>
+            <a:prstGeom prst="rect">
+              <a:avLst/>
+            </a:prstGeom>
+          </p:spPr>
+        </p:pic>
+        <p:sp>
+          <p:nvSpPr>
+            <p:cNvPr id="38" name="ZoneTexte 3">
+              <a:extLst>
+                <a:ext uri="{FF2B5EF4-FFF2-40B4-BE49-F238E27FC236}">
+                  <a16:creationId xmlns:a16="http://schemas.microsoft.com/office/drawing/2014/main" id="{6F927A24-A113-E9B7-59EA-682CCDC1A3CD}"/>
+                </a:ext>
+              </a:extLst>
+            </p:cNvPr>
+            <p:cNvSpPr txBox="1"/>
+            <p:nvPr/>
+          </p:nvSpPr>
+          <p:spPr>
+            <a:xfrm>
+              <a:off x="1775520" y="4797152"/>
+              <a:ext cx="720080" cy="384721"/>
+            </a:xfrm>
+            <a:prstGeom prst="rect">
+              <a:avLst/>
+            </a:prstGeom>
+            <a:noFill/>
+          </p:spPr>
+          <p:txBody>
+            <a:bodyPr wrap="square" rtlCol="0">
+              <a:spAutoFit/>
+            </a:bodyPr>
+            <a:lstStyle/>
+            <a:p>
+              <a:r>
+                <a:rPr lang="fr-FR" sz="1900" dirty="0">
+                  <a:solidFill>
+                    <a:srgbClr val="DEAD36"/>
+                  </a:solidFill>
+                  <a:latin typeface="RetroBoundmini" panose="02000603000000000000" pitchFamily="2" charset="0"/>
+                  <a:ea typeface="RetroBoundmini" panose="02000603000000000000" pitchFamily="2" charset="0"/>
+                </a:rPr>
+                <a:t>+200</a:t>
+              </a:r>
+            </a:p>
+          </p:txBody>
+        </p:sp>
+        <p:pic>
+          <p:nvPicPr>
+            <p:cNvPr id="15" name="Picture 4">
+              <a:extLst>
+                <a:ext uri="{FF2B5EF4-FFF2-40B4-BE49-F238E27FC236}">
+                  <a16:creationId xmlns:a16="http://schemas.microsoft.com/office/drawing/2014/main" id="{31F6879F-4A00-0082-32E2-25453464D6A6}"/>
+                </a:ext>
+              </a:extLst>
+            </p:cNvPr>
+            <p:cNvPicPr>
+              <a:picLocks noChangeAspect="1" noChangeArrowheads="1"/>
+            </p:cNvPicPr>
+            <p:nvPr/>
+          </p:nvPicPr>
+          <p:blipFill rotWithShape="1">
+            <a:blip r:embed="rId3">
+              <a:duotone>
+                <a:schemeClr val="accent4">
+                  <a:shade val="45000"/>
+                  <a:satMod val="135000"/>
+                </a:schemeClr>
+                <a:prstClr val="white"/>
+              </a:duotone>
+              <a:extLst>
+                <a:ext uri="{28A0092B-C50C-407E-A947-70E740481C1C}">
+                  <a14:useLocalDpi xmlns:a14="http://schemas.microsoft.com/office/drawing/2010/main" val="0"/>
+                </a:ext>
+              </a:extLst>
+            </a:blip>
+            <a:srcRect l="15072" r="77840"/>
+            <a:stretch/>
+          </p:blipFill>
+          <p:spPr bwMode="auto">
+            <a:xfrm>
+              <a:off x="1703562" y="4353272"/>
+              <a:ext cx="864096" cy="1524000"/>
+            </a:xfrm>
+            <a:prstGeom prst="rect">
+              <a:avLst/>
+            </a:prstGeom>
+            <a:noFill/>
+            <a:extLst>
+              <a:ext uri="{909E8E84-426E-40DD-AFC4-6F175D3DCCD1}">
+                <a14:hiddenFill xmlns:a14="http://schemas.microsoft.com/office/drawing/2010/main">
+                  <a:solidFill>
+                    <a:srgbClr val="FFFFFF"/>
+                  </a:solidFill>
+                </a14:hiddenFill>
+              </a:ext>
+            </a:extLst>
+          </p:spPr>
+        </p:pic>
+      </p:grpSp>
+      <p:grpSp>
+        <p:nvGrpSpPr>
+          <p:cNvPr id="57" name="Group 56">
+            <a:extLst>
+              <a:ext uri="{FF2B5EF4-FFF2-40B4-BE49-F238E27FC236}">
+                <a16:creationId xmlns:a16="http://schemas.microsoft.com/office/drawing/2014/main" id="{E6C3B5CB-5202-5326-52E0-3ACCD151D713}"/>
+              </a:ext>
+            </a:extLst>
+          </p:cNvPr>
+          <p:cNvGrpSpPr/>
+          <p:nvPr/>
+        </p:nvGrpSpPr>
+        <p:grpSpPr>
+          <a:xfrm>
+            <a:off x="5144469" y="4353272"/>
+            <a:ext cx="864096" cy="1524000"/>
+            <a:chOff x="5144469" y="4353272"/>
+            <a:chExt cx="864096" cy="1524000"/>
+          </a:xfrm>
+        </p:grpSpPr>
+        <p:sp>
+          <p:nvSpPr>
+            <p:cNvPr id="45" name="ZoneTexte 3">
+              <a:extLst>
+                <a:ext uri="{FF2B5EF4-FFF2-40B4-BE49-F238E27FC236}">
+                  <a16:creationId xmlns:a16="http://schemas.microsoft.com/office/drawing/2014/main" id="{71A878E6-3488-8B75-0D0A-7071691997EB}"/>
+                </a:ext>
+              </a:extLst>
+            </p:cNvPr>
+            <p:cNvSpPr txBox="1"/>
+            <p:nvPr/>
+          </p:nvSpPr>
+          <p:spPr>
+            <a:xfrm>
+              <a:off x="5231904" y="4797152"/>
+              <a:ext cx="720080" cy="384721"/>
+            </a:xfrm>
+            <a:prstGeom prst="rect">
+              <a:avLst/>
+            </a:prstGeom>
+            <a:noFill/>
+          </p:spPr>
+          <p:txBody>
+            <a:bodyPr wrap="square" rtlCol="0">
+              <a:spAutoFit/>
+            </a:bodyPr>
+            <a:lstStyle/>
+            <a:p>
+              <a:r>
+                <a:rPr lang="fr-FR" sz="1900" dirty="0">
+                  <a:solidFill>
+                    <a:srgbClr val="DEAD36"/>
+                  </a:solidFill>
+                  <a:latin typeface="RetroBoundmini" panose="02000603000000000000" pitchFamily="2" charset="0"/>
+                  <a:ea typeface="RetroBoundmini" panose="02000603000000000000" pitchFamily="2" charset="0"/>
+                </a:rPr>
+                <a:t>+200</a:t>
+              </a:r>
+            </a:p>
+          </p:txBody>
+        </p:sp>
+        <p:pic>
+          <p:nvPicPr>
+            <p:cNvPr id="46" name="Picture 45" descr="Icon&#10;&#10;Description automatically generated with low confidence">
+              <a:extLst>
+                <a:ext uri="{FF2B5EF4-FFF2-40B4-BE49-F238E27FC236}">
+                  <a16:creationId xmlns:a16="http://schemas.microsoft.com/office/drawing/2014/main" id="{7B3EB970-3C96-6870-3746-B4616937B5B7}"/>
+                </a:ext>
+              </a:extLst>
+            </p:cNvPr>
+            <p:cNvPicPr>
+              <a:picLocks noChangeAspect="1"/>
+            </p:cNvPicPr>
+            <p:nvPr/>
+          </p:nvPicPr>
+          <p:blipFill>
+            <a:blip r:embed="rId2">
+              <a:extLst>
+                <a:ext uri="{28A0092B-C50C-407E-A947-70E740481C1C}">
+                  <a14:useLocalDpi xmlns:a14="http://schemas.microsoft.com/office/drawing/2010/main" val="0"/>
+                </a:ext>
+              </a:extLst>
+            </a:blip>
+            <a:stretch>
+              <a:fillRect/>
+            </a:stretch>
+          </p:blipFill>
+          <p:spPr>
+            <a:xfrm>
+              <a:off x="5339916" y="5085184"/>
+              <a:ext cx="360040" cy="360040"/>
+            </a:xfrm>
+            <a:prstGeom prst="rect">
+              <a:avLst/>
+            </a:prstGeom>
+          </p:spPr>
+        </p:pic>
+        <p:pic>
+          <p:nvPicPr>
+            <p:cNvPr id="18" name="Picture 4">
+              <a:extLst>
+                <a:ext uri="{FF2B5EF4-FFF2-40B4-BE49-F238E27FC236}">
+                  <a16:creationId xmlns:a16="http://schemas.microsoft.com/office/drawing/2014/main" id="{FFD0E026-2C63-A2C7-D5CD-A0EF7F3897CD}"/>
+                </a:ext>
+              </a:extLst>
+            </p:cNvPr>
+            <p:cNvPicPr>
+              <a:picLocks noChangeAspect="1" noChangeArrowheads="1"/>
+            </p:cNvPicPr>
+            <p:nvPr/>
+          </p:nvPicPr>
+          <p:blipFill rotWithShape="1">
+            <a:blip r:embed="rId3">
+              <a:duotone>
+                <a:schemeClr val="accent4">
+                  <a:shade val="45000"/>
+                  <a:satMod val="135000"/>
+                </a:schemeClr>
+                <a:prstClr val="white"/>
+              </a:duotone>
+              <a:extLst>
+                <a:ext uri="{28A0092B-C50C-407E-A947-70E740481C1C}">
+                  <a14:useLocalDpi xmlns:a14="http://schemas.microsoft.com/office/drawing/2010/main" val="0"/>
+                </a:ext>
+              </a:extLst>
+            </a:blip>
+            <a:srcRect l="52767" r="40145"/>
+            <a:stretch/>
+          </p:blipFill>
+          <p:spPr bwMode="auto">
+            <a:xfrm>
+              <a:off x="5144469" y="4353272"/>
+              <a:ext cx="864096" cy="1524000"/>
+            </a:xfrm>
+            <a:prstGeom prst="rect">
+              <a:avLst/>
+            </a:prstGeom>
+            <a:noFill/>
+            <a:extLst>
+              <a:ext uri="{909E8E84-426E-40DD-AFC4-6F175D3DCCD1}">
+                <a14:hiddenFill xmlns:a14="http://schemas.microsoft.com/office/drawing/2010/main">
+                  <a:solidFill>
+                    <a:srgbClr val="FFFFFF"/>
+                  </a:solidFill>
+                </a14:hiddenFill>
+              </a:ext>
+            </a:extLst>
+          </p:spPr>
+        </p:pic>
+      </p:grpSp>
+      <p:grpSp>
+        <p:nvGrpSpPr>
+          <p:cNvPr id="58" name="Group 57">
+            <a:extLst>
+              <a:ext uri="{FF2B5EF4-FFF2-40B4-BE49-F238E27FC236}">
+                <a16:creationId xmlns:a16="http://schemas.microsoft.com/office/drawing/2014/main" id="{511DC13A-D86D-C3A5-3EBE-3571AF2BC9CB}"/>
+              </a:ext>
+            </a:extLst>
+          </p:cNvPr>
+          <p:cNvGrpSpPr/>
+          <p:nvPr/>
+        </p:nvGrpSpPr>
+        <p:grpSpPr>
+          <a:xfrm>
+            <a:off x="6269982" y="4343350"/>
+            <a:ext cx="864096" cy="1524000"/>
+            <a:chOff x="6269982" y="4343350"/>
+            <a:chExt cx="864096" cy="1524000"/>
+          </a:xfrm>
+        </p:grpSpPr>
+        <p:sp>
+          <p:nvSpPr>
+            <p:cNvPr id="47" name="ZoneTexte 3">
+              <a:extLst>
+                <a:ext uri="{FF2B5EF4-FFF2-40B4-BE49-F238E27FC236}">
+                  <a16:creationId xmlns:a16="http://schemas.microsoft.com/office/drawing/2014/main" id="{D70A2D3C-5BCB-3F4B-30D5-338701A70232}"/>
+                </a:ext>
+              </a:extLst>
+            </p:cNvPr>
+            <p:cNvSpPr txBox="1"/>
+            <p:nvPr/>
+          </p:nvSpPr>
+          <p:spPr>
+            <a:xfrm>
+              <a:off x="6312024" y="4797152"/>
+              <a:ext cx="720080" cy="384721"/>
+            </a:xfrm>
+            <a:prstGeom prst="rect">
+              <a:avLst/>
+            </a:prstGeom>
+            <a:noFill/>
+          </p:spPr>
+          <p:txBody>
+            <a:bodyPr wrap="square" rtlCol="0">
+              <a:spAutoFit/>
+            </a:bodyPr>
+            <a:lstStyle/>
+            <a:p>
+              <a:r>
+                <a:rPr lang="fr-FR" sz="1900" dirty="0">
+                  <a:solidFill>
+                    <a:srgbClr val="DEAD36"/>
+                  </a:solidFill>
+                  <a:latin typeface="RetroBoundmini" panose="02000603000000000000" pitchFamily="2" charset="0"/>
+                  <a:ea typeface="RetroBoundmini" panose="02000603000000000000" pitchFamily="2" charset="0"/>
+                </a:rPr>
+                <a:t>+200</a:t>
+              </a:r>
+            </a:p>
+          </p:txBody>
+        </p:sp>
+        <p:pic>
+          <p:nvPicPr>
+            <p:cNvPr id="48" name="Picture 47" descr="Icon&#10;&#10;Description automatically generated with low confidence">
+              <a:extLst>
+                <a:ext uri="{FF2B5EF4-FFF2-40B4-BE49-F238E27FC236}">
+                  <a16:creationId xmlns:a16="http://schemas.microsoft.com/office/drawing/2014/main" id="{393E7098-8726-5251-07F9-B6107B94E583}"/>
+                </a:ext>
+              </a:extLst>
+            </p:cNvPr>
+            <p:cNvPicPr>
+              <a:picLocks noChangeAspect="1"/>
+            </p:cNvPicPr>
+            <p:nvPr/>
+          </p:nvPicPr>
+          <p:blipFill>
+            <a:blip r:embed="rId2">
+              <a:extLst>
+                <a:ext uri="{28A0092B-C50C-407E-A947-70E740481C1C}">
+                  <a14:useLocalDpi xmlns:a14="http://schemas.microsoft.com/office/drawing/2010/main" val="0"/>
+                </a:ext>
+              </a:extLst>
+            </a:blip>
+            <a:stretch>
+              <a:fillRect/>
+            </a:stretch>
+          </p:blipFill>
+          <p:spPr>
+            <a:xfrm>
+              <a:off x="6492044" y="5085184"/>
+              <a:ext cx="360040" cy="360040"/>
+            </a:xfrm>
+            <a:prstGeom prst="rect">
+              <a:avLst/>
+            </a:prstGeom>
+          </p:spPr>
+        </p:pic>
+        <p:pic>
+          <p:nvPicPr>
+            <p:cNvPr id="19" name="Picture 4">
+              <a:extLst>
+                <a:ext uri="{FF2B5EF4-FFF2-40B4-BE49-F238E27FC236}">
+                  <a16:creationId xmlns:a16="http://schemas.microsoft.com/office/drawing/2014/main" id="{58CC56AD-B1C6-532B-59E3-7CF84A3991A1}"/>
+                </a:ext>
+              </a:extLst>
+            </p:cNvPr>
+            <p:cNvPicPr>
+              <a:picLocks noChangeAspect="1" noChangeArrowheads="1"/>
+            </p:cNvPicPr>
+            <p:nvPr/>
+          </p:nvPicPr>
+          <p:blipFill rotWithShape="1">
+            <a:blip r:embed="rId3">
+              <a:duotone>
+                <a:schemeClr val="accent4">
+                  <a:shade val="45000"/>
+                  <a:satMod val="135000"/>
+                </a:schemeClr>
+                <a:prstClr val="white"/>
+              </a:duotone>
+              <a:extLst>
+                <a:ext uri="{28A0092B-C50C-407E-A947-70E740481C1C}">
+                  <a14:useLocalDpi xmlns:a14="http://schemas.microsoft.com/office/drawing/2010/main" val="0"/>
+                </a:ext>
+              </a:extLst>
+            </a:blip>
+            <a:srcRect l="65200" r="27712"/>
+            <a:stretch/>
+          </p:blipFill>
+          <p:spPr bwMode="auto">
+            <a:xfrm>
+              <a:off x="6269982" y="4343350"/>
+              <a:ext cx="864096" cy="1524000"/>
+            </a:xfrm>
+            <a:prstGeom prst="rect">
+              <a:avLst/>
+            </a:prstGeom>
+            <a:noFill/>
+            <a:extLst>
+              <a:ext uri="{909E8E84-426E-40DD-AFC4-6F175D3DCCD1}">
+                <a14:hiddenFill xmlns:a14="http://schemas.microsoft.com/office/drawing/2010/main">
+                  <a:solidFill>
+                    <a:srgbClr val="FFFFFF"/>
+                  </a:solidFill>
+                </a14:hiddenFill>
+              </a:ext>
+            </a:extLst>
+          </p:spPr>
+        </p:pic>
+      </p:grpSp>
+      <p:pic>
+        <p:nvPicPr>
+          <p:cNvPr id="4" name="Picture 6">
+            <a:extLst>
+              <a:ext uri="{FF2B5EF4-FFF2-40B4-BE49-F238E27FC236}">
+                <a16:creationId xmlns:a16="http://schemas.microsoft.com/office/drawing/2014/main" id="{C2097443-816B-7C92-55B0-CE964304BA29}"/>
+              </a:ext>
+            </a:extLst>
+          </p:cNvPr>
+          <p:cNvPicPr>
+            <a:picLocks noChangeAspect="1" noChangeArrowheads="1"/>
+          </p:cNvPicPr>
+          <p:nvPr/>
+        </p:nvPicPr>
+        <p:blipFill rotWithShape="1">
+          <a:blip r:embed="rId4">
+            <a:extLst>
+              <a:ext uri="{28A0092B-C50C-407E-A947-70E740481C1C}">
+                <a14:useLocalDpi xmlns:a14="http://schemas.microsoft.com/office/drawing/2010/main" val="0"/>
+              </a:ext>
+            </a:extLst>
+          </a:blip>
+          <a:srcRect l="3125" t="37500" r="94792" b="34375"/>
+          <a:stretch/>
+        </p:blipFill>
+        <p:spPr bwMode="auto">
+          <a:xfrm>
+            <a:off x="839416" y="1340768"/>
+            <a:ext cx="576064" cy="648072"/>
+          </a:xfrm>
+          <a:prstGeom prst="rect">
+            <a:avLst/>
+          </a:prstGeom>
+          <a:noFill/>
+          <a:extLst>
+            <a:ext uri="{909E8E84-426E-40DD-AFC4-6F175D3DCCD1}">
+              <a14:hiddenFill xmlns:a14="http://schemas.microsoft.com/office/drawing/2010/main">
+                <a:solidFill>
+                  <a:srgbClr val="FFFFFF"/>
+                </a:solidFill>
+              </a14:hiddenFill>
+            </a:ext>
+          </a:extLst>
+        </p:spPr>
+      </p:pic>
+      <p:pic>
+        <p:nvPicPr>
+          <p:cNvPr id="5" name="Picture 6">
+            <a:extLst>
+              <a:ext uri="{FF2B5EF4-FFF2-40B4-BE49-F238E27FC236}">
+                <a16:creationId xmlns:a16="http://schemas.microsoft.com/office/drawing/2014/main" id="{B8D9B769-5DA0-44CB-04DB-CD63A1F48F3D}"/>
+              </a:ext>
+            </a:extLst>
+          </p:cNvPr>
+          <p:cNvPicPr>
+            <a:picLocks noChangeAspect="1" noChangeArrowheads="1"/>
+          </p:cNvPicPr>
+          <p:nvPr/>
+        </p:nvPicPr>
+        <p:blipFill rotWithShape="1">
+          <a:blip r:embed="rId4">
+            <a:extLst>
+              <a:ext uri="{28A0092B-C50C-407E-A947-70E740481C1C}">
+                <a14:useLocalDpi xmlns:a14="http://schemas.microsoft.com/office/drawing/2010/main" val="0"/>
+              </a:ext>
+            </a:extLst>
+          </a:blip>
+          <a:srcRect l="11459" t="37500" r="86198" b="28125"/>
+          <a:stretch/>
+        </p:blipFill>
+        <p:spPr bwMode="auto">
+          <a:xfrm>
+            <a:off x="1559496" y="1340768"/>
+            <a:ext cx="648072" cy="792088"/>
+          </a:xfrm>
+          <a:prstGeom prst="rect">
+            <a:avLst/>
+          </a:prstGeom>
+          <a:noFill/>
+          <a:extLst>
+            <a:ext uri="{909E8E84-426E-40DD-AFC4-6F175D3DCCD1}">
+              <a14:hiddenFill xmlns:a14="http://schemas.microsoft.com/office/drawing/2010/main">
+                <a:solidFill>
+                  <a:srgbClr val="FFFFFF"/>
+                </a:solidFill>
+              </a14:hiddenFill>
+            </a:ext>
+          </a:extLst>
+        </p:spPr>
+      </p:pic>
+      <p:pic>
+        <p:nvPicPr>
+          <p:cNvPr id="6" name="Picture 6">
+            <a:extLst>
+              <a:ext uri="{FF2B5EF4-FFF2-40B4-BE49-F238E27FC236}">
+                <a16:creationId xmlns:a16="http://schemas.microsoft.com/office/drawing/2014/main" id="{0B94B4F8-50AD-5072-09A5-8AF0289F0F89}"/>
+              </a:ext>
+            </a:extLst>
+          </p:cNvPr>
+          <p:cNvPicPr>
+            <a:picLocks noChangeAspect="1" noChangeArrowheads="1"/>
+          </p:cNvPicPr>
+          <p:nvPr/>
+        </p:nvPicPr>
+        <p:blipFill rotWithShape="1">
+          <a:blip r:embed="rId4">
+            <a:extLst>
+              <a:ext uri="{28A0092B-C50C-407E-A947-70E740481C1C}">
+                <a14:useLocalDpi xmlns:a14="http://schemas.microsoft.com/office/drawing/2010/main" val="0"/>
+              </a:ext>
+            </a:extLst>
+          </a:blip>
+          <a:srcRect l="19788" t="37500" r="77348" b="28125"/>
+          <a:stretch/>
+        </p:blipFill>
+        <p:spPr bwMode="auto">
+          <a:xfrm>
+            <a:off x="2351584" y="1340768"/>
+            <a:ext cx="792088" cy="792088"/>
+          </a:xfrm>
+          <a:prstGeom prst="rect">
+            <a:avLst/>
+          </a:prstGeom>
+          <a:noFill/>
+          <a:extLst>
+            <a:ext uri="{909E8E84-426E-40DD-AFC4-6F175D3DCCD1}">
+              <a14:hiddenFill xmlns:a14="http://schemas.microsoft.com/office/drawing/2010/main">
+                <a:solidFill>
+                  <a:srgbClr val="FFFFFF"/>
+                </a:solidFill>
+              </a14:hiddenFill>
+            </a:ext>
+          </a:extLst>
+        </p:spPr>
+      </p:pic>
+      <p:pic>
+        <p:nvPicPr>
+          <p:cNvPr id="7" name="Picture 6">
+            <a:extLst>
+              <a:ext uri="{FF2B5EF4-FFF2-40B4-BE49-F238E27FC236}">
+                <a16:creationId xmlns:a16="http://schemas.microsoft.com/office/drawing/2014/main" id="{A3C025DE-F07D-9F8F-55E2-EA9C8F2FA583}"/>
+              </a:ext>
+            </a:extLst>
+          </p:cNvPr>
+          <p:cNvPicPr>
+            <a:picLocks noChangeAspect="1" noChangeArrowheads="1"/>
+          </p:cNvPicPr>
+          <p:nvPr/>
+        </p:nvPicPr>
+        <p:blipFill rotWithShape="1">
+          <a:blip r:embed="rId4">
+            <a:extLst>
+              <a:ext uri="{28A0092B-C50C-407E-A947-70E740481C1C}">
+                <a14:useLocalDpi xmlns:a14="http://schemas.microsoft.com/office/drawing/2010/main" val="0"/>
+              </a:ext>
+            </a:extLst>
+          </a:blip>
+          <a:srcRect l="28379" t="37500" r="69018" b="28125"/>
+          <a:stretch/>
+        </p:blipFill>
+        <p:spPr bwMode="auto">
+          <a:xfrm>
+            <a:off x="3215680" y="1340768"/>
+            <a:ext cx="720080" cy="792088"/>
+          </a:xfrm>
+          <a:prstGeom prst="rect">
+            <a:avLst/>
+          </a:prstGeom>
+          <a:noFill/>
+          <a:extLst>
+            <a:ext uri="{909E8E84-426E-40DD-AFC4-6F175D3DCCD1}">
+              <a14:hiddenFill xmlns:a14="http://schemas.microsoft.com/office/drawing/2010/main">
+                <a:solidFill>
+                  <a:srgbClr val="FFFFFF"/>
+                </a:solidFill>
+              </a14:hiddenFill>
+            </a:ext>
+          </a:extLst>
+        </p:spPr>
+      </p:pic>
+      <p:pic>
+        <p:nvPicPr>
+          <p:cNvPr id="8" name="Picture 7">
+            <a:extLst>
+              <a:ext uri="{FF2B5EF4-FFF2-40B4-BE49-F238E27FC236}">
+                <a16:creationId xmlns:a16="http://schemas.microsoft.com/office/drawing/2014/main" id="{2270F174-3743-7438-F238-78E85A130752}"/>
+              </a:ext>
+            </a:extLst>
+          </p:cNvPr>
+          <p:cNvPicPr>
+            <a:picLocks noChangeAspect="1" noChangeArrowheads="1"/>
+          </p:cNvPicPr>
+          <p:nvPr/>
+        </p:nvPicPr>
+        <p:blipFill rotWithShape="1">
+          <a:blip r:embed="rId4">
+            <a:extLst>
+              <a:ext uri="{28A0092B-C50C-407E-A947-70E740481C1C}">
+                <a14:useLocalDpi xmlns:a14="http://schemas.microsoft.com/office/drawing/2010/main" val="0"/>
+              </a:ext>
+            </a:extLst>
+          </a:blip>
+          <a:srcRect l="36971" t="37500" r="60947" b="28125"/>
+          <a:stretch/>
+        </p:blipFill>
+        <p:spPr bwMode="auto">
+          <a:xfrm>
+            <a:off x="4079776" y="1346508"/>
+            <a:ext cx="576064" cy="792088"/>
+          </a:xfrm>
+          <a:prstGeom prst="rect">
+            <a:avLst/>
+          </a:prstGeom>
+          <a:noFill/>
+          <a:extLst>
+            <a:ext uri="{909E8E84-426E-40DD-AFC4-6F175D3DCCD1}">
+              <a14:hiddenFill xmlns:a14="http://schemas.microsoft.com/office/drawing/2010/main">
+                <a:solidFill>
+                  <a:srgbClr val="FFFFFF"/>
+                </a:solidFill>
+              </a14:hiddenFill>
+            </a:ext>
+          </a:extLst>
+        </p:spPr>
+      </p:pic>
+      <p:pic>
+        <p:nvPicPr>
+          <p:cNvPr id="9" name="Picture 8">
+            <a:extLst>
+              <a:ext uri="{FF2B5EF4-FFF2-40B4-BE49-F238E27FC236}">
+                <a16:creationId xmlns:a16="http://schemas.microsoft.com/office/drawing/2014/main" id="{2B4BA0C4-11A5-86D9-5EDD-E4489B5C8391}"/>
+              </a:ext>
+            </a:extLst>
+          </p:cNvPr>
+          <p:cNvPicPr>
+            <a:picLocks noChangeAspect="1" noChangeArrowheads="1"/>
+          </p:cNvPicPr>
+          <p:nvPr/>
+        </p:nvPicPr>
+        <p:blipFill rotWithShape="1">
+          <a:blip r:embed="rId4">
+            <a:extLst>
+              <a:ext uri="{28A0092B-C50C-407E-A947-70E740481C1C}">
+                <a14:useLocalDpi xmlns:a14="http://schemas.microsoft.com/office/drawing/2010/main" val="0"/>
+              </a:ext>
+            </a:extLst>
+          </a:blip>
+          <a:srcRect l="44777" t="37500" r="52881" b="28125"/>
+          <a:stretch/>
+        </p:blipFill>
+        <p:spPr bwMode="auto">
+          <a:xfrm>
+            <a:off x="4691843" y="1349936"/>
+            <a:ext cx="648074" cy="792088"/>
+          </a:xfrm>
+          <a:prstGeom prst="rect">
+            <a:avLst/>
+          </a:prstGeom>
+          <a:noFill/>
+          <a:extLst>
+            <a:ext uri="{909E8E84-426E-40DD-AFC4-6F175D3DCCD1}">
+              <a14:hiddenFill xmlns:a14="http://schemas.microsoft.com/office/drawing/2010/main">
+                <a:solidFill>
+                  <a:srgbClr val="FFFFFF"/>
+                </a:solidFill>
+              </a14:hiddenFill>
+            </a:ext>
+          </a:extLst>
+        </p:spPr>
+      </p:pic>
+      <p:pic>
+        <p:nvPicPr>
+          <p:cNvPr id="10" name="Picture 9">
+            <a:extLst>
+              <a:ext uri="{FF2B5EF4-FFF2-40B4-BE49-F238E27FC236}">
+                <a16:creationId xmlns:a16="http://schemas.microsoft.com/office/drawing/2014/main" id="{27D390F9-0F7F-46CC-DFC7-56FBD67A30F8}"/>
+              </a:ext>
+            </a:extLst>
+          </p:cNvPr>
+          <p:cNvPicPr>
+            <a:picLocks noChangeAspect="1" noChangeArrowheads="1"/>
+          </p:cNvPicPr>
+          <p:nvPr/>
+        </p:nvPicPr>
+        <p:blipFill rotWithShape="1">
+          <a:blip r:embed="rId4">
+            <a:extLst>
+              <a:ext uri="{28A0092B-C50C-407E-A947-70E740481C1C}">
+                <a14:useLocalDpi xmlns:a14="http://schemas.microsoft.com/office/drawing/2010/main" val="0"/>
+              </a:ext>
+            </a:extLst>
+          </a:blip>
+          <a:srcRect l="53313" t="37500" r="44605" b="28125"/>
+          <a:stretch/>
+        </p:blipFill>
+        <p:spPr bwMode="auto">
+          <a:xfrm>
+            <a:off x="5586204" y="1362532"/>
+            <a:ext cx="576063" cy="792088"/>
+          </a:xfrm>
+          <a:prstGeom prst="rect">
+            <a:avLst/>
+          </a:prstGeom>
+          <a:noFill/>
+          <a:extLst>
+            <a:ext uri="{909E8E84-426E-40DD-AFC4-6F175D3DCCD1}">
+              <a14:hiddenFill xmlns:a14="http://schemas.microsoft.com/office/drawing/2010/main">
+                <a:solidFill>
+                  <a:srgbClr val="FFFFFF"/>
+                </a:solidFill>
+              </a14:hiddenFill>
+            </a:ext>
+          </a:extLst>
+        </p:spPr>
+      </p:pic>
+      <p:pic>
+        <p:nvPicPr>
+          <p:cNvPr id="11" name="Picture 10">
+            <a:extLst>
+              <a:ext uri="{FF2B5EF4-FFF2-40B4-BE49-F238E27FC236}">
+                <a16:creationId xmlns:a16="http://schemas.microsoft.com/office/drawing/2014/main" id="{C118F22A-ED92-4EDA-DF7B-170171129238}"/>
+              </a:ext>
+            </a:extLst>
+          </p:cNvPr>
+          <p:cNvPicPr>
+            <a:picLocks noChangeAspect="1" noChangeArrowheads="1"/>
+          </p:cNvPicPr>
+          <p:nvPr/>
+        </p:nvPicPr>
+        <p:blipFill rotWithShape="1">
+          <a:blip r:embed="rId4">
+            <a:extLst>
+              <a:ext uri="{28A0092B-C50C-407E-A947-70E740481C1C}">
+                <a14:useLocalDpi xmlns:a14="http://schemas.microsoft.com/office/drawing/2010/main" val="0"/>
+              </a:ext>
+            </a:extLst>
+          </a:blip>
+          <a:srcRect l="61771" t="33978" r="36407" b="28125"/>
+          <a:stretch/>
+        </p:blipFill>
+        <p:spPr bwMode="auto">
+          <a:xfrm>
+            <a:off x="6306284" y="1268760"/>
+            <a:ext cx="504056" cy="873264"/>
+          </a:xfrm>
+          <a:prstGeom prst="rect">
+            <a:avLst/>
+          </a:prstGeom>
+          <a:noFill/>
+          <a:extLst>
+            <a:ext uri="{909E8E84-426E-40DD-AFC4-6F175D3DCCD1}">
+              <a14:hiddenFill xmlns:a14="http://schemas.microsoft.com/office/drawing/2010/main">
+                <a:solidFill>
+                  <a:srgbClr val="FFFFFF"/>
+                </a:solidFill>
+              </a14:hiddenFill>
+            </a:ext>
+          </a:extLst>
+        </p:spPr>
+      </p:pic>
+      <p:pic>
+        <p:nvPicPr>
+          <p:cNvPr id="12" name="Picture 11">
+            <a:extLst>
+              <a:ext uri="{FF2B5EF4-FFF2-40B4-BE49-F238E27FC236}">
+                <a16:creationId xmlns:a16="http://schemas.microsoft.com/office/drawing/2014/main" id="{564A51F9-E8A0-EC20-CBBA-DA37B1CDD7EE}"/>
+              </a:ext>
+            </a:extLst>
+          </p:cNvPr>
+          <p:cNvPicPr>
+            <a:picLocks noChangeAspect="1" noChangeArrowheads="1"/>
+          </p:cNvPicPr>
+          <p:nvPr/>
+        </p:nvPicPr>
+        <p:blipFill rotWithShape="1">
+          <a:blip r:embed="rId4">
+            <a:extLst>
+              <a:ext uri="{28A0092B-C50C-407E-A947-70E740481C1C}">
+                <a14:useLocalDpi xmlns:a14="http://schemas.microsoft.com/office/drawing/2010/main" val="0"/>
+              </a:ext>
+            </a:extLst>
+          </a:blip>
+          <a:srcRect l="70178" t="33978" r="27740" b="28125"/>
+          <a:stretch/>
+        </p:blipFill>
+        <p:spPr bwMode="auto">
+          <a:xfrm>
+            <a:off x="6907852" y="1228172"/>
+            <a:ext cx="576063" cy="873264"/>
+          </a:xfrm>
+          <a:prstGeom prst="rect">
+            <a:avLst/>
+          </a:prstGeom>
+          <a:noFill/>
+          <a:extLst>
+            <a:ext uri="{909E8E84-426E-40DD-AFC4-6F175D3DCCD1}">
+              <a14:hiddenFill xmlns:a14="http://schemas.microsoft.com/office/drawing/2010/main">
+                <a:solidFill>
+                  <a:srgbClr val="FFFFFF"/>
+                </a:solidFill>
+              </a14:hiddenFill>
+            </a:ext>
+          </a:extLst>
+        </p:spPr>
+      </p:pic>
+      <p:pic>
+        <p:nvPicPr>
+          <p:cNvPr id="13" name="Picture 12">
+            <a:extLst>
+              <a:ext uri="{FF2B5EF4-FFF2-40B4-BE49-F238E27FC236}">
+                <a16:creationId xmlns:a16="http://schemas.microsoft.com/office/drawing/2014/main" id="{FC1AFA8F-1AA2-C5E8-30DF-8AB4334C20AF}"/>
+              </a:ext>
+            </a:extLst>
+          </p:cNvPr>
+          <p:cNvPicPr>
+            <a:picLocks noChangeAspect="1" noChangeArrowheads="1"/>
+          </p:cNvPicPr>
+          <p:nvPr/>
+        </p:nvPicPr>
+        <p:blipFill rotWithShape="1">
+          <a:blip r:embed="rId4">
+            <a:extLst>
+              <a:ext uri="{28A0092B-C50C-407E-A947-70E740481C1C}">
+                <a14:useLocalDpi xmlns:a14="http://schemas.microsoft.com/office/drawing/2010/main" val="0"/>
+              </a:ext>
+            </a:extLst>
+          </a:blip>
+          <a:srcRect l="78466" t="33978" r="19452" b="28125"/>
+          <a:stretch/>
+        </p:blipFill>
+        <p:spPr bwMode="auto">
+          <a:xfrm>
+            <a:off x="7581427" y="1228172"/>
+            <a:ext cx="576064" cy="873264"/>
+          </a:xfrm>
+          <a:prstGeom prst="rect">
+            <a:avLst/>
+          </a:prstGeom>
+          <a:noFill/>
+          <a:extLst>
+            <a:ext uri="{909E8E84-426E-40DD-AFC4-6F175D3DCCD1}">
+              <a14:hiddenFill xmlns:a14="http://schemas.microsoft.com/office/drawing/2010/main">
+                <a:solidFill>
+                  <a:srgbClr val="FFFFFF"/>
+                </a:solidFill>
+              </a14:hiddenFill>
+            </a:ext>
+          </a:extLst>
+        </p:spPr>
+      </p:pic>
+      <p:pic>
+        <p:nvPicPr>
+          <p:cNvPr id="12290" name="Picture 2">
+            <a:extLst>
+              <a:ext uri="{FF2B5EF4-FFF2-40B4-BE49-F238E27FC236}">
+                <a16:creationId xmlns:a16="http://schemas.microsoft.com/office/drawing/2014/main" id="{0D30B644-9B91-0BCF-BCBC-A533CC4CA62F}"/>
+              </a:ext>
+            </a:extLst>
+          </p:cNvPr>
+          <p:cNvPicPr>
+            <a:picLocks noChangeAspect="1" noChangeArrowheads="1"/>
+          </p:cNvPicPr>
+          <p:nvPr/>
+        </p:nvPicPr>
+        <p:blipFill rotWithShape="1">
+          <a:blip r:embed="rId5">
+            <a:extLst>
+              <a:ext uri="{28A0092B-C50C-407E-A947-70E740481C1C}">
+                <a14:useLocalDpi xmlns:a14="http://schemas.microsoft.com/office/drawing/2010/main" val="0"/>
+              </a:ext>
+            </a:extLst>
+          </a:blip>
+          <a:srcRect l="37400" b="66668"/>
+          <a:stretch/>
+        </p:blipFill>
+        <p:spPr bwMode="auto">
+          <a:xfrm>
+            <a:off x="3071664" y="2636912"/>
+            <a:ext cx="2146548" cy="1142960"/>
+          </a:xfrm>
+          <a:prstGeom prst="rect">
+            <a:avLst/>
+          </a:prstGeom>
+          <a:noFill/>
+          <a:extLst>
+            <a:ext uri="{909E8E84-426E-40DD-AFC4-6F175D3DCCD1}">
+              <a14:hiddenFill xmlns:a14="http://schemas.microsoft.com/office/drawing/2010/main">
+                <a:solidFill>
+                  <a:srgbClr val="FFFFFF"/>
+                </a:solidFill>
+              </a14:hiddenFill>
+            </a:ext>
+          </a:extLst>
+        </p:spPr>
+      </p:pic>
+      <p:grpSp>
+        <p:nvGrpSpPr>
+          <p:cNvPr id="53" name="Group 52">
+            <a:extLst>
+              <a:ext uri="{FF2B5EF4-FFF2-40B4-BE49-F238E27FC236}">
+                <a16:creationId xmlns:a16="http://schemas.microsoft.com/office/drawing/2014/main" id="{102ABEE5-4B0B-EB4C-4EEA-C5BC629CC960}"/>
+              </a:ext>
+            </a:extLst>
+          </p:cNvPr>
+          <p:cNvGrpSpPr/>
+          <p:nvPr/>
+        </p:nvGrpSpPr>
+        <p:grpSpPr>
+          <a:xfrm>
+            <a:off x="551384" y="4365104"/>
+            <a:ext cx="864096" cy="1524000"/>
+            <a:chOff x="551384" y="4365104"/>
+            <a:chExt cx="864096" cy="1524000"/>
+          </a:xfrm>
+        </p:grpSpPr>
         <p:pic>
           <p:nvPicPr>
             <p:cNvPr id="14" name="Picture 4">
@@ -11107,7 +12444,7 @@
             <p:nvPr/>
           </p:nvPicPr>
           <p:blipFill rotWithShape="1">
-            <a:blip r:embed="rId5">
+            <a:blip r:embed="rId3">
               <a:duotone>
                 <a:schemeClr val="accent4">
                   <a:shade val="45000"/>
@@ -11144,138 +12481,90 @@
             </a:extLst>
           </p:spPr>
         </p:pic>
-      </p:grpSp>
-      <p:grpSp>
-        <p:nvGrpSpPr>
-          <p:cNvPr id="30" name="Group 29">
-            <a:extLst>
-              <a:ext uri="{FF2B5EF4-FFF2-40B4-BE49-F238E27FC236}">
-                <a16:creationId xmlns:a16="http://schemas.microsoft.com/office/drawing/2014/main" id="{8BBE405A-A6C9-563D-2CAD-A393342BAC32}"/>
-              </a:ext>
-            </a:extLst>
-          </p:cNvPr>
-          <p:cNvGrpSpPr/>
-          <p:nvPr/>
-        </p:nvGrpSpPr>
-        <p:grpSpPr>
-          <a:xfrm>
-            <a:off x="1703562" y="4365104"/>
-            <a:ext cx="864096" cy="1524000"/>
-            <a:chOff x="1703562" y="4365104"/>
-            <a:chExt cx="864096" cy="1524000"/>
-          </a:xfrm>
-        </p:grpSpPr>
+        <p:sp>
+          <p:nvSpPr>
+            <p:cNvPr id="2" name="ZoneTexte 3">
+              <a:extLst>
+                <a:ext uri="{FF2B5EF4-FFF2-40B4-BE49-F238E27FC236}">
+                  <a16:creationId xmlns:a16="http://schemas.microsoft.com/office/drawing/2014/main" id="{B701401A-39E0-AA96-C055-6A55DCDA14A4}"/>
+                </a:ext>
+              </a:extLst>
+            </p:cNvPr>
+            <p:cNvSpPr txBox="1"/>
+            <p:nvPr/>
+          </p:nvSpPr>
+          <p:spPr>
+            <a:xfrm>
+              <a:off x="623392" y="4797152"/>
+              <a:ext cx="720080" cy="384721"/>
+            </a:xfrm>
+            <a:prstGeom prst="rect">
+              <a:avLst/>
+            </a:prstGeom>
+            <a:noFill/>
+          </p:spPr>
+          <p:txBody>
+            <a:bodyPr wrap="square" rtlCol="0">
+              <a:spAutoFit/>
+            </a:bodyPr>
+            <a:lstStyle/>
+            <a:p>
+              <a:r>
+                <a:rPr lang="fr-FR" sz="1900" dirty="0">
+                  <a:solidFill>
+                    <a:srgbClr val="DEAD36"/>
+                  </a:solidFill>
+                  <a:latin typeface="RetroBoundmini" panose="02000603000000000000" pitchFamily="2" charset="0"/>
+                  <a:ea typeface="RetroBoundmini" panose="02000603000000000000" pitchFamily="2" charset="0"/>
+                </a:rPr>
+                <a:t>+200</a:t>
+              </a:r>
+            </a:p>
+          </p:txBody>
+        </p:sp>
         <p:pic>
           <p:nvPicPr>
-            <p:cNvPr id="22" name="Picture 4">
+            <p:cNvPr id="37" name="Picture 36" descr="Icon&#10;&#10;Description automatically generated with low confidence">
               <a:extLst>
                 <a:ext uri="{FF2B5EF4-FFF2-40B4-BE49-F238E27FC236}">
-                  <a16:creationId xmlns:a16="http://schemas.microsoft.com/office/drawing/2014/main" id="{86CC6CDA-F2A7-4852-C0B5-EB36F308F677}"/>
+                  <a16:creationId xmlns:a16="http://schemas.microsoft.com/office/drawing/2014/main" id="{47FC092F-11A0-7363-2D3C-90BD87FD2723}"/>
                 </a:ext>
               </a:extLst>
             </p:cNvPr>
             <p:cNvPicPr>
-              <a:picLocks noChangeAspect="1" noChangeArrowheads="1"/>
+              <a:picLocks noChangeAspect="1"/>
             </p:cNvPicPr>
             <p:nvPr/>
           </p:nvPicPr>
-          <p:blipFill rotWithShape="1">
+          <p:blipFill>
             <a:blip r:embed="rId2">
-              <a:duotone>
-                <a:schemeClr val="accent4">
-                  <a:shade val="45000"/>
-                  <a:satMod val="135000"/>
-                </a:schemeClr>
-                <a:prstClr val="white"/>
-              </a:duotone>
               <a:extLst>
                 <a:ext uri="{28A0092B-C50C-407E-A947-70E740481C1C}">
                   <a14:useLocalDpi xmlns:a14="http://schemas.microsoft.com/office/drawing/2010/main" val="0"/>
                 </a:ext>
               </a:extLst>
             </a:blip>
-            <a:srcRect l="37802" b="67548"/>
-            <a:stretch/>
+            <a:stretch>
+              <a:fillRect/>
+            </a:stretch>
           </p:blipFill>
-          <p:spPr bwMode="auto">
+          <p:spPr>
             <a:xfrm>
-              <a:off x="1820996" y="4941168"/>
-              <a:ext cx="690054" cy="360040"/>
+              <a:off x="803412" y="5085184"/>
+              <a:ext cx="360040" cy="360040"/>
             </a:xfrm>
             <a:prstGeom prst="rect">
               <a:avLst/>
             </a:prstGeom>
-            <a:noFill/>
-            <a:extLst>
-              <a:ext uri="{909E8E84-426E-40DD-AFC4-6F175D3DCCD1}">
-                <a14:hiddenFill xmlns:a14="http://schemas.microsoft.com/office/drawing/2010/main">
-                  <a:solidFill>
-                    <a:srgbClr val="FFFFFF"/>
-                  </a:solidFill>
-                </a14:hiddenFill>
-              </a:ext>
-            </a:extLst>
-          </p:spPr>
-        </p:pic>
-        <p:pic>
-          <p:nvPicPr>
-            <p:cNvPr id="15" name="Picture 4">
-              <a:extLst>
-                <a:ext uri="{FF2B5EF4-FFF2-40B4-BE49-F238E27FC236}">
-                  <a16:creationId xmlns:a16="http://schemas.microsoft.com/office/drawing/2014/main" id="{31F6879F-4A00-0082-32E2-25453464D6A6}"/>
-                </a:ext>
-              </a:extLst>
-            </p:cNvPr>
-            <p:cNvPicPr>
-              <a:picLocks noChangeAspect="1" noChangeArrowheads="1"/>
-            </p:cNvPicPr>
-            <p:nvPr/>
-          </p:nvPicPr>
-          <p:blipFill rotWithShape="1">
-            <a:blip r:embed="rId5">
-              <a:duotone>
-                <a:schemeClr val="accent4">
-                  <a:shade val="45000"/>
-                  <a:satMod val="135000"/>
-                </a:schemeClr>
-                <a:prstClr val="white"/>
-              </a:duotone>
-              <a:extLst>
-                <a:ext uri="{28A0092B-C50C-407E-A947-70E740481C1C}">
-                  <a14:useLocalDpi xmlns:a14="http://schemas.microsoft.com/office/drawing/2010/main" val="0"/>
-                </a:ext>
-              </a:extLst>
-            </a:blip>
-            <a:srcRect l="15072" r="77840"/>
-            <a:stretch/>
-          </p:blipFill>
-          <p:spPr bwMode="auto">
-            <a:xfrm>
-              <a:off x="1703562" y="4365104"/>
-              <a:ext cx="864096" cy="1524000"/>
-            </a:xfrm>
-            <a:prstGeom prst="rect">
-              <a:avLst/>
-            </a:prstGeom>
-            <a:noFill/>
-            <a:extLst>
-              <a:ext uri="{909E8E84-426E-40DD-AFC4-6F175D3DCCD1}">
-                <a14:hiddenFill xmlns:a14="http://schemas.microsoft.com/office/drawing/2010/main">
-                  <a:solidFill>
-                    <a:srgbClr val="FFFFFF"/>
-                  </a:solidFill>
-                </a14:hiddenFill>
-              </a:ext>
-            </a:extLst>
           </p:spPr>
         </p:pic>
       </p:grpSp>
       <p:grpSp>
         <p:nvGrpSpPr>
-          <p:cNvPr id="31" name="Group 30">
-            <a:extLst>
-              <a:ext uri="{FF2B5EF4-FFF2-40B4-BE49-F238E27FC236}">
-                <a16:creationId xmlns:a16="http://schemas.microsoft.com/office/drawing/2014/main" id="{4E5A7E7E-0215-E478-0D96-8DF34C3FA399}"/>
+          <p:cNvPr id="59" name="Group 58">
+            <a:extLst>
+              <a:ext uri="{FF2B5EF4-FFF2-40B4-BE49-F238E27FC236}">
+                <a16:creationId xmlns:a16="http://schemas.microsoft.com/office/drawing/2014/main" id="{38F2E2EB-A669-4782-B05C-337A968D6A33}"/>
               </a:ext>
             </a:extLst>
           </p:cNvPr>
@@ -11284,491 +12573,12 @@
         </p:nvGrpSpPr>
         <p:grpSpPr>
           <a:xfrm>
-            <a:off x="2855740" y="4365104"/>
-            <a:ext cx="901799" cy="1524000"/>
-            <a:chOff x="2855740" y="4365104"/>
-            <a:chExt cx="901799" cy="1524000"/>
+            <a:off x="7411072" y="4343350"/>
+            <a:ext cx="864096" cy="1524000"/>
+            <a:chOff x="7411072" y="4343350"/>
+            <a:chExt cx="864096" cy="1524000"/>
           </a:xfrm>
         </p:grpSpPr>
-        <p:pic>
-          <p:nvPicPr>
-            <p:cNvPr id="24" name="Picture 4">
-              <a:extLst>
-                <a:ext uri="{FF2B5EF4-FFF2-40B4-BE49-F238E27FC236}">
-                  <a16:creationId xmlns:a16="http://schemas.microsoft.com/office/drawing/2014/main" id="{88C47114-175F-8371-BC6A-808824F2EB50}"/>
-                </a:ext>
-              </a:extLst>
-            </p:cNvPr>
-            <p:cNvPicPr>
-              <a:picLocks noChangeAspect="1" noChangeArrowheads="1"/>
-            </p:cNvPicPr>
-            <p:nvPr/>
-          </p:nvPicPr>
-          <p:blipFill rotWithShape="1">
-            <a:blip r:embed="rId2">
-              <a:duotone>
-                <a:schemeClr val="accent4">
-                  <a:shade val="45000"/>
-                  <a:satMod val="135000"/>
-                </a:schemeClr>
-                <a:prstClr val="white"/>
-              </a:duotone>
-              <a:extLst>
-                <a:ext uri="{28A0092B-C50C-407E-A947-70E740481C1C}">
-                  <a14:useLocalDpi xmlns:a14="http://schemas.microsoft.com/office/drawing/2010/main" val="0"/>
-                </a:ext>
-              </a:extLst>
-            </a:blip>
-            <a:srcRect l="37802" b="67548"/>
-            <a:stretch/>
-          </p:blipFill>
-          <p:spPr bwMode="auto">
-            <a:xfrm>
-              <a:off x="2958548" y="4941168"/>
-              <a:ext cx="690054" cy="360040"/>
-            </a:xfrm>
-            <a:prstGeom prst="rect">
-              <a:avLst/>
-            </a:prstGeom>
-            <a:noFill/>
-            <a:extLst>
-              <a:ext uri="{909E8E84-426E-40DD-AFC4-6F175D3DCCD1}">
-                <a14:hiddenFill xmlns:a14="http://schemas.microsoft.com/office/drawing/2010/main">
-                  <a:solidFill>
-                    <a:srgbClr val="FFFFFF"/>
-                  </a:solidFill>
-                </a14:hiddenFill>
-              </a:ext>
-            </a:extLst>
-          </p:spPr>
-        </p:pic>
-        <p:pic>
-          <p:nvPicPr>
-            <p:cNvPr id="16" name="Picture 4">
-              <a:extLst>
-                <a:ext uri="{FF2B5EF4-FFF2-40B4-BE49-F238E27FC236}">
-                  <a16:creationId xmlns:a16="http://schemas.microsoft.com/office/drawing/2014/main" id="{AA509538-315A-F877-A4C0-B85B878D61E3}"/>
-                </a:ext>
-              </a:extLst>
-            </p:cNvPr>
-            <p:cNvPicPr>
-              <a:picLocks noChangeAspect="1" noChangeArrowheads="1"/>
-            </p:cNvPicPr>
-            <p:nvPr/>
-          </p:nvPicPr>
-          <p:blipFill rotWithShape="1">
-            <a:blip r:embed="rId5">
-              <a:duotone>
-                <a:schemeClr val="accent4">
-                  <a:shade val="45000"/>
-                  <a:satMod val="135000"/>
-                </a:schemeClr>
-                <a:prstClr val="white"/>
-              </a:duotone>
-              <a:extLst>
-                <a:ext uri="{28A0092B-C50C-407E-A947-70E740481C1C}">
-                  <a14:useLocalDpi xmlns:a14="http://schemas.microsoft.com/office/drawing/2010/main" val="0"/>
-                </a:ext>
-              </a:extLst>
-            </a:blip>
-            <a:srcRect l="27756" r="64847"/>
-            <a:stretch/>
-          </p:blipFill>
-          <p:spPr bwMode="auto">
-            <a:xfrm>
-              <a:off x="2855740" y="4365104"/>
-              <a:ext cx="901799" cy="1524000"/>
-            </a:xfrm>
-            <a:prstGeom prst="rect">
-              <a:avLst/>
-            </a:prstGeom>
-            <a:noFill/>
-            <a:extLst>
-              <a:ext uri="{909E8E84-426E-40DD-AFC4-6F175D3DCCD1}">
-                <a14:hiddenFill xmlns:a14="http://schemas.microsoft.com/office/drawing/2010/main">
-                  <a:solidFill>
-                    <a:srgbClr val="FFFFFF"/>
-                  </a:solidFill>
-                </a14:hiddenFill>
-              </a:ext>
-            </a:extLst>
-          </p:spPr>
-        </p:pic>
-      </p:grpSp>
-      <p:pic>
-        <p:nvPicPr>
-          <p:cNvPr id="17" name="Picture 4">
-            <a:extLst>
-              <a:ext uri="{FF2B5EF4-FFF2-40B4-BE49-F238E27FC236}">
-                <a16:creationId xmlns:a16="http://schemas.microsoft.com/office/drawing/2014/main" id="{DC648DDC-A70F-FF61-2A6E-2745C7CC9C0D}"/>
-              </a:ext>
-            </a:extLst>
-          </p:cNvPr>
-          <p:cNvPicPr>
-            <a:picLocks noChangeAspect="1" noChangeArrowheads="1"/>
-          </p:cNvPicPr>
-          <p:nvPr/>
-        </p:nvPicPr>
-        <p:blipFill rotWithShape="1">
-          <a:blip r:embed="rId5">
-            <a:duotone>
-              <a:schemeClr val="accent4">
-                <a:shade val="45000"/>
-                <a:satMod val="135000"/>
-              </a:schemeClr>
-              <a:prstClr val="white"/>
-            </a:duotone>
-            <a:extLst>
-              <a:ext uri="{28A0092B-C50C-407E-A947-70E740481C1C}">
-                <a14:useLocalDpi xmlns:a14="http://schemas.microsoft.com/office/drawing/2010/main" val="0"/>
-              </a:ext>
-            </a:extLst>
-          </a:blip>
-          <a:srcRect l="40005" r="52907"/>
-          <a:stretch/>
-        </p:blipFill>
-        <p:spPr bwMode="auto">
-          <a:xfrm>
-            <a:off x="4018956" y="4365104"/>
-            <a:ext cx="864096" cy="1524000"/>
-          </a:xfrm>
-          <a:prstGeom prst="rect">
-            <a:avLst/>
-          </a:prstGeom>
-          <a:noFill/>
-          <a:extLst>
-            <a:ext uri="{909E8E84-426E-40DD-AFC4-6F175D3DCCD1}">
-              <a14:hiddenFill xmlns:a14="http://schemas.microsoft.com/office/drawing/2010/main">
-                <a:solidFill>
-                  <a:srgbClr val="FFFFFF"/>
-                </a:solidFill>
-              </a14:hiddenFill>
-            </a:ext>
-          </a:extLst>
-        </p:spPr>
-      </p:pic>
-      <p:grpSp>
-        <p:nvGrpSpPr>
-          <p:cNvPr id="35" name="Group 34">
-            <a:extLst>
-              <a:ext uri="{FF2B5EF4-FFF2-40B4-BE49-F238E27FC236}">
-                <a16:creationId xmlns:a16="http://schemas.microsoft.com/office/drawing/2014/main" id="{ADD7F4EA-3DEA-4BE0-B113-ED678E62DFB6}"/>
-              </a:ext>
-            </a:extLst>
-          </p:cNvPr>
-          <p:cNvGrpSpPr/>
-          <p:nvPr/>
-        </p:nvGrpSpPr>
-        <p:grpSpPr>
-          <a:xfrm>
-            <a:off x="5144469" y="4365104"/>
-            <a:ext cx="864096" cy="1524000"/>
-            <a:chOff x="5144469" y="4365104"/>
-            <a:chExt cx="864096" cy="1524000"/>
-          </a:xfrm>
-        </p:grpSpPr>
-        <p:pic>
-          <p:nvPicPr>
-            <p:cNvPr id="23" name="Picture 4">
-              <a:extLst>
-                <a:ext uri="{FF2B5EF4-FFF2-40B4-BE49-F238E27FC236}">
-                  <a16:creationId xmlns:a16="http://schemas.microsoft.com/office/drawing/2014/main" id="{05DD5754-396A-8C07-B8E6-F334394062A4}"/>
-                </a:ext>
-              </a:extLst>
-            </p:cNvPr>
-            <p:cNvPicPr>
-              <a:picLocks noChangeAspect="1" noChangeArrowheads="1"/>
-            </p:cNvPicPr>
-            <p:nvPr/>
-          </p:nvPicPr>
-          <p:blipFill rotWithShape="1">
-            <a:blip r:embed="rId2">
-              <a:duotone>
-                <a:schemeClr val="accent4">
-                  <a:shade val="45000"/>
-                  <a:satMod val="135000"/>
-                </a:schemeClr>
-                <a:prstClr val="white"/>
-              </a:duotone>
-              <a:extLst>
-                <a:ext uri="{28A0092B-C50C-407E-A947-70E740481C1C}">
-                  <a14:useLocalDpi xmlns:a14="http://schemas.microsoft.com/office/drawing/2010/main" val="0"/>
-                </a:ext>
-              </a:extLst>
-            </a:blip>
-            <a:srcRect l="37802" b="67548"/>
-            <a:stretch/>
-          </p:blipFill>
-          <p:spPr bwMode="auto">
-            <a:xfrm>
-              <a:off x="5233652" y="4941168"/>
-              <a:ext cx="690054" cy="360040"/>
-            </a:xfrm>
-            <a:prstGeom prst="rect">
-              <a:avLst/>
-            </a:prstGeom>
-            <a:noFill/>
-            <a:extLst>
-              <a:ext uri="{909E8E84-426E-40DD-AFC4-6F175D3DCCD1}">
-                <a14:hiddenFill xmlns:a14="http://schemas.microsoft.com/office/drawing/2010/main">
-                  <a:solidFill>
-                    <a:srgbClr val="FFFFFF"/>
-                  </a:solidFill>
-                </a14:hiddenFill>
-              </a:ext>
-            </a:extLst>
-          </p:spPr>
-        </p:pic>
-        <p:pic>
-          <p:nvPicPr>
-            <p:cNvPr id="18" name="Picture 4">
-              <a:extLst>
-                <a:ext uri="{FF2B5EF4-FFF2-40B4-BE49-F238E27FC236}">
-                  <a16:creationId xmlns:a16="http://schemas.microsoft.com/office/drawing/2014/main" id="{FFD0E026-2C63-A2C7-D5CD-A0EF7F3897CD}"/>
-                </a:ext>
-              </a:extLst>
-            </p:cNvPr>
-            <p:cNvPicPr>
-              <a:picLocks noChangeAspect="1" noChangeArrowheads="1"/>
-            </p:cNvPicPr>
-            <p:nvPr/>
-          </p:nvPicPr>
-          <p:blipFill rotWithShape="1">
-            <a:blip r:embed="rId5">
-              <a:duotone>
-                <a:schemeClr val="accent4">
-                  <a:shade val="45000"/>
-                  <a:satMod val="135000"/>
-                </a:schemeClr>
-                <a:prstClr val="white"/>
-              </a:duotone>
-              <a:extLst>
-                <a:ext uri="{28A0092B-C50C-407E-A947-70E740481C1C}">
-                  <a14:useLocalDpi xmlns:a14="http://schemas.microsoft.com/office/drawing/2010/main" val="0"/>
-                </a:ext>
-              </a:extLst>
-            </a:blip>
-            <a:srcRect l="52767" r="40145"/>
-            <a:stretch/>
-          </p:blipFill>
-          <p:spPr bwMode="auto">
-            <a:xfrm>
-              <a:off x="5144469" y="4365104"/>
-              <a:ext cx="864096" cy="1524000"/>
-            </a:xfrm>
-            <a:prstGeom prst="rect">
-              <a:avLst/>
-            </a:prstGeom>
-            <a:noFill/>
-            <a:extLst>
-              <a:ext uri="{909E8E84-426E-40DD-AFC4-6F175D3DCCD1}">
-                <a14:hiddenFill xmlns:a14="http://schemas.microsoft.com/office/drawing/2010/main">
-                  <a:solidFill>
-                    <a:srgbClr val="FFFFFF"/>
-                  </a:solidFill>
-                </a14:hiddenFill>
-              </a:ext>
-            </a:extLst>
-          </p:spPr>
-        </p:pic>
-      </p:grpSp>
-      <p:grpSp>
-        <p:nvGrpSpPr>
-          <p:cNvPr id="33" name="Group 32">
-            <a:extLst>
-              <a:ext uri="{FF2B5EF4-FFF2-40B4-BE49-F238E27FC236}">
-                <a16:creationId xmlns:a16="http://schemas.microsoft.com/office/drawing/2014/main" id="{694CD2DD-6FC1-368D-9584-ACF81D6959E6}"/>
-              </a:ext>
-            </a:extLst>
-          </p:cNvPr>
-          <p:cNvGrpSpPr/>
-          <p:nvPr/>
-        </p:nvGrpSpPr>
-        <p:grpSpPr>
-          <a:xfrm>
-            <a:off x="6269982" y="4355182"/>
-            <a:ext cx="864096" cy="1524000"/>
-            <a:chOff x="6269982" y="4355182"/>
-            <a:chExt cx="864096" cy="1524000"/>
-          </a:xfrm>
-        </p:grpSpPr>
-        <p:pic>
-          <p:nvPicPr>
-            <p:cNvPr id="26" name="Picture 4">
-              <a:extLst>
-                <a:ext uri="{FF2B5EF4-FFF2-40B4-BE49-F238E27FC236}">
-                  <a16:creationId xmlns:a16="http://schemas.microsoft.com/office/drawing/2014/main" id="{63C64A6F-59A2-6065-8344-96A270261A5B}"/>
-                </a:ext>
-              </a:extLst>
-            </p:cNvPr>
-            <p:cNvPicPr>
-              <a:picLocks noChangeAspect="1" noChangeArrowheads="1"/>
-            </p:cNvPicPr>
-            <p:nvPr/>
-          </p:nvPicPr>
-          <p:blipFill rotWithShape="1">
-            <a:blip r:embed="rId2">
-              <a:duotone>
-                <a:schemeClr val="accent4">
-                  <a:shade val="45000"/>
-                  <a:satMod val="135000"/>
-                </a:schemeClr>
-                <a:prstClr val="white"/>
-              </a:duotone>
-              <a:extLst>
-                <a:ext uri="{28A0092B-C50C-407E-A947-70E740481C1C}">
-                  <a14:useLocalDpi xmlns:a14="http://schemas.microsoft.com/office/drawing/2010/main" val="0"/>
-                </a:ext>
-              </a:extLst>
-            </a:blip>
-            <a:srcRect l="37802" b="67548"/>
-            <a:stretch/>
-          </p:blipFill>
-          <p:spPr bwMode="auto">
-            <a:xfrm>
-              <a:off x="6371204" y="4941168"/>
-              <a:ext cx="690054" cy="360040"/>
-            </a:xfrm>
-            <a:prstGeom prst="rect">
-              <a:avLst/>
-            </a:prstGeom>
-            <a:noFill/>
-            <a:extLst>
-              <a:ext uri="{909E8E84-426E-40DD-AFC4-6F175D3DCCD1}">
-                <a14:hiddenFill xmlns:a14="http://schemas.microsoft.com/office/drawing/2010/main">
-                  <a:solidFill>
-                    <a:srgbClr val="FFFFFF"/>
-                  </a:solidFill>
-                </a14:hiddenFill>
-              </a:ext>
-            </a:extLst>
-          </p:spPr>
-        </p:pic>
-        <p:pic>
-          <p:nvPicPr>
-            <p:cNvPr id="19" name="Picture 4">
-              <a:extLst>
-                <a:ext uri="{FF2B5EF4-FFF2-40B4-BE49-F238E27FC236}">
-                  <a16:creationId xmlns:a16="http://schemas.microsoft.com/office/drawing/2014/main" id="{58CC56AD-B1C6-532B-59E3-7CF84A3991A1}"/>
-                </a:ext>
-              </a:extLst>
-            </p:cNvPr>
-            <p:cNvPicPr>
-              <a:picLocks noChangeAspect="1" noChangeArrowheads="1"/>
-            </p:cNvPicPr>
-            <p:nvPr/>
-          </p:nvPicPr>
-          <p:blipFill rotWithShape="1">
-            <a:blip r:embed="rId5">
-              <a:duotone>
-                <a:schemeClr val="accent4">
-                  <a:shade val="45000"/>
-                  <a:satMod val="135000"/>
-                </a:schemeClr>
-                <a:prstClr val="white"/>
-              </a:duotone>
-              <a:extLst>
-                <a:ext uri="{28A0092B-C50C-407E-A947-70E740481C1C}">
-                  <a14:useLocalDpi xmlns:a14="http://schemas.microsoft.com/office/drawing/2010/main" val="0"/>
-                </a:ext>
-              </a:extLst>
-            </a:blip>
-            <a:srcRect l="65200" r="27712"/>
-            <a:stretch/>
-          </p:blipFill>
-          <p:spPr bwMode="auto">
-            <a:xfrm>
-              <a:off x="6269982" y="4355182"/>
-              <a:ext cx="864096" cy="1524000"/>
-            </a:xfrm>
-            <a:prstGeom prst="rect">
-              <a:avLst/>
-            </a:prstGeom>
-            <a:noFill/>
-            <a:extLst>
-              <a:ext uri="{909E8E84-426E-40DD-AFC4-6F175D3DCCD1}">
-                <a14:hiddenFill xmlns:a14="http://schemas.microsoft.com/office/drawing/2010/main">
-                  <a:solidFill>
-                    <a:srgbClr val="FFFFFF"/>
-                  </a:solidFill>
-                </a14:hiddenFill>
-              </a:ext>
-            </a:extLst>
-          </p:spPr>
-        </p:pic>
-      </p:grpSp>
-      <p:grpSp>
-        <p:nvGrpSpPr>
-          <p:cNvPr id="34" name="Group 33">
-            <a:extLst>
-              <a:ext uri="{FF2B5EF4-FFF2-40B4-BE49-F238E27FC236}">
-                <a16:creationId xmlns:a16="http://schemas.microsoft.com/office/drawing/2014/main" id="{84C3A43D-2C06-EF1D-C6B9-F068D39B4091}"/>
-              </a:ext>
-            </a:extLst>
-          </p:cNvPr>
-          <p:cNvGrpSpPr/>
-          <p:nvPr/>
-        </p:nvGrpSpPr>
-        <p:grpSpPr>
-          <a:xfrm>
-            <a:off x="7411072" y="4355182"/>
-            <a:ext cx="864096" cy="1524000"/>
-            <a:chOff x="7411072" y="4355182"/>
-            <a:chExt cx="864096" cy="1524000"/>
-          </a:xfrm>
-        </p:grpSpPr>
-        <p:pic>
-          <p:nvPicPr>
-            <p:cNvPr id="27" name="Picture 4">
-              <a:extLst>
-                <a:ext uri="{FF2B5EF4-FFF2-40B4-BE49-F238E27FC236}">
-                  <a16:creationId xmlns:a16="http://schemas.microsoft.com/office/drawing/2014/main" id="{A63CB1C6-786F-4158-F729-C36822E0CAAF}"/>
-                </a:ext>
-              </a:extLst>
-            </p:cNvPr>
-            <p:cNvPicPr>
-              <a:picLocks noChangeAspect="1" noChangeArrowheads="1"/>
-            </p:cNvPicPr>
-            <p:nvPr/>
-          </p:nvPicPr>
-          <p:blipFill rotWithShape="1">
-            <a:blip r:embed="rId2">
-              <a:duotone>
-                <a:schemeClr val="accent4">
-                  <a:shade val="45000"/>
-                  <a:satMod val="135000"/>
-                </a:schemeClr>
-                <a:prstClr val="white"/>
-              </a:duotone>
-              <a:extLst>
-                <a:ext uri="{28A0092B-C50C-407E-A947-70E740481C1C}">
-                  <a14:useLocalDpi xmlns:a14="http://schemas.microsoft.com/office/drawing/2010/main" val="0"/>
-                </a:ext>
-              </a:extLst>
-            </a:blip>
-            <a:srcRect l="37802" b="67548"/>
-            <a:stretch/>
-          </p:blipFill>
-          <p:spPr bwMode="auto">
-            <a:xfrm>
-              <a:off x="7508756" y="4941168"/>
-              <a:ext cx="690054" cy="360040"/>
-            </a:xfrm>
-            <a:prstGeom prst="rect">
-              <a:avLst/>
-            </a:prstGeom>
-            <a:noFill/>
-            <a:extLst>
-              <a:ext uri="{909E8E84-426E-40DD-AFC4-6F175D3DCCD1}">
-                <a14:hiddenFill xmlns:a14="http://schemas.microsoft.com/office/drawing/2010/main">
-                  <a:solidFill>
-                    <a:srgbClr val="FFFFFF"/>
-                  </a:solidFill>
-                </a14:hiddenFill>
-              </a:ext>
-            </a:extLst>
-          </p:spPr>
-        </p:pic>
         <p:pic>
           <p:nvPicPr>
             <p:cNvPr id="20" name="Picture 4">
@@ -11784,7 +12594,7 @@
             <p:nvPr/>
           </p:nvPicPr>
           <p:blipFill rotWithShape="1">
-            <a:blip r:embed="rId5">
+            <a:blip r:embed="rId3">
               <a:duotone>
                 <a:schemeClr val="accent4">
                   <a:shade val="45000"/>
@@ -11803,7 +12613,7 @@
           </p:blipFill>
           <p:spPr bwMode="auto">
             <a:xfrm>
-              <a:off x="7411072" y="4355182"/>
+              <a:off x="7411072" y="4343350"/>
               <a:ext cx="864096" cy="1524000"/>
             </a:xfrm>
             <a:prstGeom prst="rect">
@@ -11821,59 +12631,234 @@
             </a:extLst>
           </p:spPr>
         </p:pic>
+        <p:sp>
+          <p:nvSpPr>
+            <p:cNvPr id="49" name="ZoneTexte 3">
+              <a:extLst>
+                <a:ext uri="{FF2B5EF4-FFF2-40B4-BE49-F238E27FC236}">
+                  <a16:creationId xmlns:a16="http://schemas.microsoft.com/office/drawing/2014/main" id="{321CE86D-E1B9-2C93-BC4B-EE3667654F29}"/>
+                </a:ext>
+              </a:extLst>
+            </p:cNvPr>
+            <p:cNvSpPr txBox="1"/>
+            <p:nvPr/>
+          </p:nvSpPr>
+          <p:spPr>
+            <a:xfrm>
+              <a:off x="7464152" y="4797152"/>
+              <a:ext cx="720080" cy="384721"/>
+            </a:xfrm>
+            <a:prstGeom prst="rect">
+              <a:avLst/>
+            </a:prstGeom>
+            <a:noFill/>
+          </p:spPr>
+          <p:txBody>
+            <a:bodyPr wrap="square" rtlCol="0">
+              <a:spAutoFit/>
+            </a:bodyPr>
+            <a:lstStyle/>
+            <a:p>
+              <a:r>
+                <a:rPr lang="fr-FR" sz="1900" dirty="0">
+                  <a:solidFill>
+                    <a:srgbClr val="DEAD36"/>
+                  </a:solidFill>
+                  <a:latin typeface="RetroBoundmini" panose="02000603000000000000" pitchFamily="2" charset="0"/>
+                  <a:ea typeface="RetroBoundmini" panose="02000603000000000000" pitchFamily="2" charset="0"/>
+                </a:rPr>
+                <a:t>+200</a:t>
+              </a:r>
+            </a:p>
+          </p:txBody>
+        </p:sp>
+        <p:pic>
+          <p:nvPicPr>
+            <p:cNvPr id="50" name="Picture 49" descr="Icon&#10;&#10;Description automatically generated with low confidence">
+              <a:extLst>
+                <a:ext uri="{FF2B5EF4-FFF2-40B4-BE49-F238E27FC236}">
+                  <a16:creationId xmlns:a16="http://schemas.microsoft.com/office/drawing/2014/main" id="{0D583D31-6180-C0F6-21AE-C14E483D015B}"/>
+                </a:ext>
+              </a:extLst>
+            </p:cNvPr>
+            <p:cNvPicPr>
+              <a:picLocks noChangeAspect="1"/>
+            </p:cNvPicPr>
+            <p:nvPr/>
+          </p:nvPicPr>
+          <p:blipFill>
+            <a:blip r:embed="rId2">
+              <a:extLst>
+                <a:ext uri="{28A0092B-C50C-407E-A947-70E740481C1C}">
+                  <a14:useLocalDpi xmlns:a14="http://schemas.microsoft.com/office/drawing/2010/main" val="0"/>
+                </a:ext>
+              </a:extLst>
+            </a:blip>
+            <a:stretch>
+              <a:fillRect/>
+            </a:stretch>
+          </p:blipFill>
+          <p:spPr>
+            <a:xfrm>
+              <a:off x="7644172" y="5085184"/>
+              <a:ext cx="360040" cy="360040"/>
+            </a:xfrm>
+            <a:prstGeom prst="rect">
+              <a:avLst/>
+            </a:prstGeom>
+          </p:spPr>
+        </p:pic>
       </p:grpSp>
-      <p:pic>
-        <p:nvPicPr>
-          <p:cNvPr id="21" name="Picture 4">
-            <a:extLst>
-              <a:ext uri="{FF2B5EF4-FFF2-40B4-BE49-F238E27FC236}">
-                <a16:creationId xmlns:a16="http://schemas.microsoft.com/office/drawing/2014/main" id="{5DA0DC77-42E9-AB31-77B0-F66DA56A154A}"/>
-              </a:ext>
-            </a:extLst>
-          </p:cNvPr>
-          <p:cNvPicPr>
-            <a:picLocks noChangeAspect="1" noChangeArrowheads="1"/>
-          </p:cNvPicPr>
-          <p:nvPr/>
-        </p:nvPicPr>
-        <p:blipFill rotWithShape="1">
-          <a:blip r:embed="rId5">
-            <a:duotone>
-              <a:schemeClr val="accent4">
-                <a:shade val="45000"/>
-                <a:satMod val="135000"/>
-              </a:schemeClr>
-              <a:prstClr val="white"/>
-            </a:duotone>
-            <a:extLst>
-              <a:ext uri="{28A0092B-C50C-407E-A947-70E740481C1C}">
-                <a14:useLocalDpi xmlns:a14="http://schemas.microsoft.com/office/drawing/2010/main" val="0"/>
-              </a:ext>
-            </a:extLst>
-          </a:blip>
-          <a:srcRect l="90097" r="2815"/>
-          <a:stretch/>
-        </p:blipFill>
-        <p:spPr bwMode="auto">
-          <a:xfrm>
-            <a:off x="8501139" y="4355182"/>
+      <p:grpSp>
+        <p:nvGrpSpPr>
+          <p:cNvPr id="60" name="Group 59">
+            <a:extLst>
+              <a:ext uri="{FF2B5EF4-FFF2-40B4-BE49-F238E27FC236}">
+                <a16:creationId xmlns:a16="http://schemas.microsoft.com/office/drawing/2014/main" id="{A8F4ABCE-0B69-5976-6F1A-EE189AD9E69F}"/>
+              </a:ext>
+            </a:extLst>
+          </p:cNvPr>
+          <p:cNvGrpSpPr/>
+          <p:nvPr/>
+        </p:nvGrpSpPr>
+        <p:grpSpPr>
+          <a:xfrm>
+            <a:off x="8501139" y="4343350"/>
             <a:ext cx="864097" cy="1524000"/>
-          </a:xfrm>
-          <a:prstGeom prst="rect">
-            <a:avLst/>
-          </a:prstGeom>
-          <a:noFill/>
-          <a:extLst>
-            <a:ext uri="{909E8E84-426E-40DD-AFC4-6F175D3DCCD1}">
-              <a14:hiddenFill xmlns:a14="http://schemas.microsoft.com/office/drawing/2010/main">
-                <a:solidFill>
-                  <a:srgbClr val="FFFFFF"/>
-                </a:solidFill>
-              </a14:hiddenFill>
-            </a:ext>
-          </a:extLst>
-        </p:spPr>
-      </p:pic>
+            <a:chOff x="8501139" y="4343350"/>
+            <a:chExt cx="864097" cy="1524000"/>
+          </a:xfrm>
+        </p:grpSpPr>
+        <p:pic>
+          <p:nvPicPr>
+            <p:cNvPr id="21" name="Picture 4">
+              <a:extLst>
+                <a:ext uri="{FF2B5EF4-FFF2-40B4-BE49-F238E27FC236}">
+                  <a16:creationId xmlns:a16="http://schemas.microsoft.com/office/drawing/2014/main" id="{5DA0DC77-42E9-AB31-77B0-F66DA56A154A}"/>
+                </a:ext>
+              </a:extLst>
+            </p:cNvPr>
+            <p:cNvPicPr>
+              <a:picLocks noChangeAspect="1" noChangeArrowheads="1"/>
+            </p:cNvPicPr>
+            <p:nvPr/>
+          </p:nvPicPr>
+          <p:blipFill rotWithShape="1">
+            <a:blip r:embed="rId3">
+              <a:duotone>
+                <a:schemeClr val="accent4">
+                  <a:shade val="45000"/>
+                  <a:satMod val="135000"/>
+                </a:schemeClr>
+                <a:prstClr val="white"/>
+              </a:duotone>
+              <a:extLst>
+                <a:ext uri="{28A0092B-C50C-407E-A947-70E740481C1C}">
+                  <a14:useLocalDpi xmlns:a14="http://schemas.microsoft.com/office/drawing/2010/main" val="0"/>
+                </a:ext>
+              </a:extLst>
+            </a:blip>
+            <a:srcRect l="90097" r="2815"/>
+            <a:stretch/>
+          </p:blipFill>
+          <p:spPr bwMode="auto">
+            <a:xfrm>
+              <a:off x="8501139" y="4343350"/>
+              <a:ext cx="864097" cy="1524000"/>
+            </a:xfrm>
+            <a:prstGeom prst="rect">
+              <a:avLst/>
+            </a:prstGeom>
+            <a:noFill/>
+            <a:extLst>
+              <a:ext uri="{909E8E84-426E-40DD-AFC4-6F175D3DCCD1}">
+                <a14:hiddenFill xmlns:a14="http://schemas.microsoft.com/office/drawing/2010/main">
+                  <a:solidFill>
+                    <a:srgbClr val="FFFFFF"/>
+                  </a:solidFill>
+                </a14:hiddenFill>
+              </a:ext>
+            </a:extLst>
+          </p:spPr>
+        </p:pic>
+        <p:sp>
+          <p:nvSpPr>
+            <p:cNvPr id="51" name="ZoneTexte 3">
+              <a:extLst>
+                <a:ext uri="{FF2B5EF4-FFF2-40B4-BE49-F238E27FC236}">
+                  <a16:creationId xmlns:a16="http://schemas.microsoft.com/office/drawing/2014/main" id="{C428E198-C6CF-16C7-DBEC-B9C8AB17BA8E}"/>
+                </a:ext>
+              </a:extLst>
+            </p:cNvPr>
+            <p:cNvSpPr txBox="1"/>
+            <p:nvPr/>
+          </p:nvSpPr>
+          <p:spPr>
+            <a:xfrm>
+              <a:off x="8544272" y="4797152"/>
+              <a:ext cx="720080" cy="384721"/>
+            </a:xfrm>
+            <a:prstGeom prst="rect">
+              <a:avLst/>
+            </a:prstGeom>
+            <a:noFill/>
+          </p:spPr>
+          <p:txBody>
+            <a:bodyPr wrap="square" rtlCol="0">
+              <a:spAutoFit/>
+            </a:bodyPr>
+            <a:lstStyle/>
+            <a:p>
+              <a:r>
+                <a:rPr lang="fr-FR" sz="1900" dirty="0">
+                  <a:solidFill>
+                    <a:srgbClr val="DEAD36"/>
+                  </a:solidFill>
+                  <a:latin typeface="RetroBoundmini" panose="02000603000000000000" pitchFamily="2" charset="0"/>
+                  <a:ea typeface="RetroBoundmini" panose="02000603000000000000" pitchFamily="2" charset="0"/>
+                </a:rPr>
+                <a:t>+200</a:t>
+              </a:r>
+            </a:p>
+          </p:txBody>
+        </p:sp>
+        <p:pic>
+          <p:nvPicPr>
+            <p:cNvPr id="52" name="Picture 51" descr="Icon&#10;&#10;Description automatically generated with low confidence">
+              <a:extLst>
+                <a:ext uri="{FF2B5EF4-FFF2-40B4-BE49-F238E27FC236}">
+                  <a16:creationId xmlns:a16="http://schemas.microsoft.com/office/drawing/2014/main" id="{343021D2-4B1F-AEA8-D61C-91FCA6C2C53A}"/>
+                </a:ext>
+              </a:extLst>
+            </p:cNvPr>
+            <p:cNvPicPr>
+              <a:picLocks noChangeAspect="1"/>
+            </p:cNvPicPr>
+            <p:nvPr/>
+          </p:nvPicPr>
+          <p:blipFill>
+            <a:blip r:embed="rId2">
+              <a:extLst>
+                <a:ext uri="{28A0092B-C50C-407E-A947-70E740481C1C}">
+                  <a14:useLocalDpi xmlns:a14="http://schemas.microsoft.com/office/drawing/2010/main" val="0"/>
+                </a:ext>
+              </a:extLst>
+            </a:blip>
+            <a:stretch>
+              <a:fillRect/>
+            </a:stretch>
+          </p:blipFill>
+          <p:spPr>
+            <a:xfrm>
+              <a:off x="8724292" y="5085184"/>
+              <a:ext cx="360040" cy="360040"/>
+            </a:xfrm>
+            <a:prstGeom prst="rect">
+              <a:avLst/>
+            </a:prstGeom>
+          </p:spPr>
+        </p:pic>
+      </p:grpSp>
     </p:spTree>
     <p:extLst>
       <p:ext uri="{BB962C8B-B14F-4D97-AF65-F5344CB8AC3E}">
@@ -12048,6 +13033,467 @@
     <p:extLst>
       <p:ext uri="{BB962C8B-B14F-4D97-AF65-F5344CB8AC3E}">
         <p14:creationId xmlns:p14="http://schemas.microsoft.com/office/powerpoint/2010/main" val="4251731836"/>
+      </p:ext>
+    </p:extLst>
+  </p:cSld>
+  <p:clrMapOvr>
+    <a:masterClrMapping/>
+  </p:clrMapOvr>
+</p:sld>
+</file>
+
+<file path=ppt/slides/slide20.xml><?xml version="1.0" encoding="utf-8"?>
+<p:sld xmlns:a="http://schemas.openxmlformats.org/drawingml/2006/main" xmlns:r="http://schemas.openxmlformats.org/officeDocument/2006/relationships" xmlns:p="http://schemas.openxmlformats.org/presentationml/2006/main">
+  <p:cSld>
+    <p:spTree>
+      <p:nvGrpSpPr>
+        <p:cNvPr id="1" name=""/>
+        <p:cNvGrpSpPr/>
+        <p:nvPr/>
+      </p:nvGrpSpPr>
+      <p:grpSpPr>
+        <a:xfrm>
+          <a:off x="0" y="0"/>
+          <a:ext cx="0" cy="0"/>
+          <a:chOff x="0" y="0"/>
+          <a:chExt cx="0" cy="0"/>
+        </a:xfrm>
+      </p:grpSpPr>
+      <p:pic>
+        <p:nvPicPr>
+          <p:cNvPr id="5" name="Content Placeholder 4" descr="Logo&#10;&#10;Description automatically generated">
+            <a:extLst>
+              <a:ext uri="{FF2B5EF4-FFF2-40B4-BE49-F238E27FC236}">
+                <a16:creationId xmlns:a16="http://schemas.microsoft.com/office/drawing/2014/main" id="{342513D9-4975-935D-2ED2-273C6DE15B89}"/>
+              </a:ext>
+            </a:extLst>
+          </p:cNvPr>
+          <p:cNvPicPr>
+            <a:picLocks noGrp="1" noChangeAspect="1"/>
+          </p:cNvPicPr>
+          <p:nvPr>
+            <p:ph idx="1"/>
+          </p:nvPr>
+        </p:nvPicPr>
+        <p:blipFill>
+          <a:blip r:embed="rId2">
+            <a:extLst>
+              <a:ext uri="{28A0092B-C50C-407E-A947-70E740481C1C}">
+                <a14:useLocalDpi xmlns:a14="http://schemas.microsoft.com/office/drawing/2010/main" val="0"/>
+              </a:ext>
+            </a:extLst>
+          </a:blip>
+          <a:stretch>
+            <a:fillRect/>
+          </a:stretch>
+        </p:blipFill>
+        <p:spPr>
+          <a:xfrm>
+            <a:off x="0" y="548680"/>
+            <a:ext cx="2019300" cy="2895600"/>
+          </a:xfrm>
+        </p:spPr>
+      </p:pic>
+      <p:pic>
+        <p:nvPicPr>
+          <p:cNvPr id="7" name="Picture 6" descr="Logo&#10;&#10;Description automatically generated">
+            <a:extLst>
+              <a:ext uri="{FF2B5EF4-FFF2-40B4-BE49-F238E27FC236}">
+                <a16:creationId xmlns:a16="http://schemas.microsoft.com/office/drawing/2014/main" id="{5BDD7DE8-2CD1-4ABD-5055-2D7E197022E4}"/>
+              </a:ext>
+            </a:extLst>
+          </p:cNvPr>
+          <p:cNvPicPr>
+            <a:picLocks noChangeAspect="1"/>
+          </p:cNvPicPr>
+          <p:nvPr/>
+        </p:nvPicPr>
+        <p:blipFill>
+          <a:blip r:embed="rId3">
+            <a:extLst>
+              <a:ext uri="{28A0092B-C50C-407E-A947-70E740481C1C}">
+                <a14:useLocalDpi xmlns:a14="http://schemas.microsoft.com/office/drawing/2010/main" val="0"/>
+              </a:ext>
+            </a:extLst>
+          </a:blip>
+          <a:stretch>
+            <a:fillRect/>
+          </a:stretch>
+        </p:blipFill>
+        <p:spPr>
+          <a:xfrm>
+            <a:off x="1199456" y="548680"/>
+            <a:ext cx="2019300" cy="2895600"/>
+          </a:xfrm>
+          <a:prstGeom prst="rect">
+            <a:avLst/>
+          </a:prstGeom>
+        </p:spPr>
+      </p:pic>
+      <p:pic>
+        <p:nvPicPr>
+          <p:cNvPr id="9" name="Picture 8" descr="A picture containing logo&#10;&#10;Description automatically generated">
+            <a:extLst>
+              <a:ext uri="{FF2B5EF4-FFF2-40B4-BE49-F238E27FC236}">
+                <a16:creationId xmlns:a16="http://schemas.microsoft.com/office/drawing/2014/main" id="{39CE6F83-89CE-A72B-2D7B-89DED82D2EAD}"/>
+              </a:ext>
+            </a:extLst>
+          </p:cNvPr>
+          <p:cNvPicPr>
+            <a:picLocks noChangeAspect="1"/>
+          </p:cNvPicPr>
+          <p:nvPr/>
+        </p:nvPicPr>
+        <p:blipFill>
+          <a:blip r:embed="rId4">
+            <a:extLst>
+              <a:ext uri="{28A0092B-C50C-407E-A947-70E740481C1C}">
+                <a14:useLocalDpi xmlns:a14="http://schemas.microsoft.com/office/drawing/2010/main" val="0"/>
+              </a:ext>
+            </a:extLst>
+          </a:blip>
+          <a:stretch>
+            <a:fillRect/>
+          </a:stretch>
+        </p:blipFill>
+        <p:spPr>
+          <a:xfrm>
+            <a:off x="2495600" y="404664"/>
+            <a:ext cx="2019300" cy="2895600"/>
+          </a:xfrm>
+          <a:prstGeom prst="rect">
+            <a:avLst/>
+          </a:prstGeom>
+        </p:spPr>
+      </p:pic>
+      <p:pic>
+        <p:nvPicPr>
+          <p:cNvPr id="11" name="Picture 10" descr="A picture containing logo&#10;&#10;Description automatically generated">
+            <a:extLst>
+              <a:ext uri="{FF2B5EF4-FFF2-40B4-BE49-F238E27FC236}">
+                <a16:creationId xmlns:a16="http://schemas.microsoft.com/office/drawing/2014/main" id="{D561E9DD-8FE7-7457-5C32-0B7FBBE47918}"/>
+              </a:ext>
+            </a:extLst>
+          </p:cNvPr>
+          <p:cNvPicPr>
+            <a:picLocks noChangeAspect="1"/>
+          </p:cNvPicPr>
+          <p:nvPr/>
+        </p:nvPicPr>
+        <p:blipFill>
+          <a:blip r:embed="rId5">
+            <a:extLst>
+              <a:ext uri="{28A0092B-C50C-407E-A947-70E740481C1C}">
+                <a14:useLocalDpi xmlns:a14="http://schemas.microsoft.com/office/drawing/2010/main" val="0"/>
+              </a:ext>
+            </a:extLst>
+          </a:blip>
+          <a:stretch>
+            <a:fillRect/>
+          </a:stretch>
+        </p:blipFill>
+        <p:spPr>
+          <a:xfrm>
+            <a:off x="3719736" y="332656"/>
+            <a:ext cx="2019300" cy="2895600"/>
+          </a:xfrm>
+          <a:prstGeom prst="rect">
+            <a:avLst/>
+          </a:prstGeom>
+        </p:spPr>
+      </p:pic>
+      <p:pic>
+        <p:nvPicPr>
+          <p:cNvPr id="13" name="Picture 12" descr="Logo&#10;&#10;Description automatically generated with low confidence">
+            <a:extLst>
+              <a:ext uri="{FF2B5EF4-FFF2-40B4-BE49-F238E27FC236}">
+                <a16:creationId xmlns:a16="http://schemas.microsoft.com/office/drawing/2014/main" id="{A39654FE-1713-0BDE-2461-2EF098AA9B41}"/>
+              </a:ext>
+            </a:extLst>
+          </p:cNvPr>
+          <p:cNvPicPr>
+            <a:picLocks noChangeAspect="1"/>
+          </p:cNvPicPr>
+          <p:nvPr/>
+        </p:nvPicPr>
+        <p:blipFill>
+          <a:blip r:embed="rId6">
+            <a:extLst>
+              <a:ext uri="{28A0092B-C50C-407E-A947-70E740481C1C}">
+                <a14:useLocalDpi xmlns:a14="http://schemas.microsoft.com/office/drawing/2010/main" val="0"/>
+              </a:ext>
+            </a:extLst>
+          </a:blip>
+          <a:stretch>
+            <a:fillRect/>
+          </a:stretch>
+        </p:blipFill>
+        <p:spPr>
+          <a:xfrm>
+            <a:off x="5015880" y="260648"/>
+            <a:ext cx="2019300" cy="2895600"/>
+          </a:xfrm>
+          <a:prstGeom prst="rect">
+            <a:avLst/>
+          </a:prstGeom>
+        </p:spPr>
+      </p:pic>
+      <p:pic>
+        <p:nvPicPr>
+          <p:cNvPr id="15" name="Picture 14" descr="Logo&#10;&#10;Description automatically generated">
+            <a:extLst>
+              <a:ext uri="{FF2B5EF4-FFF2-40B4-BE49-F238E27FC236}">
+                <a16:creationId xmlns:a16="http://schemas.microsoft.com/office/drawing/2014/main" id="{32626B01-253A-3A1A-79B8-D98B9868A1C1}"/>
+              </a:ext>
+            </a:extLst>
+          </p:cNvPr>
+          <p:cNvPicPr>
+            <a:picLocks noChangeAspect="1"/>
+          </p:cNvPicPr>
+          <p:nvPr/>
+        </p:nvPicPr>
+        <p:blipFill>
+          <a:blip r:embed="rId7">
+            <a:extLst>
+              <a:ext uri="{28A0092B-C50C-407E-A947-70E740481C1C}">
+                <a14:useLocalDpi xmlns:a14="http://schemas.microsoft.com/office/drawing/2010/main" val="0"/>
+              </a:ext>
+            </a:extLst>
+          </a:blip>
+          <a:stretch>
+            <a:fillRect/>
+          </a:stretch>
+        </p:blipFill>
+        <p:spPr>
+          <a:xfrm>
+            <a:off x="6744072" y="260648"/>
+            <a:ext cx="2019300" cy="2895600"/>
+          </a:xfrm>
+          <a:prstGeom prst="rect">
+            <a:avLst/>
+          </a:prstGeom>
+        </p:spPr>
+      </p:pic>
+      <p:pic>
+        <p:nvPicPr>
+          <p:cNvPr id="16" name="Content Placeholder 4" descr="Logo&#10;&#10;Description automatically generated">
+            <a:extLst>
+              <a:ext uri="{FF2B5EF4-FFF2-40B4-BE49-F238E27FC236}">
+                <a16:creationId xmlns:a16="http://schemas.microsoft.com/office/drawing/2014/main" id="{DF362733-E550-7F92-7808-8070F1126A14}"/>
+              </a:ext>
+            </a:extLst>
+          </p:cNvPr>
+          <p:cNvPicPr>
+            <a:picLocks noChangeAspect="1"/>
+          </p:cNvPicPr>
+          <p:nvPr/>
+        </p:nvPicPr>
+        <p:blipFill>
+          <a:blip r:embed="rId2">
+            <a:extLst>
+              <a:ext uri="{28A0092B-C50C-407E-A947-70E740481C1C}">
+                <a14:useLocalDpi xmlns:a14="http://schemas.microsoft.com/office/drawing/2010/main" val="0"/>
+              </a:ext>
+            </a:extLst>
+          </a:blip>
+          <a:stretch>
+            <a:fillRect/>
+          </a:stretch>
+        </p:blipFill>
+        <p:spPr>
+          <a:xfrm flipH="1">
+            <a:off x="144016" y="3140968"/>
+            <a:ext cx="2019300" cy="2895600"/>
+          </a:xfrm>
+          <a:prstGeom prst="rect">
+            <a:avLst/>
+          </a:prstGeom>
+        </p:spPr>
+      </p:pic>
+      <p:pic>
+        <p:nvPicPr>
+          <p:cNvPr id="17" name="Picture 16" descr="Logo&#10;&#10;Description automatically generated">
+            <a:extLst>
+              <a:ext uri="{FF2B5EF4-FFF2-40B4-BE49-F238E27FC236}">
+                <a16:creationId xmlns:a16="http://schemas.microsoft.com/office/drawing/2014/main" id="{63ABC971-849D-E80F-D5E9-4C7F973A9C50}"/>
+              </a:ext>
+            </a:extLst>
+          </p:cNvPr>
+          <p:cNvPicPr>
+            <a:picLocks noChangeAspect="1"/>
+          </p:cNvPicPr>
+          <p:nvPr/>
+        </p:nvPicPr>
+        <p:blipFill>
+          <a:blip r:embed="rId3">
+            <a:extLst>
+              <a:ext uri="{28A0092B-C50C-407E-A947-70E740481C1C}">
+                <a14:useLocalDpi xmlns:a14="http://schemas.microsoft.com/office/drawing/2010/main" val="0"/>
+              </a:ext>
+            </a:extLst>
+          </a:blip>
+          <a:stretch>
+            <a:fillRect/>
+          </a:stretch>
+        </p:blipFill>
+        <p:spPr>
+          <a:xfrm flipH="1">
+            <a:off x="1343472" y="3140968"/>
+            <a:ext cx="2019300" cy="2895600"/>
+          </a:xfrm>
+          <a:prstGeom prst="rect">
+            <a:avLst/>
+          </a:prstGeom>
+        </p:spPr>
+      </p:pic>
+      <p:pic>
+        <p:nvPicPr>
+          <p:cNvPr id="18" name="Picture 17" descr="A picture containing logo&#10;&#10;Description automatically generated">
+            <a:extLst>
+              <a:ext uri="{FF2B5EF4-FFF2-40B4-BE49-F238E27FC236}">
+                <a16:creationId xmlns:a16="http://schemas.microsoft.com/office/drawing/2014/main" id="{7F73CE16-A912-188A-6033-F0A913757854}"/>
+              </a:ext>
+            </a:extLst>
+          </p:cNvPr>
+          <p:cNvPicPr>
+            <a:picLocks noChangeAspect="1"/>
+          </p:cNvPicPr>
+          <p:nvPr/>
+        </p:nvPicPr>
+        <p:blipFill>
+          <a:blip r:embed="rId4">
+            <a:extLst>
+              <a:ext uri="{28A0092B-C50C-407E-A947-70E740481C1C}">
+                <a14:useLocalDpi xmlns:a14="http://schemas.microsoft.com/office/drawing/2010/main" val="0"/>
+              </a:ext>
+            </a:extLst>
+          </a:blip>
+          <a:stretch>
+            <a:fillRect/>
+          </a:stretch>
+        </p:blipFill>
+        <p:spPr>
+          <a:xfrm flipH="1">
+            <a:off x="2639616" y="2996952"/>
+            <a:ext cx="2019300" cy="2895600"/>
+          </a:xfrm>
+          <a:prstGeom prst="rect">
+            <a:avLst/>
+          </a:prstGeom>
+        </p:spPr>
+      </p:pic>
+      <p:pic>
+        <p:nvPicPr>
+          <p:cNvPr id="19" name="Picture 18" descr="A picture containing logo&#10;&#10;Description automatically generated">
+            <a:extLst>
+              <a:ext uri="{FF2B5EF4-FFF2-40B4-BE49-F238E27FC236}">
+                <a16:creationId xmlns:a16="http://schemas.microsoft.com/office/drawing/2014/main" id="{55CF8F9D-69CB-BD7E-C8FA-4C7721A22883}"/>
+              </a:ext>
+            </a:extLst>
+          </p:cNvPr>
+          <p:cNvPicPr>
+            <a:picLocks noChangeAspect="1"/>
+          </p:cNvPicPr>
+          <p:nvPr/>
+        </p:nvPicPr>
+        <p:blipFill>
+          <a:blip r:embed="rId5">
+            <a:extLst>
+              <a:ext uri="{28A0092B-C50C-407E-A947-70E740481C1C}">
+                <a14:useLocalDpi xmlns:a14="http://schemas.microsoft.com/office/drawing/2010/main" val="0"/>
+              </a:ext>
+            </a:extLst>
+          </a:blip>
+          <a:stretch>
+            <a:fillRect/>
+          </a:stretch>
+        </p:blipFill>
+        <p:spPr>
+          <a:xfrm flipH="1">
+            <a:off x="3863752" y="2924944"/>
+            <a:ext cx="2019300" cy="2895600"/>
+          </a:xfrm>
+          <a:prstGeom prst="rect">
+            <a:avLst/>
+          </a:prstGeom>
+        </p:spPr>
+      </p:pic>
+      <p:pic>
+        <p:nvPicPr>
+          <p:cNvPr id="20" name="Picture 19" descr="Logo&#10;&#10;Description automatically generated with low confidence">
+            <a:extLst>
+              <a:ext uri="{FF2B5EF4-FFF2-40B4-BE49-F238E27FC236}">
+                <a16:creationId xmlns:a16="http://schemas.microsoft.com/office/drawing/2014/main" id="{09DF1921-BF8B-EEEC-8899-4D07A45C3504}"/>
+              </a:ext>
+            </a:extLst>
+          </p:cNvPr>
+          <p:cNvPicPr>
+            <a:picLocks noChangeAspect="1"/>
+          </p:cNvPicPr>
+          <p:nvPr/>
+        </p:nvPicPr>
+        <p:blipFill>
+          <a:blip r:embed="rId6">
+            <a:extLst>
+              <a:ext uri="{28A0092B-C50C-407E-A947-70E740481C1C}">
+                <a14:useLocalDpi xmlns:a14="http://schemas.microsoft.com/office/drawing/2010/main" val="0"/>
+              </a:ext>
+            </a:extLst>
+          </a:blip>
+          <a:stretch>
+            <a:fillRect/>
+          </a:stretch>
+        </p:blipFill>
+        <p:spPr>
+          <a:xfrm flipH="1">
+            <a:off x="5159896" y="2852936"/>
+            <a:ext cx="2019300" cy="2895600"/>
+          </a:xfrm>
+          <a:prstGeom prst="rect">
+            <a:avLst/>
+          </a:prstGeom>
+        </p:spPr>
+      </p:pic>
+      <p:pic>
+        <p:nvPicPr>
+          <p:cNvPr id="21" name="Picture 20" descr="Logo&#10;&#10;Description automatically generated">
+            <a:extLst>
+              <a:ext uri="{FF2B5EF4-FFF2-40B4-BE49-F238E27FC236}">
+                <a16:creationId xmlns:a16="http://schemas.microsoft.com/office/drawing/2014/main" id="{588C1A51-9F8A-0BE0-1736-8E77C8B12984}"/>
+              </a:ext>
+            </a:extLst>
+          </p:cNvPr>
+          <p:cNvPicPr>
+            <a:picLocks noChangeAspect="1"/>
+          </p:cNvPicPr>
+          <p:nvPr/>
+        </p:nvPicPr>
+        <p:blipFill>
+          <a:blip r:embed="rId7">
+            <a:extLst>
+              <a:ext uri="{28A0092B-C50C-407E-A947-70E740481C1C}">
+                <a14:useLocalDpi xmlns:a14="http://schemas.microsoft.com/office/drawing/2010/main" val="0"/>
+              </a:ext>
+            </a:extLst>
+          </a:blip>
+          <a:stretch>
+            <a:fillRect/>
+          </a:stretch>
+        </p:blipFill>
+        <p:spPr>
+          <a:xfrm flipH="1">
+            <a:off x="6888088" y="2852936"/>
+            <a:ext cx="2019300" cy="2895600"/>
+          </a:xfrm>
+          <a:prstGeom prst="rect">
+            <a:avLst/>
+          </a:prstGeom>
+        </p:spPr>
+      </p:pic>
+    </p:spTree>
+    <p:extLst>
+      <p:ext uri="{BB962C8B-B14F-4D97-AF65-F5344CB8AC3E}">
+        <p14:creationId xmlns:p14="http://schemas.microsoft.com/office/powerpoint/2010/main" val="1733317260"/>
       </p:ext>
     </p:extLst>
   </p:cSld>

</xml_diff>